<commit_message>
added discussion questions, new mccarthy doc, updated slides
</commit_message>
<xml_diff>
--- a/ppts/Chapter 3b Slides.pptx
+++ b/ppts/Chapter 3b Slides.pptx
@@ -202,7 +202,7 @@
           <a:p>
             <a:fld id="{3D5065DD-4A19-494A-919F-B9B40AB5032A}" type="datetimeFigureOut">
               <a:rPr lang="en-US" smtClean="0"/>
-              <a:t>8/24/16</a:t>
+              <a:t>9/6/16</a:t>
             </a:fld>
             <a:endParaRPr lang="en-US"/>
           </a:p>
@@ -514,38 +514,7 @@
           <a:bodyPr/>
           <a:lstStyle/>
           <a:p>
-            <a:pPr marL="0" marR="0" indent="0" algn="l" defTabSz="457200" rtl="0" eaLnBrk="1" fontAlgn="auto" latinLnBrk="0" hangingPunct="1">
-              <a:lnSpc>
-                <a:spcPct val="100000"/>
-              </a:lnSpc>
-              <a:spcBef>
-                <a:spcPts val="0"/>
-              </a:spcBef>
-              <a:spcAft>
-                <a:spcPts val="0"/>
-              </a:spcAft>
-              <a:buClrTx/>
-              <a:buSzTx/>
-              <a:buFontTx/>
-              <a:buNone/>
-              <a:tabLst/>
-              <a:defRPr/>
-            </a:pPr>
-            <a:r>
-              <a:rPr lang="en-US" dirty="0" smtClean="0"/>
-              <a:t>Certain</a:t>
-            </a:r>
-            <a:r>
-              <a:rPr lang="en-US" baseline="0" dirty="0" smtClean="0"/>
-              <a:t> religious </a:t>
-            </a:r>
-            <a:r>
-              <a:rPr lang="en-US" dirty="0" smtClean="0"/>
-              <a:t>organizations seek endorsements from celebrities</a:t>
-            </a:r>
-          </a:p>
-          <a:p>
-            <a:endParaRPr lang="en-US" dirty="0"/>
+            <a:endParaRPr lang="en-US"/>
           </a:p>
         </p:txBody>
       </p:sp>
@@ -566,7 +535,7 @@
           <a:p>
             <a:fld id="{4C661713-0DFB-BE4E-91B4-F969A2F6F2AC}" type="slidenum">
               <a:rPr lang="en-US" smtClean="0"/>
-              <a:t>7</a:t>
+              <a:t>1</a:t>
             </a:fld>
             <a:endParaRPr lang="en-US"/>
           </a:p>
@@ -575,7 +544,175 @@
     </p:spTree>
     <p:extLst>
       <p:ext uri="{BB962C8B-B14F-4D97-AF65-F5344CB8AC3E}">
-        <p14:creationId xmlns:p14="http://schemas.microsoft.com/office/powerpoint/2010/main" val="1808814403"/>
+        <p14:creationId xmlns:p14="http://schemas.microsoft.com/office/powerpoint/2010/main" val="339539563"/>
+      </p:ext>
+    </p:extLst>
+  </p:cSld>
+  <p:clrMapOvr>
+    <a:masterClrMapping/>
+  </p:clrMapOvr>
+</p:notes>
+</file>
+
+<file path=ppt/notesSlides/notesSlide10.xml><?xml version="1.0" encoding="utf-8"?>
+<p:notes xmlns:a="http://schemas.openxmlformats.org/drawingml/2006/main" xmlns:r="http://schemas.openxmlformats.org/officeDocument/2006/relationships" xmlns:p="http://schemas.openxmlformats.org/presentationml/2006/main">
+  <p:cSld>
+    <p:spTree>
+      <p:nvGrpSpPr>
+        <p:cNvPr id="1" name=""/>
+        <p:cNvGrpSpPr/>
+        <p:nvPr/>
+      </p:nvGrpSpPr>
+      <p:grpSpPr>
+        <a:xfrm>
+          <a:off x="0" y="0"/>
+          <a:ext cx="0" cy="0"/>
+          <a:chOff x="0" y="0"/>
+          <a:chExt cx="0" cy="0"/>
+        </a:xfrm>
+      </p:grpSpPr>
+      <p:sp>
+        <p:nvSpPr>
+          <p:cNvPr id="2" name="Slide Image Placeholder 1"/>
+          <p:cNvSpPr>
+            <a:spLocks noGrp="1" noRot="1" noChangeAspect="1"/>
+          </p:cNvSpPr>
+          <p:nvPr>
+            <p:ph type="sldImg"/>
+          </p:nvPr>
+        </p:nvSpPr>
+        <p:spPr/>
+      </p:sp>
+      <p:sp>
+        <p:nvSpPr>
+          <p:cNvPr id="3" name="Notes Placeholder 2"/>
+          <p:cNvSpPr>
+            <a:spLocks noGrp="1"/>
+          </p:cNvSpPr>
+          <p:nvPr>
+            <p:ph type="body" idx="1"/>
+          </p:nvPr>
+        </p:nvSpPr>
+        <p:spPr/>
+        <p:txBody>
+          <a:bodyPr/>
+          <a:lstStyle/>
+          <a:p>
+            <a:endParaRPr lang="en-US" dirty="0"/>
+          </a:p>
+        </p:txBody>
+      </p:sp>
+      <p:sp>
+        <p:nvSpPr>
+          <p:cNvPr id="4" name="Slide Number Placeholder 3"/>
+          <p:cNvSpPr>
+            <a:spLocks noGrp="1"/>
+          </p:cNvSpPr>
+          <p:nvPr>
+            <p:ph type="sldNum" sz="quarter" idx="10"/>
+          </p:nvPr>
+        </p:nvSpPr>
+        <p:spPr/>
+        <p:txBody>
+          <a:bodyPr/>
+          <a:lstStyle/>
+          <a:p>
+            <a:fld id="{4C661713-0DFB-BE4E-91B4-F969A2F6F2AC}" type="slidenum">
+              <a:rPr lang="en-US" smtClean="0"/>
+              <a:t>10</a:t>
+            </a:fld>
+            <a:endParaRPr lang="en-US"/>
+          </a:p>
+        </p:txBody>
+      </p:sp>
+    </p:spTree>
+    <p:extLst>
+      <p:ext uri="{BB962C8B-B14F-4D97-AF65-F5344CB8AC3E}">
+        <p14:creationId xmlns:p14="http://schemas.microsoft.com/office/powerpoint/2010/main" val="1966584323"/>
+      </p:ext>
+    </p:extLst>
+  </p:cSld>
+  <p:clrMapOvr>
+    <a:masterClrMapping/>
+  </p:clrMapOvr>
+</p:notes>
+</file>
+
+<file path=ppt/notesSlides/notesSlide11.xml><?xml version="1.0" encoding="utf-8"?>
+<p:notes xmlns:a="http://schemas.openxmlformats.org/drawingml/2006/main" xmlns:r="http://schemas.openxmlformats.org/officeDocument/2006/relationships" xmlns:p="http://schemas.openxmlformats.org/presentationml/2006/main">
+  <p:cSld>
+    <p:spTree>
+      <p:nvGrpSpPr>
+        <p:cNvPr id="1" name=""/>
+        <p:cNvGrpSpPr/>
+        <p:nvPr/>
+      </p:nvGrpSpPr>
+      <p:grpSpPr>
+        <a:xfrm>
+          <a:off x="0" y="0"/>
+          <a:ext cx="0" cy="0"/>
+          <a:chOff x="0" y="0"/>
+          <a:chExt cx="0" cy="0"/>
+        </a:xfrm>
+      </p:grpSpPr>
+      <p:sp>
+        <p:nvSpPr>
+          <p:cNvPr id="2" name="Slide Image Placeholder 1"/>
+          <p:cNvSpPr>
+            <a:spLocks noGrp="1" noRot="1" noChangeAspect="1"/>
+          </p:cNvSpPr>
+          <p:nvPr>
+            <p:ph type="sldImg"/>
+          </p:nvPr>
+        </p:nvSpPr>
+        <p:spPr/>
+      </p:sp>
+      <p:sp>
+        <p:nvSpPr>
+          <p:cNvPr id="3" name="Notes Placeholder 2"/>
+          <p:cNvSpPr>
+            <a:spLocks noGrp="1"/>
+          </p:cNvSpPr>
+          <p:nvPr>
+            <p:ph type="body" idx="1"/>
+          </p:nvPr>
+        </p:nvSpPr>
+        <p:spPr/>
+        <p:txBody>
+          <a:bodyPr/>
+          <a:lstStyle/>
+          <a:p>
+            <a:endParaRPr lang="en-US" dirty="0"/>
+          </a:p>
+        </p:txBody>
+      </p:sp>
+      <p:sp>
+        <p:nvSpPr>
+          <p:cNvPr id="4" name="Slide Number Placeholder 3"/>
+          <p:cNvSpPr>
+            <a:spLocks noGrp="1"/>
+          </p:cNvSpPr>
+          <p:nvPr>
+            <p:ph type="sldNum" sz="quarter" idx="10"/>
+          </p:nvPr>
+        </p:nvSpPr>
+        <p:spPr/>
+        <p:txBody>
+          <a:bodyPr/>
+          <a:lstStyle/>
+          <a:p>
+            <a:fld id="{4C661713-0DFB-BE4E-91B4-F969A2F6F2AC}" type="slidenum">
+              <a:rPr lang="en-US" smtClean="0"/>
+              <a:t>11</a:t>
+            </a:fld>
+            <a:endParaRPr lang="en-US"/>
+          </a:p>
+        </p:txBody>
+      </p:sp>
+    </p:spTree>
+    <p:extLst>
+      <p:ext uri="{BB962C8B-B14F-4D97-AF65-F5344CB8AC3E}">
+        <p14:creationId xmlns:p14="http://schemas.microsoft.com/office/powerpoint/2010/main" val="1208615936"/>
       </p:ext>
     </p:extLst>
   </p:cSld>
@@ -629,7 +766,7 @@
           <a:bodyPr/>
           <a:lstStyle/>
           <a:p>
-            <a:endParaRPr lang="en-US" dirty="0"/>
+            <a:endParaRPr lang="en-US"/>
           </a:p>
         </p:txBody>
       </p:sp>
@@ -650,7 +787,7 @@
           <a:p>
             <a:fld id="{4C661713-0DFB-BE4E-91B4-F969A2F6F2AC}" type="slidenum">
               <a:rPr lang="en-US" smtClean="0"/>
-              <a:t>8</a:t>
+              <a:t>2</a:t>
             </a:fld>
             <a:endParaRPr lang="en-US"/>
           </a:p>
@@ -659,7 +796,7 @@
     </p:spTree>
     <p:extLst>
       <p:ext uri="{BB962C8B-B14F-4D97-AF65-F5344CB8AC3E}">
-        <p14:creationId xmlns:p14="http://schemas.microsoft.com/office/powerpoint/2010/main" val="4279657537"/>
+        <p14:creationId xmlns:p14="http://schemas.microsoft.com/office/powerpoint/2010/main" val="525772384"/>
       </p:ext>
     </p:extLst>
   </p:cSld>
@@ -713,15 +850,7 @@
           <a:bodyPr/>
           <a:lstStyle/>
           <a:p>
-            <a:r>
-              <a:rPr lang="en-US" dirty="0" smtClean="0"/>
-              <a:t>Funders could end up calling shots.</a:t>
-            </a:r>
-            <a:r>
-              <a:rPr lang="en-US" baseline="0" dirty="0" smtClean="0"/>
-              <a:t> Movement may maintain some autonomy if funder and movement align: if funder is radical and movement is radical</a:t>
-            </a:r>
-            <a:endParaRPr lang="en-US" dirty="0"/>
+            <a:endParaRPr lang="en-US"/>
           </a:p>
         </p:txBody>
       </p:sp>
@@ -742,7 +871,7 @@
           <a:p>
             <a:fld id="{4C661713-0DFB-BE4E-91B4-F969A2F6F2AC}" type="slidenum">
               <a:rPr lang="en-US" smtClean="0"/>
-              <a:t>11</a:t>
+              <a:t>3</a:t>
             </a:fld>
             <a:endParaRPr lang="en-US"/>
           </a:p>
@@ -751,7 +880,542 @@
     </p:spTree>
     <p:extLst>
       <p:ext uri="{BB962C8B-B14F-4D97-AF65-F5344CB8AC3E}">
-        <p14:creationId xmlns:p14="http://schemas.microsoft.com/office/powerpoint/2010/main" val="1208615936"/>
+        <p14:creationId xmlns:p14="http://schemas.microsoft.com/office/powerpoint/2010/main" val="10191843"/>
+      </p:ext>
+    </p:extLst>
+  </p:cSld>
+  <p:clrMapOvr>
+    <a:masterClrMapping/>
+  </p:clrMapOvr>
+</p:notes>
+</file>
+
+<file path=ppt/notesSlides/notesSlide4.xml><?xml version="1.0" encoding="utf-8"?>
+<p:notes xmlns:a="http://schemas.openxmlformats.org/drawingml/2006/main" xmlns:r="http://schemas.openxmlformats.org/officeDocument/2006/relationships" xmlns:p="http://schemas.openxmlformats.org/presentationml/2006/main">
+  <p:cSld>
+    <p:spTree>
+      <p:nvGrpSpPr>
+        <p:cNvPr id="1" name=""/>
+        <p:cNvGrpSpPr/>
+        <p:nvPr/>
+      </p:nvGrpSpPr>
+      <p:grpSpPr>
+        <a:xfrm>
+          <a:off x="0" y="0"/>
+          <a:ext cx="0" cy="0"/>
+          <a:chOff x="0" y="0"/>
+          <a:chExt cx="0" cy="0"/>
+        </a:xfrm>
+      </p:grpSpPr>
+      <p:sp>
+        <p:nvSpPr>
+          <p:cNvPr id="2" name="Slide Image Placeholder 1"/>
+          <p:cNvSpPr>
+            <a:spLocks noGrp="1" noRot="1" noChangeAspect="1"/>
+          </p:cNvSpPr>
+          <p:nvPr>
+            <p:ph type="sldImg"/>
+          </p:nvPr>
+        </p:nvSpPr>
+        <p:spPr/>
+      </p:sp>
+      <p:sp>
+        <p:nvSpPr>
+          <p:cNvPr id="3" name="Notes Placeholder 2"/>
+          <p:cNvSpPr>
+            <a:spLocks noGrp="1"/>
+          </p:cNvSpPr>
+          <p:nvPr>
+            <p:ph type="body" idx="1"/>
+          </p:nvPr>
+        </p:nvSpPr>
+        <p:spPr/>
+        <p:txBody>
+          <a:bodyPr/>
+          <a:lstStyle/>
+          <a:p>
+            <a:endParaRPr lang="en-US"/>
+          </a:p>
+        </p:txBody>
+      </p:sp>
+      <p:sp>
+        <p:nvSpPr>
+          <p:cNvPr id="4" name="Slide Number Placeholder 3"/>
+          <p:cNvSpPr>
+            <a:spLocks noGrp="1"/>
+          </p:cNvSpPr>
+          <p:nvPr>
+            <p:ph type="sldNum" sz="quarter" idx="10"/>
+          </p:nvPr>
+        </p:nvSpPr>
+        <p:spPr/>
+        <p:txBody>
+          <a:bodyPr/>
+          <a:lstStyle/>
+          <a:p>
+            <a:fld id="{4C661713-0DFB-BE4E-91B4-F969A2F6F2AC}" type="slidenum">
+              <a:rPr lang="en-US" smtClean="0"/>
+              <a:t>4</a:t>
+            </a:fld>
+            <a:endParaRPr lang="en-US"/>
+          </a:p>
+        </p:txBody>
+      </p:sp>
+    </p:spTree>
+    <p:extLst>
+      <p:ext uri="{BB962C8B-B14F-4D97-AF65-F5344CB8AC3E}">
+        <p14:creationId xmlns:p14="http://schemas.microsoft.com/office/powerpoint/2010/main" val="1730304318"/>
+      </p:ext>
+    </p:extLst>
+  </p:cSld>
+  <p:clrMapOvr>
+    <a:masterClrMapping/>
+  </p:clrMapOvr>
+</p:notes>
+</file>
+
+<file path=ppt/notesSlides/notesSlide5.xml><?xml version="1.0" encoding="utf-8"?>
+<p:notes xmlns:a="http://schemas.openxmlformats.org/drawingml/2006/main" xmlns:r="http://schemas.openxmlformats.org/officeDocument/2006/relationships" xmlns:p="http://schemas.openxmlformats.org/presentationml/2006/main">
+  <p:cSld>
+    <p:spTree>
+      <p:nvGrpSpPr>
+        <p:cNvPr id="1" name=""/>
+        <p:cNvGrpSpPr/>
+        <p:nvPr/>
+      </p:nvGrpSpPr>
+      <p:grpSpPr>
+        <a:xfrm>
+          <a:off x="0" y="0"/>
+          <a:ext cx="0" cy="0"/>
+          <a:chOff x="0" y="0"/>
+          <a:chExt cx="0" cy="0"/>
+        </a:xfrm>
+      </p:grpSpPr>
+      <p:sp>
+        <p:nvSpPr>
+          <p:cNvPr id="2" name="Slide Image Placeholder 1"/>
+          <p:cNvSpPr>
+            <a:spLocks noGrp="1" noRot="1" noChangeAspect="1"/>
+          </p:cNvSpPr>
+          <p:nvPr>
+            <p:ph type="sldImg"/>
+          </p:nvPr>
+        </p:nvSpPr>
+        <p:spPr/>
+      </p:sp>
+      <p:sp>
+        <p:nvSpPr>
+          <p:cNvPr id="3" name="Notes Placeholder 2"/>
+          <p:cNvSpPr>
+            <a:spLocks noGrp="1"/>
+          </p:cNvSpPr>
+          <p:nvPr>
+            <p:ph type="body" idx="1"/>
+          </p:nvPr>
+        </p:nvSpPr>
+        <p:spPr/>
+        <p:txBody>
+          <a:bodyPr/>
+          <a:lstStyle/>
+          <a:p>
+            <a:endParaRPr lang="en-US"/>
+          </a:p>
+        </p:txBody>
+      </p:sp>
+      <p:sp>
+        <p:nvSpPr>
+          <p:cNvPr id="4" name="Slide Number Placeholder 3"/>
+          <p:cNvSpPr>
+            <a:spLocks noGrp="1"/>
+          </p:cNvSpPr>
+          <p:nvPr>
+            <p:ph type="sldNum" sz="quarter" idx="10"/>
+          </p:nvPr>
+        </p:nvSpPr>
+        <p:spPr/>
+        <p:txBody>
+          <a:bodyPr/>
+          <a:lstStyle/>
+          <a:p>
+            <a:fld id="{4C661713-0DFB-BE4E-91B4-F969A2F6F2AC}" type="slidenum">
+              <a:rPr lang="en-US" smtClean="0"/>
+              <a:t>5</a:t>
+            </a:fld>
+            <a:endParaRPr lang="en-US"/>
+          </a:p>
+        </p:txBody>
+      </p:sp>
+    </p:spTree>
+    <p:extLst>
+      <p:ext uri="{BB962C8B-B14F-4D97-AF65-F5344CB8AC3E}">
+        <p14:creationId xmlns:p14="http://schemas.microsoft.com/office/powerpoint/2010/main" val="56371402"/>
+      </p:ext>
+    </p:extLst>
+  </p:cSld>
+  <p:clrMapOvr>
+    <a:masterClrMapping/>
+  </p:clrMapOvr>
+</p:notes>
+</file>
+
+<file path=ppt/notesSlides/notesSlide6.xml><?xml version="1.0" encoding="utf-8"?>
+<p:notes xmlns:a="http://schemas.openxmlformats.org/drawingml/2006/main" xmlns:r="http://schemas.openxmlformats.org/officeDocument/2006/relationships" xmlns:p="http://schemas.openxmlformats.org/presentationml/2006/main">
+  <p:cSld>
+    <p:spTree>
+      <p:nvGrpSpPr>
+        <p:cNvPr id="1" name=""/>
+        <p:cNvGrpSpPr/>
+        <p:nvPr/>
+      </p:nvGrpSpPr>
+      <p:grpSpPr>
+        <a:xfrm>
+          <a:off x="0" y="0"/>
+          <a:ext cx="0" cy="0"/>
+          <a:chOff x="0" y="0"/>
+          <a:chExt cx="0" cy="0"/>
+        </a:xfrm>
+      </p:grpSpPr>
+      <p:sp>
+        <p:nvSpPr>
+          <p:cNvPr id="2" name="Slide Image Placeholder 1"/>
+          <p:cNvSpPr>
+            <a:spLocks noGrp="1" noRot="1" noChangeAspect="1"/>
+          </p:cNvSpPr>
+          <p:nvPr>
+            <p:ph type="sldImg"/>
+          </p:nvPr>
+        </p:nvSpPr>
+        <p:spPr/>
+      </p:sp>
+      <p:sp>
+        <p:nvSpPr>
+          <p:cNvPr id="3" name="Notes Placeholder 2"/>
+          <p:cNvSpPr>
+            <a:spLocks noGrp="1"/>
+          </p:cNvSpPr>
+          <p:nvPr>
+            <p:ph type="body" idx="1"/>
+          </p:nvPr>
+        </p:nvSpPr>
+        <p:spPr/>
+        <p:txBody>
+          <a:bodyPr/>
+          <a:lstStyle/>
+          <a:p>
+            <a:endParaRPr lang="en-US"/>
+          </a:p>
+        </p:txBody>
+      </p:sp>
+      <p:sp>
+        <p:nvSpPr>
+          <p:cNvPr id="4" name="Slide Number Placeholder 3"/>
+          <p:cNvSpPr>
+            <a:spLocks noGrp="1"/>
+          </p:cNvSpPr>
+          <p:nvPr>
+            <p:ph type="sldNum" sz="quarter" idx="10"/>
+          </p:nvPr>
+        </p:nvSpPr>
+        <p:spPr/>
+        <p:txBody>
+          <a:bodyPr/>
+          <a:lstStyle/>
+          <a:p>
+            <a:fld id="{4C661713-0DFB-BE4E-91B4-F969A2F6F2AC}" type="slidenum">
+              <a:rPr lang="en-US" smtClean="0"/>
+              <a:t>6</a:t>
+            </a:fld>
+            <a:endParaRPr lang="en-US"/>
+          </a:p>
+        </p:txBody>
+      </p:sp>
+    </p:spTree>
+    <p:extLst>
+      <p:ext uri="{BB962C8B-B14F-4D97-AF65-F5344CB8AC3E}">
+        <p14:creationId xmlns:p14="http://schemas.microsoft.com/office/powerpoint/2010/main" val="3150383563"/>
+      </p:ext>
+    </p:extLst>
+  </p:cSld>
+  <p:clrMapOvr>
+    <a:masterClrMapping/>
+  </p:clrMapOvr>
+</p:notes>
+</file>
+
+<file path=ppt/notesSlides/notesSlide7.xml><?xml version="1.0" encoding="utf-8"?>
+<p:notes xmlns:a="http://schemas.openxmlformats.org/drawingml/2006/main" xmlns:r="http://schemas.openxmlformats.org/officeDocument/2006/relationships" xmlns:p="http://schemas.openxmlformats.org/presentationml/2006/main">
+  <p:cSld>
+    <p:spTree>
+      <p:nvGrpSpPr>
+        <p:cNvPr id="1" name=""/>
+        <p:cNvGrpSpPr/>
+        <p:nvPr/>
+      </p:nvGrpSpPr>
+      <p:grpSpPr>
+        <a:xfrm>
+          <a:off x="0" y="0"/>
+          <a:ext cx="0" cy="0"/>
+          <a:chOff x="0" y="0"/>
+          <a:chExt cx="0" cy="0"/>
+        </a:xfrm>
+      </p:grpSpPr>
+      <p:sp>
+        <p:nvSpPr>
+          <p:cNvPr id="2" name="Slide Image Placeholder 1"/>
+          <p:cNvSpPr>
+            <a:spLocks noGrp="1" noRot="1" noChangeAspect="1"/>
+          </p:cNvSpPr>
+          <p:nvPr>
+            <p:ph type="sldImg"/>
+          </p:nvPr>
+        </p:nvSpPr>
+        <p:spPr/>
+      </p:sp>
+      <p:sp>
+        <p:nvSpPr>
+          <p:cNvPr id="3" name="Notes Placeholder 2"/>
+          <p:cNvSpPr>
+            <a:spLocks noGrp="1"/>
+          </p:cNvSpPr>
+          <p:nvPr>
+            <p:ph type="body" idx="1"/>
+          </p:nvPr>
+        </p:nvSpPr>
+        <p:spPr/>
+        <p:txBody>
+          <a:bodyPr/>
+          <a:lstStyle/>
+          <a:p>
+            <a:pPr marL="0" marR="0" indent="0" algn="l" defTabSz="457200" rtl="0" eaLnBrk="1" fontAlgn="auto" latinLnBrk="0" hangingPunct="1">
+              <a:lnSpc>
+                <a:spcPct val="100000"/>
+              </a:lnSpc>
+              <a:spcBef>
+                <a:spcPts val="0"/>
+              </a:spcBef>
+              <a:spcAft>
+                <a:spcPts val="0"/>
+              </a:spcAft>
+              <a:buClrTx/>
+              <a:buSzTx/>
+              <a:buFontTx/>
+              <a:buNone/>
+              <a:tabLst/>
+              <a:defRPr/>
+            </a:pPr>
+            <a:r>
+              <a:rPr lang="en-US" dirty="0" smtClean="0"/>
+              <a:t>Certain</a:t>
+            </a:r>
+            <a:r>
+              <a:rPr lang="en-US" baseline="0" dirty="0" smtClean="0"/>
+              <a:t> religious </a:t>
+            </a:r>
+            <a:r>
+              <a:rPr lang="en-US" dirty="0" smtClean="0"/>
+              <a:t>organizations seek endorsements from celebrities</a:t>
+            </a:r>
+          </a:p>
+          <a:p>
+            <a:endParaRPr lang="en-US" dirty="0"/>
+          </a:p>
+        </p:txBody>
+      </p:sp>
+      <p:sp>
+        <p:nvSpPr>
+          <p:cNvPr id="4" name="Slide Number Placeholder 3"/>
+          <p:cNvSpPr>
+            <a:spLocks noGrp="1"/>
+          </p:cNvSpPr>
+          <p:nvPr>
+            <p:ph type="sldNum" sz="quarter" idx="10"/>
+          </p:nvPr>
+        </p:nvSpPr>
+        <p:spPr/>
+        <p:txBody>
+          <a:bodyPr/>
+          <a:lstStyle/>
+          <a:p>
+            <a:fld id="{4C661713-0DFB-BE4E-91B4-F969A2F6F2AC}" type="slidenum">
+              <a:rPr lang="en-US" smtClean="0"/>
+              <a:t>7</a:t>
+            </a:fld>
+            <a:endParaRPr lang="en-US"/>
+          </a:p>
+        </p:txBody>
+      </p:sp>
+    </p:spTree>
+    <p:extLst>
+      <p:ext uri="{BB962C8B-B14F-4D97-AF65-F5344CB8AC3E}">
+        <p14:creationId xmlns:p14="http://schemas.microsoft.com/office/powerpoint/2010/main" val="1808814403"/>
+      </p:ext>
+    </p:extLst>
+  </p:cSld>
+  <p:clrMapOvr>
+    <a:masterClrMapping/>
+  </p:clrMapOvr>
+</p:notes>
+</file>
+
+<file path=ppt/notesSlides/notesSlide8.xml><?xml version="1.0" encoding="utf-8"?>
+<p:notes xmlns:a="http://schemas.openxmlformats.org/drawingml/2006/main" xmlns:r="http://schemas.openxmlformats.org/officeDocument/2006/relationships" xmlns:p="http://schemas.openxmlformats.org/presentationml/2006/main">
+  <p:cSld>
+    <p:spTree>
+      <p:nvGrpSpPr>
+        <p:cNvPr id="1" name=""/>
+        <p:cNvGrpSpPr/>
+        <p:nvPr/>
+      </p:nvGrpSpPr>
+      <p:grpSpPr>
+        <a:xfrm>
+          <a:off x="0" y="0"/>
+          <a:ext cx="0" cy="0"/>
+          <a:chOff x="0" y="0"/>
+          <a:chExt cx="0" cy="0"/>
+        </a:xfrm>
+      </p:grpSpPr>
+      <p:sp>
+        <p:nvSpPr>
+          <p:cNvPr id="2" name="Slide Image Placeholder 1"/>
+          <p:cNvSpPr>
+            <a:spLocks noGrp="1" noRot="1" noChangeAspect="1"/>
+          </p:cNvSpPr>
+          <p:nvPr>
+            <p:ph type="sldImg"/>
+          </p:nvPr>
+        </p:nvSpPr>
+        <p:spPr/>
+      </p:sp>
+      <p:sp>
+        <p:nvSpPr>
+          <p:cNvPr id="3" name="Notes Placeholder 2"/>
+          <p:cNvSpPr>
+            <a:spLocks noGrp="1"/>
+          </p:cNvSpPr>
+          <p:nvPr>
+            <p:ph type="body" idx="1"/>
+          </p:nvPr>
+        </p:nvSpPr>
+        <p:spPr/>
+        <p:txBody>
+          <a:bodyPr/>
+          <a:lstStyle/>
+          <a:p>
+            <a:endParaRPr lang="en-US" dirty="0"/>
+          </a:p>
+        </p:txBody>
+      </p:sp>
+      <p:sp>
+        <p:nvSpPr>
+          <p:cNvPr id="4" name="Slide Number Placeholder 3"/>
+          <p:cNvSpPr>
+            <a:spLocks noGrp="1"/>
+          </p:cNvSpPr>
+          <p:nvPr>
+            <p:ph type="sldNum" sz="quarter" idx="10"/>
+          </p:nvPr>
+        </p:nvSpPr>
+        <p:spPr/>
+        <p:txBody>
+          <a:bodyPr/>
+          <a:lstStyle/>
+          <a:p>
+            <a:fld id="{4C661713-0DFB-BE4E-91B4-F969A2F6F2AC}" type="slidenum">
+              <a:rPr lang="en-US" smtClean="0"/>
+              <a:t>8</a:t>
+            </a:fld>
+            <a:endParaRPr lang="en-US"/>
+          </a:p>
+        </p:txBody>
+      </p:sp>
+    </p:spTree>
+    <p:extLst>
+      <p:ext uri="{BB962C8B-B14F-4D97-AF65-F5344CB8AC3E}">
+        <p14:creationId xmlns:p14="http://schemas.microsoft.com/office/powerpoint/2010/main" val="4279657537"/>
+      </p:ext>
+    </p:extLst>
+  </p:cSld>
+  <p:clrMapOvr>
+    <a:masterClrMapping/>
+  </p:clrMapOvr>
+</p:notes>
+</file>
+
+<file path=ppt/notesSlides/notesSlide9.xml><?xml version="1.0" encoding="utf-8"?>
+<p:notes xmlns:a="http://schemas.openxmlformats.org/drawingml/2006/main" xmlns:r="http://schemas.openxmlformats.org/officeDocument/2006/relationships" xmlns:p="http://schemas.openxmlformats.org/presentationml/2006/main">
+  <p:cSld>
+    <p:spTree>
+      <p:nvGrpSpPr>
+        <p:cNvPr id="1" name=""/>
+        <p:cNvGrpSpPr/>
+        <p:nvPr/>
+      </p:nvGrpSpPr>
+      <p:grpSpPr>
+        <a:xfrm>
+          <a:off x="0" y="0"/>
+          <a:ext cx="0" cy="0"/>
+          <a:chOff x="0" y="0"/>
+          <a:chExt cx="0" cy="0"/>
+        </a:xfrm>
+      </p:grpSpPr>
+      <p:sp>
+        <p:nvSpPr>
+          <p:cNvPr id="2" name="Slide Image Placeholder 1"/>
+          <p:cNvSpPr>
+            <a:spLocks noGrp="1" noRot="1" noChangeAspect="1"/>
+          </p:cNvSpPr>
+          <p:nvPr>
+            <p:ph type="sldImg"/>
+          </p:nvPr>
+        </p:nvSpPr>
+        <p:spPr/>
+      </p:sp>
+      <p:sp>
+        <p:nvSpPr>
+          <p:cNvPr id="3" name="Notes Placeholder 2"/>
+          <p:cNvSpPr>
+            <a:spLocks noGrp="1"/>
+          </p:cNvSpPr>
+          <p:nvPr>
+            <p:ph type="body" idx="1"/>
+          </p:nvPr>
+        </p:nvSpPr>
+        <p:spPr/>
+        <p:txBody>
+          <a:bodyPr/>
+          <a:lstStyle/>
+          <a:p>
+            <a:endParaRPr lang="en-US"/>
+          </a:p>
+        </p:txBody>
+      </p:sp>
+      <p:sp>
+        <p:nvSpPr>
+          <p:cNvPr id="4" name="Slide Number Placeholder 3"/>
+          <p:cNvSpPr>
+            <a:spLocks noGrp="1"/>
+          </p:cNvSpPr>
+          <p:nvPr>
+            <p:ph type="sldNum" sz="quarter" idx="10"/>
+          </p:nvPr>
+        </p:nvSpPr>
+        <p:spPr/>
+        <p:txBody>
+          <a:bodyPr/>
+          <a:lstStyle/>
+          <a:p>
+            <a:fld id="{4C661713-0DFB-BE4E-91B4-F969A2F6F2AC}" type="slidenum">
+              <a:rPr lang="en-US" smtClean="0"/>
+              <a:t>9</a:t>
+            </a:fld>
+            <a:endParaRPr lang="en-US"/>
+          </a:p>
+        </p:txBody>
+      </p:sp>
+    </p:spTree>
+    <p:extLst>
+      <p:ext uri="{BB962C8B-B14F-4D97-AF65-F5344CB8AC3E}">
+        <p14:creationId xmlns:p14="http://schemas.microsoft.com/office/powerpoint/2010/main" val="4270975505"/>
       </p:ext>
     </p:extLst>
   </p:cSld>
@@ -1047,7 +1711,7 @@
           <a:p>
             <a:fld id="{D209C01E-D213-8644-9F4C-5E847F8EF5F9}" type="datetimeFigureOut">
               <a:rPr lang="en-US" smtClean="0"/>
-              <a:t>8/24/16</a:t>
+              <a:t>9/6/16</a:t>
             </a:fld>
             <a:endParaRPr lang="en-US"/>
           </a:p>
@@ -1238,7 +1902,7 @@
           <a:p>
             <a:fld id="{D209C01E-D213-8644-9F4C-5E847F8EF5F9}" type="datetimeFigureOut">
               <a:rPr lang="en-US" smtClean="0"/>
-              <a:t>8/24/16</a:t>
+              <a:t>9/6/16</a:t>
             </a:fld>
             <a:endParaRPr lang="en-US"/>
           </a:p>
@@ -1418,7 +2082,7 @@
           <a:p>
             <a:fld id="{D209C01E-D213-8644-9F4C-5E847F8EF5F9}" type="datetimeFigureOut">
               <a:rPr lang="en-US" smtClean="0"/>
-              <a:t>8/24/16</a:t>
+              <a:t>9/6/16</a:t>
             </a:fld>
             <a:endParaRPr lang="en-US"/>
           </a:p>
@@ -1681,7 +2345,7 @@
           <a:p>
             <a:fld id="{D209C01E-D213-8644-9F4C-5E847F8EF5F9}" type="datetimeFigureOut">
               <a:rPr lang="en-US" smtClean="0"/>
-              <a:t>8/24/16</a:t>
+              <a:t>9/6/16</a:t>
             </a:fld>
             <a:endParaRPr lang="en-US"/>
           </a:p>
@@ -2092,7 +2756,7 @@
           <a:p>
             <a:fld id="{D209C01E-D213-8644-9F4C-5E847F8EF5F9}" type="datetimeFigureOut">
               <a:rPr lang="en-US" smtClean="0"/>
-              <a:t>8/24/16</a:t>
+              <a:t>9/6/16</a:t>
             </a:fld>
             <a:endParaRPr lang="en-US"/>
           </a:p>
@@ -2334,7 +2998,7 @@
           <a:p>
             <a:fld id="{D209C01E-D213-8644-9F4C-5E847F8EF5F9}" type="datetimeFigureOut">
               <a:rPr lang="en-US" smtClean="0"/>
-              <a:t>8/24/16</a:t>
+              <a:t>9/6/16</a:t>
             </a:fld>
             <a:endParaRPr lang="en-US"/>
           </a:p>
@@ -2570,7 +3234,7 @@
           <a:p>
             <a:fld id="{D209C01E-D213-8644-9F4C-5E847F8EF5F9}" type="datetimeFigureOut">
               <a:rPr lang="en-US" smtClean="0"/>
-              <a:t>8/24/16</a:t>
+              <a:t>9/6/16</a:t>
             </a:fld>
             <a:endParaRPr lang="en-US"/>
           </a:p>
@@ -2765,7 +3429,7 @@
           <a:p>
             <a:fld id="{D209C01E-D213-8644-9F4C-5E847F8EF5F9}" type="datetimeFigureOut">
               <a:rPr lang="en-US" smtClean="0"/>
-              <a:t>8/24/16</a:t>
+              <a:t>9/6/16</a:t>
             </a:fld>
             <a:endParaRPr lang="en-US"/>
           </a:p>
@@ -2863,7 +3527,7 @@
           <a:p>
             <a:fld id="{D209C01E-D213-8644-9F4C-5E847F8EF5F9}" type="datetimeFigureOut">
               <a:rPr lang="en-US" smtClean="0"/>
-              <a:t>8/24/16</a:t>
+              <a:t>9/6/16</a:t>
             </a:fld>
             <a:endParaRPr lang="en-US"/>
           </a:p>
@@ -2999,7 +3663,7 @@
           <a:p>
             <a:fld id="{D209C01E-D213-8644-9F4C-5E847F8EF5F9}" type="datetimeFigureOut">
               <a:rPr lang="en-US" smtClean="0"/>
-              <a:t>8/24/16</a:t>
+              <a:t>9/6/16</a:t>
             </a:fld>
             <a:endParaRPr lang="en-US"/>
           </a:p>
@@ -3512,7 +4176,7 @@
           <a:p>
             <a:fld id="{D209C01E-D213-8644-9F4C-5E847F8EF5F9}" type="datetimeFigureOut">
               <a:rPr lang="en-US" smtClean="0"/>
-              <a:t>8/24/16</a:t>
+              <a:t>9/6/16</a:t>
             </a:fld>
             <a:endParaRPr lang="en-US"/>
           </a:p>
@@ -3773,7 +4437,7 @@
           <a:p>
             <a:fld id="{D209C01E-D213-8644-9F4C-5E847F8EF5F9}" type="datetimeFigureOut">
               <a:rPr lang="en-US" smtClean="0"/>
-              <a:t>8/24/16</a:t>
+              <a:t>9/6/16</a:t>
             </a:fld>
             <a:endParaRPr lang="en-US"/>
           </a:p>
@@ -4335,6 +4999,36 @@
           </a:p>
         </p:txBody>
       </p:sp>
+      <p:pic>
+        <p:nvPicPr>
+          <p:cNvPr id="3" name="Picture 2" descr="donate1.jpg"/>
+          <p:cNvPicPr>
+            <a:picLocks noChangeAspect="1"/>
+          </p:cNvPicPr>
+          <p:nvPr/>
+        </p:nvPicPr>
+        <p:blipFill>
+          <a:blip r:embed="rId3">
+            <a:extLst>
+              <a:ext uri="{28A0092B-C50C-407E-A947-70E740481C1C}">
+                <a14:useLocalDpi xmlns:a14="http://schemas.microsoft.com/office/drawing/2010/main" val="0"/>
+              </a:ext>
+            </a:extLst>
+          </a:blip>
+          <a:stretch>
+            <a:fillRect/>
+          </a:stretch>
+        </p:blipFill>
+        <p:spPr>
+          <a:xfrm>
+            <a:off x="1447979" y="583205"/>
+            <a:ext cx="6234078" cy="4156052"/>
+          </a:xfrm>
+          <a:prstGeom prst="rect">
+            <a:avLst/>
+          </a:prstGeom>
+        </p:spPr>
+      </p:pic>
     </p:spTree>
     <p:extLst>
       <p:ext uri="{BB962C8B-B14F-4D97-AF65-F5344CB8AC3E}">
@@ -4345,6 +5039,25 @@
   <p:clrMapOvr>
     <a:masterClrMapping/>
   </p:clrMapOvr>
+  <mc:AlternateContent xmlns:mc="http://schemas.openxmlformats.org/markup-compatibility/2006">
+    <mc:Choice xmlns:p14="http://schemas.microsoft.com/office/powerpoint/2010/main" Requires="p14">
+      <p:transition spd="med" p14:dur="700">
+        <p:fade/>
+      </p:transition>
+    </mc:Choice>
+    <mc:Fallback>
+      <p:transition xmlns:p14="http://schemas.microsoft.com/office/powerpoint/2010/main" spd="med">
+        <p:fade/>
+      </p:transition>
+    </mc:Fallback>
+  </mc:AlternateContent>
+  <p:timing>
+    <p:tnLst>
+      <p:par>
+        <p:cTn xmlns:p14="http://schemas.microsoft.com/office/powerpoint/2010/main" id="1" dur="indefinite" restart="never" nodeType="tmRoot"/>
+      </p:par>
+    </p:tnLst>
+  </p:timing>
 </p:sld>
 </file>
 
@@ -4405,8 +5118,17 @@
           <a:p>
             <a:r>
               <a:rPr lang="en-US" dirty="0" smtClean="0"/>
-              <a:t>Resourced by indigenous black community and institutional infrastructure in which it was embedded</a:t>
-            </a:r>
+              <a:t>Black community and infrastructure </a:t>
+            </a:r>
+            <a:r>
+              <a:rPr lang="en-US" dirty="0" smtClean="0"/>
+              <a:t>in which it was </a:t>
+            </a:r>
+            <a:r>
+              <a:rPr lang="en-US" dirty="0" smtClean="0"/>
+              <a:t>embedded provided resources</a:t>
+            </a:r>
+            <a:endParaRPr lang="en-US" dirty="0" smtClean="0"/>
           </a:p>
           <a:p>
             <a:pPr lvl="1"/>
@@ -4418,6 +5140,36 @@
           </a:p>
         </p:txBody>
       </p:sp>
+      <p:pic>
+        <p:nvPicPr>
+          <p:cNvPr id="4" name="Picture 3" descr="black church.jpg"/>
+          <p:cNvPicPr>
+            <a:picLocks noChangeAspect="1"/>
+          </p:cNvPicPr>
+          <p:nvPr/>
+        </p:nvPicPr>
+        <p:blipFill>
+          <a:blip r:embed="rId3">
+            <a:extLst>
+              <a:ext uri="{28A0092B-C50C-407E-A947-70E740481C1C}">
+                <a14:useLocalDpi xmlns:a14="http://schemas.microsoft.com/office/drawing/2010/main" val="0"/>
+              </a:ext>
+            </a:extLst>
+          </a:blip>
+          <a:stretch>
+            <a:fillRect/>
+          </a:stretch>
+        </p:blipFill>
+        <p:spPr>
+          <a:xfrm>
+            <a:off x="2063247" y="3318535"/>
+            <a:ext cx="4944671" cy="3255241"/>
+          </a:xfrm>
+          <a:prstGeom prst="rect">
+            <a:avLst/>
+          </a:prstGeom>
+        </p:spPr>
+      </p:pic>
     </p:spTree>
     <p:extLst>
       <p:ext uri="{BB962C8B-B14F-4D97-AF65-F5344CB8AC3E}">
@@ -4428,6 +5180,25 @@
   <p:clrMapOvr>
     <a:masterClrMapping/>
   </p:clrMapOvr>
+  <mc:AlternateContent xmlns:mc="http://schemas.openxmlformats.org/markup-compatibility/2006">
+    <mc:Choice xmlns:p14="http://schemas.microsoft.com/office/powerpoint/2010/main" Requires="p14">
+      <p:transition spd="med" p14:dur="700">
+        <p:fade/>
+      </p:transition>
+    </mc:Choice>
+    <mc:Fallback>
+      <p:transition xmlns:p14="http://schemas.microsoft.com/office/powerpoint/2010/main" spd="med">
+        <p:fade/>
+      </p:transition>
+    </mc:Fallback>
+  </mc:AlternateContent>
+  <p:timing>
+    <p:tnLst>
+      <p:par>
+        <p:cTn xmlns:p14="http://schemas.microsoft.com/office/powerpoint/2010/main" id="1" dur="indefinite" restart="never" nodeType="tmRoot"/>
+      </p:par>
+    </p:tnLst>
+  </p:timing>
 </p:sld>
 </file>
 
@@ -4541,6 +5312,25 @@
   <p:clrMapOvr>
     <a:masterClrMapping/>
   </p:clrMapOvr>
+  <mc:AlternateContent xmlns:mc="http://schemas.openxmlformats.org/markup-compatibility/2006">
+    <mc:Choice xmlns:p14="http://schemas.microsoft.com/office/powerpoint/2010/main" Requires="p14">
+      <p:transition spd="med" p14:dur="700">
+        <p:fade/>
+      </p:transition>
+    </mc:Choice>
+    <mc:Fallback>
+      <p:transition xmlns:p14="http://schemas.microsoft.com/office/powerpoint/2010/main" spd="med">
+        <p:fade/>
+      </p:transition>
+    </mc:Fallback>
+  </mc:AlternateContent>
+  <p:timing>
+    <p:tnLst>
+      <p:par>
+        <p:cTn xmlns:p14="http://schemas.microsoft.com/office/powerpoint/2010/main" id="1" dur="indefinite" restart="never" nodeType="tmRoot"/>
+      </p:par>
+    </p:tnLst>
+  </p:timing>
 </p:sld>
 </file>
 
@@ -4601,10 +5391,23 @@
           <a:p>
             <a:r>
               <a:rPr lang="en-US" dirty="0" smtClean="0"/>
-              <a:t>The emergence and persistence of social movement activity depends on the availability, accumulation, and channeling of resources into social movement mobilization</a:t>
-            </a:r>
-          </a:p>
-          <a:p>
+              <a:t>Social movement emergence, activity, and persistence depend on resources</a:t>
+            </a:r>
+          </a:p>
+          <a:p>
+            <a:pPr lvl="1"/>
+            <a:r>
+              <a:rPr lang="en-US" dirty="0" smtClean="0"/>
+              <a:t>availability</a:t>
+            </a:r>
+            <a:r>
+              <a:rPr lang="en-US" dirty="0" smtClean="0"/>
+              <a:t>, accumulation, and channeling </a:t>
+            </a:r>
+            <a:r>
+              <a:rPr lang="en-US" dirty="0" smtClean="0"/>
+              <a:t>towards mobilization</a:t>
+            </a:r>
             <a:endParaRPr lang="en-US" dirty="0"/>
           </a:p>
         </p:txBody>
@@ -4619,6 +5422,25 @@
   <p:clrMapOvr>
     <a:masterClrMapping/>
   </p:clrMapOvr>
+  <mc:AlternateContent xmlns:mc="http://schemas.openxmlformats.org/markup-compatibility/2006">
+    <mc:Choice xmlns:p14="http://schemas.microsoft.com/office/powerpoint/2010/main" Requires="p14">
+      <p:transition spd="med" p14:dur="700">
+        <p:fade/>
+      </p:transition>
+    </mc:Choice>
+    <mc:Fallback>
+      <p:transition xmlns:p14="http://schemas.microsoft.com/office/powerpoint/2010/main" spd="med">
+        <p:fade/>
+      </p:transition>
+    </mc:Fallback>
+  </mc:AlternateContent>
+  <p:timing>
+    <p:tnLst>
+      <p:par>
+        <p:cTn xmlns:p14="http://schemas.microsoft.com/office/powerpoint/2010/main" id="1" dur="indefinite" restart="never" nodeType="tmRoot"/>
+      </p:par>
+    </p:tnLst>
+  </p:timing>
 </p:sld>
 </file>
 
@@ -4681,19 +5503,57 @@
           <a:p>
             <a:r>
               <a:rPr lang="en-US" dirty="0" smtClean="0"/>
-              <a:t>What are the various types of resources important for social movements?</a:t>
-            </a:r>
-          </a:p>
-          <a:p>
+              <a:t>What?</a:t>
+            </a:r>
+          </a:p>
+          <a:p>
+            <a:pPr lvl="1"/>
             <a:r>
               <a:rPr lang="en-US" dirty="0" smtClean="0"/>
-              <a:t>From where do these resources flow?</a:t>
-            </a:r>
-          </a:p>
-          <a:p>
+              <a:t>What </a:t>
+            </a:r>
             <a:r>
               <a:rPr lang="en-US" dirty="0" smtClean="0"/>
-              <a:t>Does the source of the resource affect movement goals and activities?</a:t>
+              <a:t>are the various types of resources important for social movements?</a:t>
+            </a:r>
+          </a:p>
+          <a:p>
+            <a:r>
+              <a:rPr lang="en-US" dirty="0" smtClean="0"/>
+              <a:t>Where/Who?</a:t>
+            </a:r>
+            <a:endParaRPr lang="en-US" dirty="0" smtClean="0"/>
+          </a:p>
+          <a:p>
+            <a:pPr lvl="1"/>
+            <a:r>
+              <a:rPr lang="en-US" dirty="0" smtClean="0"/>
+              <a:t>From </a:t>
+            </a:r>
+            <a:r>
+              <a:rPr lang="en-US" dirty="0" smtClean="0"/>
+              <a:t>where do these resources flow?</a:t>
+            </a:r>
+          </a:p>
+          <a:p>
+            <a:r>
+              <a:rPr lang="en-US" dirty="0" smtClean="0"/>
+              <a:t>Strings attached</a:t>
+            </a:r>
+            <a:r>
+              <a:rPr lang="en-US" dirty="0" smtClean="0"/>
+              <a:t>?</a:t>
+            </a:r>
+          </a:p>
+          <a:p>
+            <a:pPr lvl="1"/>
+            <a:r>
+              <a:rPr lang="en-US" dirty="0" smtClean="0"/>
+              <a:t>Does </a:t>
+            </a:r>
+            <a:r>
+              <a:rPr lang="en-US" dirty="0" smtClean="0"/>
+              <a:t>the source of the resource affect movement goals and activities?</a:t>
             </a:r>
             <a:endParaRPr lang="en-US" dirty="0"/>
           </a:p>
@@ -4709,6 +5569,25 @@
   <p:clrMapOvr>
     <a:masterClrMapping/>
   </p:clrMapOvr>
+  <mc:AlternateContent xmlns:mc="http://schemas.openxmlformats.org/markup-compatibility/2006">
+    <mc:Choice xmlns:p14="http://schemas.microsoft.com/office/powerpoint/2010/main" Requires="p14">
+      <p:transition spd="med" p14:dur="700">
+        <p:fade/>
+      </p:transition>
+    </mc:Choice>
+    <mc:Fallback>
+      <p:transition xmlns:p14="http://schemas.microsoft.com/office/powerpoint/2010/main" spd="med">
+        <p:fade/>
+      </p:transition>
+    </mc:Fallback>
+  </mc:AlternateContent>
+  <p:timing>
+    <p:tnLst>
+      <p:par>
+        <p:cTn xmlns:p14="http://schemas.microsoft.com/office/powerpoint/2010/main" id="1" dur="indefinite" restart="never" nodeType="tmRoot"/>
+      </p:par>
+    </p:tnLst>
+  </p:timing>
 </p:sld>
 </file>
 
@@ -4769,21 +5648,51 @@
           <a:p>
             <a:r>
               <a:rPr lang="en-US" dirty="0" smtClean="0"/>
-              <a:t>Resources vary: </a:t>
-            </a:r>
+              <a:t>Resources </a:t>
+            </a:r>
+            <a:r>
+              <a:rPr lang="en-US" dirty="0" smtClean="0"/>
+              <a:t>vary by type: </a:t>
+            </a:r>
+            <a:endParaRPr lang="en-US" dirty="0" smtClean="0"/>
           </a:p>
           <a:p>
             <a:pPr lvl="1"/>
             <a:r>
               <a:rPr lang="en-US" dirty="0" smtClean="0"/>
-              <a:t>can be anything movements can use for the purposes of advancing their interests</a:t>
-            </a:r>
+              <a:t>Anything movements can use to advance their interests</a:t>
+            </a:r>
+            <a:endParaRPr lang="en-US" dirty="0" smtClean="0"/>
           </a:p>
           <a:p>
             <a:pPr lvl="2"/>
             <a:r>
               <a:rPr lang="en-US" dirty="0" smtClean="0"/>
-              <a:t>People, money, and legitimacy (amongst relevant actors such as the movement’s constituency or the public)</a:t>
+              <a:t>People</a:t>
+            </a:r>
+            <a:endParaRPr lang="en-US" dirty="0"/>
+          </a:p>
+          <a:p>
+            <a:pPr lvl="2"/>
+            <a:r>
+              <a:rPr lang="en-US" dirty="0"/>
+              <a:t>M</a:t>
+            </a:r>
+            <a:r>
+              <a:rPr lang="en-US" dirty="0" smtClean="0"/>
+              <a:t>oney </a:t>
+            </a:r>
+            <a:endParaRPr lang="en-US" dirty="0"/>
+          </a:p>
+          <a:p>
+            <a:pPr lvl="2"/>
+            <a:r>
+              <a:rPr lang="en-US" dirty="0" smtClean="0"/>
+              <a:t>legitimacy </a:t>
+            </a:r>
+            <a:r>
+              <a:rPr lang="en-US" dirty="0" smtClean="0"/>
+              <a:t>(amongst relevant actors such as the movement’s constituency or the public)</a:t>
             </a:r>
             <a:endParaRPr lang="en-US" dirty="0"/>
           </a:p>
@@ -4799,6 +5708,25 @@
   <p:clrMapOvr>
     <a:masterClrMapping/>
   </p:clrMapOvr>
+  <mc:AlternateContent xmlns:mc="http://schemas.openxmlformats.org/markup-compatibility/2006">
+    <mc:Choice xmlns:p14="http://schemas.microsoft.com/office/powerpoint/2010/main" Requires="p14">
+      <p:transition spd="med" p14:dur="700">
+        <p:fade/>
+      </p:transition>
+    </mc:Choice>
+    <mc:Fallback>
+      <p:transition xmlns:p14="http://schemas.microsoft.com/office/powerpoint/2010/main" spd="med">
+        <p:fade/>
+      </p:transition>
+    </mc:Fallback>
+  </mc:AlternateContent>
+  <p:timing>
+    <p:tnLst>
+      <p:par>
+        <p:cTn xmlns:p14="http://schemas.microsoft.com/office/powerpoint/2010/main" id="1" dur="indefinite" restart="never" nodeType="tmRoot"/>
+      </p:par>
+    </p:tnLst>
+  </p:timing>
 </p:sld>
 </file>
 
@@ -4906,6 +5834,25 @@
   <p:clrMapOvr>
     <a:masterClrMapping/>
   </p:clrMapOvr>
+  <mc:AlternateContent xmlns:mc="http://schemas.openxmlformats.org/markup-compatibility/2006">
+    <mc:Choice xmlns:p14="http://schemas.microsoft.com/office/powerpoint/2010/main" Requires="p14">
+      <p:transition spd="med" p14:dur="700">
+        <p:fade/>
+      </p:transition>
+    </mc:Choice>
+    <mc:Fallback>
+      <p:transition xmlns:p14="http://schemas.microsoft.com/office/powerpoint/2010/main" spd="med">
+        <p:fade/>
+      </p:transition>
+    </mc:Fallback>
+  </mc:AlternateContent>
+  <p:timing>
+    <p:tnLst>
+      <p:par>
+        <p:cTn xmlns:p14="http://schemas.microsoft.com/office/powerpoint/2010/main" id="1" dur="indefinite" restart="never" nodeType="tmRoot"/>
+      </p:par>
+    </p:tnLst>
+  </p:timing>
 </p:sld>
 </file>
 
@@ -5006,6 +5953,18 @@
   <p:clrMapOvr>
     <a:masterClrMapping/>
   </p:clrMapOvr>
+  <mc:AlternateContent xmlns:mc="http://schemas.openxmlformats.org/markup-compatibility/2006">
+    <mc:Choice xmlns:p14="http://schemas.microsoft.com/office/powerpoint/2010/main" Requires="p14">
+      <p:transition spd="med" p14:dur="700">
+        <p:fade/>
+      </p:transition>
+    </mc:Choice>
+    <mc:Fallback>
+      <p:transition xmlns:p14="http://schemas.microsoft.com/office/powerpoint/2010/main" spd="med">
+        <p:fade/>
+      </p:transition>
+    </mc:Fallback>
+  </mc:AlternateContent>
   <p:timing>
     <p:tnLst>
       <p:par>
@@ -8266,6 +9225,18 @@
   <p:clrMapOvr>
     <a:masterClrMapping/>
   </p:clrMapOvr>
+  <mc:AlternateContent xmlns:mc="http://schemas.openxmlformats.org/markup-compatibility/2006">
+    <mc:Choice xmlns:p14="http://schemas.microsoft.com/office/powerpoint/2010/main" Requires="p14">
+      <p:transition spd="med" p14:dur="700">
+        <p:fade/>
+      </p:transition>
+    </mc:Choice>
+    <mc:Fallback>
+      <p:transition xmlns:p14="http://schemas.microsoft.com/office/powerpoint/2010/main" spd="med">
+        <p:fade/>
+      </p:transition>
+    </mc:Fallback>
+  </mc:AlternateContent>
   <p:timing>
     <p:tnLst>
       <p:par>
@@ -8335,14 +9306,30 @@
           <a:p>
             <a:r>
               <a:rPr lang="en-US" dirty="0" smtClean="0"/>
-              <a:t>Resources can be secured from various sources:</a:t>
-            </a:r>
+              <a:t>Resources </a:t>
+            </a:r>
+            <a:r>
+              <a:rPr lang="en-US" dirty="0" smtClean="0"/>
+              <a:t>vary by sources:</a:t>
+            </a:r>
+            <a:endParaRPr lang="en-US" dirty="0" smtClean="0"/>
           </a:p>
           <a:p>
             <a:pPr lvl="1"/>
             <a:r>
               <a:rPr lang="en-US" dirty="0" smtClean="0"/>
-              <a:t>Externally: Conscious (non-movement) constituents</a:t>
+              <a:t>Externally</a:t>
+            </a:r>
+          </a:p>
+          <a:p>
+            <a:pPr lvl="2"/>
+            <a:r>
+              <a:rPr lang="en-US" dirty="0" smtClean="0"/>
+              <a:t>Conscious </a:t>
+            </a:r>
+            <a:r>
+              <a:rPr lang="en-US" dirty="0" smtClean="0"/>
+              <a:t>(non-movement) constituents</a:t>
             </a:r>
           </a:p>
           <a:p>
@@ -8356,7 +9343,18 @@
             <a:pPr lvl="1"/>
             <a:r>
               <a:rPr lang="en-US" dirty="0" smtClean="0"/>
-              <a:t>Internally: Indigenous (movement) constituents</a:t>
+              <a:t>Internally</a:t>
+            </a:r>
+          </a:p>
+          <a:p>
+            <a:pPr lvl="2"/>
+            <a:r>
+              <a:rPr lang="en-US" dirty="0" smtClean="0"/>
+              <a:t>Indigenous </a:t>
+            </a:r>
+            <a:r>
+              <a:rPr lang="en-US" dirty="0" smtClean="0"/>
+              <a:t>(movement) constituents</a:t>
             </a:r>
           </a:p>
           <a:p>
@@ -8386,6 +9384,18 @@
   <p:clrMapOvr>
     <a:masterClrMapping/>
   </p:clrMapOvr>
+  <mc:AlternateContent xmlns:mc="http://schemas.openxmlformats.org/markup-compatibility/2006">
+    <mc:Choice xmlns:p14="http://schemas.microsoft.com/office/powerpoint/2010/main" Requires="p14">
+      <p:transition spd="med" p14:dur="700">
+        <p:fade/>
+      </p:transition>
+    </mc:Choice>
+    <mc:Fallback>
+      <p:transition xmlns:p14="http://schemas.microsoft.com/office/powerpoint/2010/main" spd="med">
+        <p:fade/>
+      </p:transition>
+    </mc:Fallback>
+  </mc:AlternateContent>
   <p:timing>
     <p:tnLst>
       <p:par>
@@ -8491,6 +9501,18 @@
   <p:clrMapOvr>
     <a:masterClrMapping/>
   </p:clrMapOvr>
+  <mc:AlternateContent xmlns:mc="http://schemas.openxmlformats.org/markup-compatibility/2006">
+    <mc:Choice xmlns:p14="http://schemas.microsoft.com/office/powerpoint/2010/main" Requires="p14">
+      <p:transition spd="med" p14:dur="700">
+        <p:fade/>
+      </p:transition>
+    </mc:Choice>
+    <mc:Fallback>
+      <p:transition xmlns:p14="http://schemas.microsoft.com/office/powerpoint/2010/main" spd="med">
+        <p:fade/>
+      </p:transition>
+    </mc:Fallback>
+  </mc:AlternateContent>
   <p:timing>
     <p:tnLst>
       <p:par>

</xml_diff>

<commit_message>
updated syllabus for fall 2017
</commit_message>
<xml_diff>
--- a/ppts/Chapter 3b Slides.pptx
+++ b/ppts/Chapter 3b Slides.pptx
@@ -2,7 +2,7 @@
 <file path=ppt/presentation.xml><?xml version="1.0" encoding="utf-8"?>
 <p:presentation xmlns:a="http://schemas.openxmlformats.org/drawingml/2006/main" xmlns:r="http://schemas.openxmlformats.org/officeDocument/2006/relationships" xmlns:p="http://schemas.openxmlformats.org/presentationml/2006/main" saveSubsetFonts="1" autoCompressPictures="0">
   <p:sldMasterIdLst>
-    <p:sldMasterId id="2147483660" r:id="rId1"/>
+    <p:sldMasterId id="2147483672" r:id="rId1"/>
   </p:sldMasterIdLst>
   <p:notesMasterIdLst>
     <p:notesMasterId r:id="rId13"/>
@@ -20,7 +20,7 @@
     <p:sldId id="265" r:id="rId11"/>
     <p:sldId id="266" r:id="rId12"/>
   </p:sldIdLst>
-  <p:sldSz cx="9144000" cy="6858000" type="screen4x3"/>
+  <p:sldSz cx="12192000" cy="6858000"/>
   <p:notesSz cx="6858000" cy="9144000"/>
   <p:defaultTextStyle>
     <a:defPPr>
@@ -117,6 +117,22 @@
       </a:defRPr>
     </a:lvl9pPr>
   </p:defaultTextStyle>
+  <p:extLst>
+    <p:ext uri="{EFAFB233-063F-42B5-8137-9DF3F51BA10A}">
+      <p15:sldGuideLst xmlns:p15="http://schemas.microsoft.com/office/powerpoint/2012/main">
+        <p15:guide id="1" orient="horz" pos="2160" userDrawn="1">
+          <p15:clr>
+            <a:srgbClr val="A4A3A4"/>
+          </p15:clr>
+        </p15:guide>
+        <p15:guide id="2" pos="3840" userDrawn="1">
+          <p15:clr>
+            <a:srgbClr val="A4A3A4"/>
+          </p15:clr>
+        </p15:guide>
+      </p15:sldGuideLst>
+    </p:ext>
+  </p:extLst>
 </p:presentation>
 </file>
 
@@ -202,7 +218,7 @@
           <a:p>
             <a:fld id="{3D5065DD-4A19-494A-919F-B9B40AB5032A}" type="datetimeFigureOut">
               <a:rPr lang="en-US" smtClean="0"/>
-              <a:t>9/6/16</a:t>
+              <a:t>8/17/17</a:t>
             </a:fld>
             <a:endParaRPr lang="en-US"/>
           </a:p>
@@ -220,8 +236,8 @@
         </p:nvSpPr>
         <p:spPr>
           <a:xfrm>
-            <a:off x="1143000" y="685800"/>
-            <a:ext cx="4572000" cy="3429000"/>
+            <a:off x="381000" y="685800"/>
+            <a:ext cx="6096000" cy="3429000"/>
           </a:xfrm>
           <a:prstGeom prst="rect">
             <a:avLst/>
@@ -497,7 +513,12 @@
             <p:ph type="sldImg"/>
           </p:nvPr>
         </p:nvSpPr>
-        <p:spPr/>
+        <p:spPr>
+          <a:xfrm>
+            <a:off x="381000" y="685800"/>
+            <a:ext cx="6096000" cy="3429000"/>
+          </a:xfrm>
+        </p:spPr>
       </p:sp>
       <p:sp>
         <p:nvSpPr>
@@ -612,7 +633,12 @@
             <p:ph type="sldImg"/>
           </p:nvPr>
         </p:nvSpPr>
-        <p:spPr/>
+        <p:spPr>
+          <a:xfrm>
+            <a:off x="381000" y="685800"/>
+            <a:ext cx="6096000" cy="3429000"/>
+          </a:xfrm>
+        </p:spPr>
       </p:sp>
       <p:sp>
         <p:nvSpPr>
@@ -696,7 +722,12 @@
             <p:ph type="sldImg"/>
           </p:nvPr>
         </p:nvSpPr>
-        <p:spPr/>
+        <p:spPr>
+          <a:xfrm>
+            <a:off x="381000" y="685800"/>
+            <a:ext cx="6096000" cy="3429000"/>
+          </a:xfrm>
+        </p:spPr>
       </p:sp>
       <p:sp>
         <p:nvSpPr>
@@ -803,7 +834,12 @@
             <p:ph type="sldImg"/>
           </p:nvPr>
         </p:nvSpPr>
-        <p:spPr/>
+        <p:spPr>
+          <a:xfrm>
+            <a:off x="381000" y="685800"/>
+            <a:ext cx="6096000" cy="3429000"/>
+          </a:xfrm>
+        </p:spPr>
       </p:sp>
       <p:sp>
         <p:nvSpPr>
@@ -887,14 +923,14 @@
       </p:grpSpPr>
       <p:sp>
         <p:nvSpPr>
-          <p:cNvPr id="7" name="Rectangle 6"/>
+          <p:cNvPr id="4" name="Rectangle 6"/>
           <p:cNvSpPr/>
           <p:nvPr/>
         </p:nvSpPr>
         <p:spPr bwMode="white">
           <a:xfrm>
-            <a:off x="0" y="5971032"/>
-            <a:ext cx="9144000" cy="886968"/>
+            <a:off x="0" y="5970588"/>
+            <a:ext cx="12192000" cy="887412"/>
           </a:xfrm>
           <a:prstGeom prst="rect">
             <a:avLst/>
@@ -926,21 +962,29 @@
           <a:bodyPr anchor="ctr"/>
           <a:lstStyle/>
           <a:p>
-            <a:pPr algn="ctr" eaLnBrk="1" latinLnBrk="0" hangingPunct="1"/>
-            <a:endParaRPr kumimoji="0" lang="en-US"/>
-          </a:p>
-        </p:txBody>
-      </p:sp>
-      <p:sp>
-        <p:nvSpPr>
-          <p:cNvPr id="10" name="Rectangle 9"/>
+            <a:pPr algn="ctr" fontAlgn="auto">
+              <a:spcBef>
+                <a:spcPts val="0"/>
+              </a:spcBef>
+              <a:spcAft>
+                <a:spcPts val="0"/>
+              </a:spcAft>
+              <a:defRPr/>
+            </a:pPr>
+            <a:endParaRPr lang="en-US" sz="1350" dirty="0"/>
+          </a:p>
+        </p:txBody>
+      </p:sp>
+      <p:sp>
+        <p:nvSpPr>
+          <p:cNvPr id="5" name="Rectangle 9"/>
           <p:cNvSpPr/>
           <p:nvPr/>
         </p:nvSpPr>
         <p:spPr>
           <a:xfrm>
-            <a:off x="-9144" y="6053328"/>
-            <a:ext cx="2249424" cy="713232"/>
+            <a:off x="-12700" y="6053141"/>
+            <a:ext cx="2999317" cy="712787"/>
           </a:xfrm>
           <a:prstGeom prst="rect">
             <a:avLst/>
@@ -974,21 +1018,32 @@
           <a:bodyPr anchor="ctr"/>
           <a:lstStyle/>
           <a:p>
-            <a:pPr algn="ctr" eaLnBrk="1" latinLnBrk="0" hangingPunct="1"/>
-            <a:endParaRPr kumimoji="0" lang="en-US"/>
-          </a:p>
-        </p:txBody>
-      </p:sp>
-      <p:sp>
-        <p:nvSpPr>
-          <p:cNvPr id="11" name="Rectangle 10"/>
+            <a:pPr algn="ctr" fontAlgn="auto">
+              <a:spcBef>
+                <a:spcPts val="0"/>
+              </a:spcBef>
+              <a:spcAft>
+                <a:spcPts val="0"/>
+              </a:spcAft>
+              <a:defRPr/>
+            </a:pPr>
+            <a:endParaRPr lang="en-US" sz="1350" dirty="0">
+              <a:latin typeface="Myriad Pro"/>
+              <a:cs typeface="Myriad Pro"/>
+            </a:endParaRPr>
+          </a:p>
+        </p:txBody>
+      </p:sp>
+      <p:sp>
+        <p:nvSpPr>
+          <p:cNvPr id="6" name="Rectangle 10"/>
           <p:cNvSpPr/>
           <p:nvPr/>
         </p:nvSpPr>
         <p:spPr>
           <a:xfrm>
-            <a:off x="2359152" y="6044184"/>
-            <a:ext cx="6784848" cy="713232"/>
+            <a:off x="3145369" y="6043616"/>
+            <a:ext cx="9046633" cy="714375"/>
           </a:xfrm>
           <a:prstGeom prst="rect">
             <a:avLst/>
@@ -1022,8 +1077,16 @@
           <a:bodyPr anchor="ctr"/>
           <a:lstStyle/>
           <a:p>
-            <a:pPr algn="ctr" eaLnBrk="1" latinLnBrk="0" hangingPunct="1"/>
-            <a:endParaRPr kumimoji="0" lang="en-US"/>
+            <a:pPr algn="ctr" fontAlgn="auto">
+              <a:spcBef>
+                <a:spcPts val="0"/>
+              </a:spcBef>
+              <a:spcAft>
+                <a:spcPts val="0"/>
+              </a:spcAft>
+              <a:defRPr/>
+            </a:pPr>
+            <a:endParaRPr lang="en-US" sz="1350" dirty="0"/>
           </a:p>
         </p:txBody>
       </p:sp>
@@ -1039,23 +1102,23 @@
         </p:nvSpPr>
         <p:spPr>
           <a:xfrm>
-            <a:off x="305210" y="4038600"/>
-            <a:ext cx="8533990" cy="1828800"/>
+            <a:off x="3149600" y="4038600"/>
+            <a:ext cx="8636000" cy="1828800"/>
           </a:xfrm>
         </p:spPr>
         <p:txBody>
           <a:bodyPr anchor="b"/>
           <a:lstStyle>
-            <a:lvl1pPr algn="ctr">
+            <a:lvl1pPr>
               <a:defRPr cap="all" baseline="0"/>
             </a:lvl1pPr>
           </a:lstStyle>
           <a:p>
             <a:r>
-              <a:rPr kumimoji="0" lang="en-US" smtClean="0"/>
+              <a:rPr lang="en-US" smtClean="0"/>
               <a:t>Click to edit Master title style</a:t>
             </a:r>
-            <a:endParaRPr kumimoji="0" lang="en-US" dirty="0"/>
+            <a:endParaRPr lang="en-US" dirty="0"/>
           </a:p>
         </p:txBody>
       </p:sp>
@@ -1071,8 +1134,8 @@
         </p:nvSpPr>
         <p:spPr>
           <a:xfrm>
-            <a:off x="2362200" y="6050037"/>
-            <a:ext cx="6705600" cy="685800"/>
+            <a:off x="3149600" y="6050037"/>
+            <a:ext cx="8940800" cy="685800"/>
           </a:xfrm>
         </p:spPr>
         <p:txBody>
@@ -1082,49 +1145,49 @@
           <a:lstStyle>
             <a:lvl1pPr marL="0" indent="0" algn="l">
               <a:buNone/>
-              <a:defRPr sz="2600">
+              <a:defRPr sz="1950">
                 <a:solidFill>
                   <a:srgbClr val="FFFFFF"/>
                 </a:solidFill>
               </a:defRPr>
             </a:lvl1pPr>
-            <a:lvl2pPr marL="457200" indent="0" algn="ctr">
+            <a:lvl2pPr marL="342900" indent="0" algn="ctr">
               <a:buNone/>
             </a:lvl2pPr>
-            <a:lvl3pPr marL="914400" indent="0" algn="ctr">
+            <a:lvl3pPr marL="685800" indent="0" algn="ctr">
               <a:buNone/>
             </a:lvl3pPr>
-            <a:lvl4pPr marL="1371600" indent="0" algn="ctr">
+            <a:lvl4pPr marL="1028700" indent="0" algn="ctr">
               <a:buNone/>
             </a:lvl4pPr>
-            <a:lvl5pPr marL="1828800" indent="0" algn="ctr">
+            <a:lvl5pPr marL="1371600" indent="0" algn="ctr">
               <a:buNone/>
             </a:lvl5pPr>
-            <a:lvl6pPr marL="2286000" indent="0" algn="ctr">
+            <a:lvl6pPr marL="1714500" indent="0" algn="ctr">
               <a:buNone/>
             </a:lvl6pPr>
-            <a:lvl7pPr marL="2743200" indent="0" algn="ctr">
+            <a:lvl7pPr marL="2057400" indent="0" algn="ctr">
               <a:buNone/>
             </a:lvl7pPr>
-            <a:lvl8pPr marL="3200400" indent="0" algn="ctr">
+            <a:lvl8pPr marL="2400300" indent="0" algn="ctr">
               <a:buNone/>
             </a:lvl8pPr>
-            <a:lvl9pPr marL="3657600" indent="0" algn="ctr">
+            <a:lvl9pPr marL="2743200" indent="0" algn="ctr">
               <a:buNone/>
             </a:lvl9pPr>
           </a:lstStyle>
           <a:p>
             <a:r>
-              <a:rPr kumimoji="0" lang="en-US" smtClean="0"/>
+              <a:rPr lang="en-US" smtClean="0"/>
               <a:t>Click to edit Master subtitle style</a:t>
             </a:r>
-            <a:endParaRPr kumimoji="0" lang="en-US"/>
-          </a:p>
-        </p:txBody>
-      </p:sp>
-      <p:sp>
-        <p:nvSpPr>
-          <p:cNvPr id="28" name="Date Placeholder 27"/>
+            <a:endParaRPr lang="en-US" dirty="0"/>
+          </a:p>
+        </p:txBody>
+      </p:sp>
+      <p:sp>
+        <p:nvSpPr>
+          <p:cNvPr id="7" name="Date Placeholder 27"/>
           <p:cNvSpPr>
             <a:spLocks noGrp="1"/>
           </p:cNvSpPr>
@@ -1134,8 +1197,8 @@
         </p:nvSpPr>
         <p:spPr>
           <a:xfrm>
-            <a:off x="76200" y="6068699"/>
-            <a:ext cx="2057400" cy="685800"/>
+            <a:off x="101600" y="6069013"/>
+            <a:ext cx="2743200" cy="685800"/>
           </a:xfrm>
         </p:spPr>
         <p:txBody>
@@ -1144,7 +1207,7 @@
           </a:bodyPr>
           <a:lstStyle>
             <a:lvl1pPr algn="ctr">
-              <a:defRPr sz="2000">
+              <a:defRPr sz="1500" smtClean="0">
                 <a:solidFill>
                   <a:srgbClr val="FFFFFF"/>
                 </a:solidFill>
@@ -1154,7 +1217,7 @@
           <a:p>
             <a:fld id="{D209C01E-D213-8644-9F4C-5E847F8EF5F9}" type="datetimeFigureOut">
               <a:rPr lang="en-US" smtClean="0"/>
-              <a:t>9/6/16</a:t>
+              <a:t>8/17/17</a:t>
             </a:fld>
             <a:endParaRPr lang="en-US"/>
           </a:p>
@@ -1162,7 +1225,7 @@
       </p:sp>
       <p:sp>
         <p:nvSpPr>
-          <p:cNvPr id="17" name="Footer Placeholder 16"/>
+          <p:cNvPr id="10" name="Footer Placeholder 16"/>
           <p:cNvSpPr>
             <a:spLocks noGrp="1"/>
           </p:cNvSpPr>
@@ -1172,8 +1235,8 @@
         </p:nvSpPr>
         <p:spPr>
           <a:xfrm>
-            <a:off x="2085393" y="236538"/>
-            <a:ext cx="5867400" cy="365125"/>
+            <a:off x="2781300" y="236541"/>
+            <a:ext cx="7823200" cy="365125"/>
           </a:xfrm>
         </p:spPr>
         <p:txBody>
@@ -1192,47 +1255,18 @@
           </a:p>
         </p:txBody>
       </p:sp>
-      <p:sp>
-        <p:nvSpPr>
-          <p:cNvPr id="29" name="Slide Number Placeholder 28"/>
-          <p:cNvSpPr>
-            <a:spLocks noGrp="1"/>
-          </p:cNvSpPr>
-          <p:nvPr>
-            <p:ph type="sldNum" sz="quarter" idx="12"/>
-          </p:nvPr>
-        </p:nvSpPr>
-        <p:spPr>
-          <a:xfrm>
-            <a:off x="8001000" y="228600"/>
-            <a:ext cx="838200" cy="381000"/>
-          </a:xfrm>
-        </p:spPr>
-        <p:txBody>
-          <a:bodyPr/>
-          <a:lstStyle>
-            <a:lvl1pPr>
-              <a:defRPr>
-                <a:solidFill>
-                  <a:schemeClr val="tx2"/>
-                </a:solidFill>
-              </a:defRPr>
-            </a:lvl1pPr>
-          </a:lstStyle>
-          <a:p>
-            <a:fld id="{DBAD749E-B0CA-AD49-9ED0-43F8720927C0}" type="slidenum">
-              <a:rPr lang="en-US" smtClean="0"/>
-              <a:t>‹#›</a:t>
-            </a:fld>
-            <a:endParaRPr lang="en-US"/>
-          </a:p>
-        </p:txBody>
-      </p:sp>
     </p:spTree>
   </p:cSld>
   <p:clrMapOvr>
     <a:masterClrMapping/>
   </p:clrMapOvr>
+  <p:timing>
+    <p:tnLst>
+      <p:par>
+        <p:cTn id="1" dur="indefinite" restart="never" nodeType="tmRoot"/>
+      </p:par>
+    </p:tnLst>
+  </p:timing>
 </p:sldLayout>
 </file>
 
@@ -1269,10 +1303,10 @@
           <a:lstStyle/>
           <a:p>
             <a:r>
-              <a:rPr kumimoji="0" lang="en-US" smtClean="0"/>
+              <a:rPr lang="en-US" smtClean="0"/>
               <a:t>Click to edit Master title style</a:t>
             </a:r>
-            <a:endParaRPr kumimoji="0" lang="en-US"/>
+            <a:endParaRPr lang="en-US"/>
           </a:p>
         </p:txBody>
       </p:sp>
@@ -1291,46 +1325,46 @@
           <a:bodyPr vert="eaVert"/>
           <a:lstStyle/>
           <a:p>
-            <a:pPr lvl="0" eaLnBrk="1" latinLnBrk="0" hangingPunct="1"/>
+            <a:pPr lvl="0"/>
             <a:r>
               <a:rPr lang="en-US" smtClean="0"/>
               <a:t>Click to edit Master text styles</a:t>
             </a:r>
           </a:p>
           <a:p>
-            <a:pPr lvl="1" eaLnBrk="1" latinLnBrk="0" hangingPunct="1"/>
+            <a:pPr lvl="1"/>
             <a:r>
               <a:rPr lang="en-US" smtClean="0"/>
               <a:t>Second level</a:t>
             </a:r>
           </a:p>
           <a:p>
-            <a:pPr lvl="2" eaLnBrk="1" latinLnBrk="0" hangingPunct="1"/>
+            <a:pPr lvl="2"/>
             <a:r>
               <a:rPr lang="en-US" smtClean="0"/>
               <a:t>Third level</a:t>
             </a:r>
           </a:p>
           <a:p>
-            <a:pPr lvl="3" eaLnBrk="1" latinLnBrk="0" hangingPunct="1"/>
+            <a:pPr lvl="3"/>
             <a:r>
               <a:rPr lang="en-US" smtClean="0"/>
               <a:t>Fourth level</a:t>
             </a:r>
           </a:p>
           <a:p>
-            <a:pPr lvl="4" eaLnBrk="1" latinLnBrk="0" hangingPunct="1"/>
+            <a:pPr lvl="4"/>
             <a:r>
               <a:rPr lang="en-US" smtClean="0"/>
               <a:t>Fifth level</a:t>
             </a:r>
-            <a:endParaRPr kumimoji="0" lang="en-US"/>
-          </a:p>
-        </p:txBody>
-      </p:sp>
-      <p:sp>
-        <p:nvSpPr>
-          <p:cNvPr id="4" name="Date Placeholder 3"/>
+            <a:endParaRPr lang="en-US"/>
+          </a:p>
+        </p:txBody>
+      </p:sp>
+      <p:sp>
+        <p:nvSpPr>
+          <p:cNvPr id="4" name="Date Placeholder 13"/>
           <p:cNvSpPr>
             <a:spLocks noGrp="1"/>
           </p:cNvSpPr>
@@ -1341,11 +1375,15 @@
         <p:spPr/>
         <p:txBody>
           <a:bodyPr/>
-          <a:lstStyle/>
+          <a:lstStyle>
+            <a:lvl1pPr>
+              <a:defRPr/>
+            </a:lvl1pPr>
+          </a:lstStyle>
           <a:p>
             <a:fld id="{D209C01E-D213-8644-9F4C-5E847F8EF5F9}" type="datetimeFigureOut">
               <a:rPr lang="en-US" smtClean="0"/>
-              <a:t>9/6/16</a:t>
+              <a:t>8/17/17</a:t>
             </a:fld>
             <a:endParaRPr lang="en-US"/>
           </a:p>
@@ -1353,7 +1391,7 @@
       </p:sp>
       <p:sp>
         <p:nvSpPr>
-          <p:cNvPr id="5" name="Footer Placeholder 4"/>
+          <p:cNvPr id="5" name="Footer Placeholder 2"/>
           <p:cNvSpPr>
             <a:spLocks noGrp="1"/>
           </p:cNvSpPr>
@@ -1364,31 +1402,12 @@
         <p:spPr/>
         <p:txBody>
           <a:bodyPr/>
-          <a:lstStyle/>
-          <a:p>
-            <a:endParaRPr lang="en-US"/>
-          </a:p>
-        </p:txBody>
-      </p:sp>
-      <p:sp>
-        <p:nvSpPr>
-          <p:cNvPr id="6" name="Slide Number Placeholder 5"/>
-          <p:cNvSpPr>
-            <a:spLocks noGrp="1"/>
-          </p:cNvSpPr>
-          <p:nvPr>
-            <p:ph type="sldNum" sz="quarter" idx="12"/>
-          </p:nvPr>
-        </p:nvSpPr>
-        <p:spPr/>
-        <p:txBody>
-          <a:bodyPr/>
-          <a:lstStyle/>
-          <a:p>
-            <a:fld id="{DBAD749E-B0CA-AD49-9ED0-43F8720927C0}" type="slidenum">
-              <a:rPr lang="en-US" smtClean="0"/>
-              <a:t>‹#›</a:t>
-            </a:fld>
+          <a:lstStyle>
+            <a:lvl1pPr>
+              <a:defRPr/>
+            </a:lvl1pPr>
+          </a:lstStyle>
+          <a:p>
             <a:endParaRPr lang="en-US"/>
           </a:p>
         </p:txBody>
@@ -1420,151 +1439,14 @@
       </p:grpSpPr>
       <p:sp>
         <p:nvSpPr>
-          <p:cNvPr id="2" name="Vertical Title 1"/>
-          <p:cNvSpPr>
-            <a:spLocks noGrp="1"/>
-          </p:cNvSpPr>
-          <p:nvPr>
-            <p:ph type="title" orient="vert"/>
-          </p:nvPr>
-        </p:nvSpPr>
-        <p:spPr>
-          <a:xfrm>
-            <a:off x="6553200" y="609600"/>
-            <a:ext cx="2057400" cy="5516563"/>
-          </a:xfrm>
-        </p:spPr>
-        <p:txBody>
-          <a:bodyPr vert="eaVert"/>
-          <a:lstStyle/>
-          <a:p>
-            <a:r>
-              <a:rPr kumimoji="0" lang="en-US" smtClean="0"/>
-              <a:t>Click to edit Master title style</a:t>
-            </a:r>
-            <a:endParaRPr kumimoji="0" lang="en-US"/>
-          </a:p>
-        </p:txBody>
-      </p:sp>
-      <p:sp>
-        <p:nvSpPr>
-          <p:cNvPr id="3" name="Vertical Text Placeholder 2"/>
-          <p:cNvSpPr>
-            <a:spLocks noGrp="1"/>
-          </p:cNvSpPr>
-          <p:nvPr>
-            <p:ph type="body" orient="vert" idx="1"/>
-          </p:nvPr>
-        </p:nvSpPr>
-        <p:spPr>
-          <a:xfrm>
-            <a:off x="457200" y="609600"/>
-            <a:ext cx="5562600" cy="5516564"/>
-          </a:xfrm>
-        </p:spPr>
-        <p:txBody>
-          <a:bodyPr vert="eaVert"/>
-          <a:lstStyle/>
-          <a:p>
-            <a:pPr lvl="0" eaLnBrk="1" latinLnBrk="0" hangingPunct="1"/>
-            <a:r>
-              <a:rPr lang="en-US" smtClean="0"/>
-              <a:t>Click to edit Master text styles</a:t>
-            </a:r>
-          </a:p>
-          <a:p>
-            <a:pPr lvl="1" eaLnBrk="1" latinLnBrk="0" hangingPunct="1"/>
-            <a:r>
-              <a:rPr lang="en-US" smtClean="0"/>
-              <a:t>Second level</a:t>
-            </a:r>
-          </a:p>
-          <a:p>
-            <a:pPr lvl="2" eaLnBrk="1" latinLnBrk="0" hangingPunct="1"/>
-            <a:r>
-              <a:rPr lang="en-US" smtClean="0"/>
-              <a:t>Third level</a:t>
-            </a:r>
-          </a:p>
-          <a:p>
-            <a:pPr lvl="3" eaLnBrk="1" latinLnBrk="0" hangingPunct="1"/>
-            <a:r>
-              <a:rPr lang="en-US" smtClean="0"/>
-              <a:t>Fourth level</a:t>
-            </a:r>
-          </a:p>
-          <a:p>
-            <a:pPr lvl="4" eaLnBrk="1" latinLnBrk="0" hangingPunct="1"/>
-            <a:r>
-              <a:rPr lang="en-US" smtClean="0"/>
-              <a:t>Fifth level</a:t>
-            </a:r>
-            <a:endParaRPr kumimoji="0" lang="en-US"/>
-          </a:p>
-        </p:txBody>
-      </p:sp>
-      <p:sp>
-        <p:nvSpPr>
-          <p:cNvPr id="4" name="Date Placeholder 3"/>
-          <p:cNvSpPr>
-            <a:spLocks noGrp="1"/>
-          </p:cNvSpPr>
-          <p:nvPr>
-            <p:ph type="dt" sz="half" idx="10"/>
-          </p:nvPr>
-        </p:nvSpPr>
-        <p:spPr>
-          <a:xfrm>
-            <a:off x="6553200" y="6248402"/>
-            <a:ext cx="2209800" cy="365125"/>
-          </a:xfrm>
-        </p:spPr>
-        <p:txBody>
-          <a:bodyPr/>
-          <a:lstStyle/>
-          <a:p>
-            <a:fld id="{D209C01E-D213-8644-9F4C-5E847F8EF5F9}" type="datetimeFigureOut">
-              <a:rPr lang="en-US" smtClean="0"/>
-              <a:t>9/6/16</a:t>
-            </a:fld>
-            <a:endParaRPr lang="en-US"/>
-          </a:p>
-        </p:txBody>
-      </p:sp>
-      <p:sp>
-        <p:nvSpPr>
-          <p:cNvPr id="5" name="Footer Placeholder 4"/>
-          <p:cNvSpPr>
-            <a:spLocks noGrp="1"/>
-          </p:cNvSpPr>
-          <p:nvPr>
-            <p:ph type="ftr" sz="quarter" idx="11"/>
-          </p:nvPr>
-        </p:nvSpPr>
-        <p:spPr>
-          <a:xfrm>
-            <a:off x="457201" y="6248207"/>
-            <a:ext cx="5573483" cy="365125"/>
-          </a:xfrm>
-        </p:spPr>
-        <p:txBody>
-          <a:bodyPr/>
-          <a:lstStyle/>
-          <a:p>
-            <a:endParaRPr lang="en-US"/>
-          </a:p>
-        </p:txBody>
-      </p:sp>
-      <p:sp>
-        <p:nvSpPr>
-          <p:cNvPr id="7" name="Rectangle 6"/>
+          <p:cNvPr id="4" name="Rectangle 6"/>
           <p:cNvSpPr/>
           <p:nvPr/>
         </p:nvSpPr>
         <p:spPr bwMode="white">
           <a:xfrm>
-            <a:off x="6096318" y="0"/>
-            <a:ext cx="320040" cy="6858000"/>
+            <a:off x="8128002" y="0"/>
+            <a:ext cx="427567" cy="6858000"/>
           </a:xfrm>
           <a:prstGeom prst="rect">
             <a:avLst/>
@@ -1592,24 +1474,32 @@
           </a:fontRef>
         </p:style>
         <p:txBody>
-          <a:bodyPr rtlCol="0" anchor="ctr"/>
+          <a:bodyPr anchor="ctr"/>
           <a:lstStyle/>
           <a:p>
-            <a:pPr algn="ctr" eaLnBrk="1" latinLnBrk="0" hangingPunct="1"/>
-            <a:endParaRPr kumimoji="0" lang="en-US"/>
-          </a:p>
-        </p:txBody>
-      </p:sp>
-      <p:sp>
-        <p:nvSpPr>
-          <p:cNvPr id="8" name="Rectangle 7"/>
+            <a:pPr algn="ctr" fontAlgn="auto">
+              <a:spcBef>
+                <a:spcPts val="0"/>
+              </a:spcBef>
+              <a:spcAft>
+                <a:spcPts val="0"/>
+              </a:spcAft>
+              <a:defRPr/>
+            </a:pPr>
+            <a:endParaRPr lang="en-US" sz="1350" dirty="0"/>
+          </a:p>
+        </p:txBody>
+      </p:sp>
+      <p:sp>
+        <p:nvSpPr>
+          <p:cNvPr id="5" name="Rectangle 7"/>
           <p:cNvSpPr/>
           <p:nvPr/>
         </p:nvSpPr>
         <p:spPr>
           <a:xfrm>
-            <a:off x="6142038" y="609600"/>
-            <a:ext cx="228600" cy="6248400"/>
+            <a:off x="8189384" y="609600"/>
+            <a:ext cx="304800" cy="6248400"/>
           </a:xfrm>
           <a:prstGeom prst="rect">
             <a:avLst/>
@@ -1637,24 +1527,32 @@
           </a:fontRef>
         </p:style>
         <p:txBody>
-          <a:bodyPr rtlCol="0" anchor="ctr"/>
+          <a:bodyPr anchor="ctr"/>
           <a:lstStyle/>
           <a:p>
-            <a:pPr algn="ctr" eaLnBrk="1" latinLnBrk="0" hangingPunct="1"/>
-            <a:endParaRPr kumimoji="0" lang="en-US"/>
-          </a:p>
-        </p:txBody>
-      </p:sp>
-      <p:sp>
-        <p:nvSpPr>
-          <p:cNvPr id="9" name="Rectangle 8"/>
+            <a:pPr algn="ctr" fontAlgn="auto">
+              <a:spcBef>
+                <a:spcPts val="0"/>
+              </a:spcBef>
+              <a:spcAft>
+                <a:spcPts val="0"/>
+              </a:spcAft>
+              <a:defRPr/>
+            </a:pPr>
+            <a:endParaRPr lang="en-US" sz="1350" dirty="0"/>
+          </a:p>
+        </p:txBody>
+      </p:sp>
+      <p:sp>
+        <p:nvSpPr>
+          <p:cNvPr id="6" name="Rectangle 8"/>
           <p:cNvSpPr/>
           <p:nvPr/>
         </p:nvSpPr>
         <p:spPr>
           <a:xfrm>
-            <a:off x="6142038" y="0"/>
-            <a:ext cx="228600" cy="533400"/>
+            <a:off x="8189384" y="0"/>
+            <a:ext cx="304800" cy="533400"/>
           </a:xfrm>
           <a:prstGeom prst="rect">
             <a:avLst/>
@@ -1682,38 +1580,163 @@
           </a:fontRef>
         </p:style>
         <p:txBody>
-          <a:bodyPr rtlCol="0" anchor="ctr"/>
+          <a:bodyPr anchor="ctr"/>
           <a:lstStyle/>
           <a:p>
-            <a:pPr algn="ctr" eaLnBrk="1" latinLnBrk="0" hangingPunct="1"/>
-            <a:endParaRPr kumimoji="0" lang="en-US"/>
-          </a:p>
-        </p:txBody>
-      </p:sp>
-      <p:sp>
-        <p:nvSpPr>
-          <p:cNvPr id="6" name="Slide Number Placeholder 5"/>
+            <a:pPr algn="ctr" fontAlgn="auto">
+              <a:spcBef>
+                <a:spcPts val="0"/>
+              </a:spcBef>
+              <a:spcAft>
+                <a:spcPts val="0"/>
+              </a:spcAft>
+              <a:defRPr/>
+            </a:pPr>
+            <a:endParaRPr lang="en-US" sz="1350" dirty="0"/>
+          </a:p>
+        </p:txBody>
+      </p:sp>
+      <p:sp>
+        <p:nvSpPr>
+          <p:cNvPr id="2" name="Vertical Title 1"/>
           <p:cNvSpPr>
             <a:spLocks noGrp="1"/>
           </p:cNvSpPr>
           <p:nvPr>
-            <p:ph type="sldNum" sz="quarter" idx="12"/>
+            <p:ph type="title" orient="vert"/>
           </p:nvPr>
         </p:nvSpPr>
         <p:spPr>
-          <a:xfrm rot="5400000">
-            <a:off x="5989638" y="144462"/>
-            <a:ext cx="533400" cy="244476"/>
+          <a:xfrm>
+            <a:off x="8737600" y="609603"/>
+            <a:ext cx="2743200" cy="5516563"/>
           </a:xfrm>
         </p:spPr>
         <p:txBody>
+          <a:bodyPr vert="eaVert"/>
+          <a:lstStyle/>
+          <a:p>
+            <a:r>
+              <a:rPr lang="en-US" smtClean="0"/>
+              <a:t>Click to edit Master title style</a:t>
+            </a:r>
+            <a:endParaRPr lang="en-US"/>
+          </a:p>
+        </p:txBody>
+      </p:sp>
+      <p:sp>
+        <p:nvSpPr>
+          <p:cNvPr id="3" name="Vertical Text Placeholder 2"/>
+          <p:cNvSpPr>
+            <a:spLocks noGrp="1"/>
+          </p:cNvSpPr>
+          <p:nvPr>
+            <p:ph type="body" orient="vert" idx="1"/>
+          </p:nvPr>
+        </p:nvSpPr>
+        <p:spPr>
+          <a:xfrm>
+            <a:off x="609600" y="609600"/>
+            <a:ext cx="7416800" cy="5516564"/>
+          </a:xfrm>
+        </p:spPr>
+        <p:txBody>
+          <a:bodyPr vert="eaVert"/>
+          <a:lstStyle/>
+          <a:p>
+            <a:pPr lvl="0"/>
+            <a:r>
+              <a:rPr lang="en-US" smtClean="0"/>
+              <a:t>Click to edit Master text styles</a:t>
+            </a:r>
+          </a:p>
+          <a:p>
+            <a:pPr lvl="1"/>
+            <a:r>
+              <a:rPr lang="en-US" smtClean="0"/>
+              <a:t>Second level</a:t>
+            </a:r>
+          </a:p>
+          <a:p>
+            <a:pPr lvl="2"/>
+            <a:r>
+              <a:rPr lang="en-US" smtClean="0"/>
+              <a:t>Third level</a:t>
+            </a:r>
+          </a:p>
+          <a:p>
+            <a:pPr lvl="3"/>
+            <a:r>
+              <a:rPr lang="en-US" smtClean="0"/>
+              <a:t>Fourth level</a:t>
+            </a:r>
+          </a:p>
+          <a:p>
+            <a:pPr lvl="4"/>
+            <a:r>
+              <a:rPr lang="en-US" smtClean="0"/>
+              <a:t>Fifth level</a:t>
+            </a:r>
+            <a:endParaRPr lang="en-US"/>
+          </a:p>
+        </p:txBody>
+      </p:sp>
+      <p:sp>
+        <p:nvSpPr>
+          <p:cNvPr id="7" name="Date Placeholder 3"/>
+          <p:cNvSpPr>
+            <a:spLocks noGrp="1"/>
+          </p:cNvSpPr>
+          <p:nvPr>
+            <p:ph type="dt" sz="half" idx="10"/>
+          </p:nvPr>
+        </p:nvSpPr>
+        <p:spPr>
+          <a:xfrm>
+            <a:off x="8737600" y="6248403"/>
+            <a:ext cx="2946400" cy="365125"/>
+          </a:xfrm>
+        </p:spPr>
+        <p:txBody>
           <a:bodyPr/>
-          <a:lstStyle/>
-          <a:p>
-            <a:fld id="{DBAD749E-B0CA-AD49-9ED0-43F8720927C0}" type="slidenum">
+          <a:lstStyle>
+            <a:lvl1pPr>
+              <a:defRPr/>
+            </a:lvl1pPr>
+          </a:lstStyle>
+          <a:p>
+            <a:fld id="{D209C01E-D213-8644-9F4C-5E847F8EF5F9}" type="datetimeFigureOut">
               <a:rPr lang="en-US" smtClean="0"/>
-              <a:t>‹#›</a:t>
+              <a:t>8/17/17</a:t>
             </a:fld>
+            <a:endParaRPr lang="en-US"/>
+          </a:p>
+        </p:txBody>
+      </p:sp>
+      <p:sp>
+        <p:nvSpPr>
+          <p:cNvPr id="8" name="Footer Placeholder 4"/>
+          <p:cNvSpPr>
+            <a:spLocks noGrp="1"/>
+          </p:cNvSpPr>
+          <p:nvPr>
+            <p:ph type="ftr" sz="quarter" idx="11"/>
+          </p:nvPr>
+        </p:nvSpPr>
+        <p:spPr>
+          <a:xfrm>
+            <a:off x="609602" y="6248403"/>
+            <a:ext cx="7431617" cy="365125"/>
+          </a:xfrm>
+        </p:spPr>
+        <p:txBody>
+          <a:bodyPr/>
+          <a:lstStyle>
+            <a:lvl1pPr>
+              <a:defRPr/>
+            </a:lvl1pPr>
+          </a:lstStyle>
+          <a:p>
             <a:endParaRPr lang="en-US"/>
           </a:p>
         </p:txBody>
@@ -1723,6 +1746,13 @@
   <p:clrMapOvr>
     <a:masterClrMapping/>
   </p:clrMapOvr>
+  <p:timing>
+    <p:tnLst>
+      <p:par>
+        <p:cTn id="1" dur="indefinite" restart="never" nodeType="tmRoot"/>
+      </p:par>
+    </p:tnLst>
+  </p:timing>
 </p:sldLayout>
 </file>
 
@@ -1755,92 +1785,27 @@
         </p:nvSpPr>
         <p:spPr>
           <a:xfrm>
-            <a:off x="612648" y="228600"/>
-            <a:ext cx="8153400" cy="990600"/>
+            <a:off x="816864" y="228600"/>
+            <a:ext cx="10871200" cy="990600"/>
           </a:xfrm>
         </p:spPr>
-        <p:txBody>
-          <a:bodyPr/>
-          <a:lstStyle/>
-          <a:p>
-            <a:r>
-              <a:rPr kumimoji="0" lang="en-US" smtClean="0"/>
-              <a:t>Click to edit Master title style</a:t>
-            </a:r>
-            <a:endParaRPr kumimoji="0" lang="en-US" dirty="0"/>
-          </a:p>
-        </p:txBody>
-      </p:sp>
-      <p:sp>
-        <p:nvSpPr>
-          <p:cNvPr id="4" name="Date Placeholder 3"/>
-          <p:cNvSpPr>
-            <a:spLocks noGrp="1"/>
-          </p:cNvSpPr>
-          <p:nvPr>
-            <p:ph type="dt" sz="half" idx="10"/>
-          </p:nvPr>
-        </p:nvSpPr>
-        <p:spPr/>
-        <p:txBody>
-          <a:bodyPr/>
-          <a:lstStyle/>
-          <a:p>
-            <a:fld id="{D209C01E-D213-8644-9F4C-5E847F8EF5F9}" type="datetimeFigureOut">
-              <a:rPr lang="en-US" smtClean="0"/>
-              <a:t>9/6/16</a:t>
-            </a:fld>
-            <a:endParaRPr lang="en-US"/>
-          </a:p>
-        </p:txBody>
-      </p:sp>
-      <p:sp>
-        <p:nvSpPr>
-          <p:cNvPr id="5" name="Footer Placeholder 4"/>
-          <p:cNvSpPr>
-            <a:spLocks noGrp="1"/>
-          </p:cNvSpPr>
-          <p:nvPr>
-            <p:ph type="ftr" sz="quarter" idx="11"/>
-          </p:nvPr>
-        </p:nvSpPr>
-        <p:spPr/>
-        <p:txBody>
-          <a:bodyPr/>
-          <a:lstStyle/>
-          <a:p>
-            <a:endParaRPr lang="en-US"/>
-          </a:p>
-        </p:txBody>
-      </p:sp>
-      <p:sp>
-        <p:nvSpPr>
-          <p:cNvPr id="6" name="Slide Number Placeholder 5"/>
-          <p:cNvSpPr>
-            <a:spLocks noGrp="1"/>
-          </p:cNvSpPr>
-          <p:nvPr>
-            <p:ph type="sldNum" sz="quarter" idx="12"/>
-          </p:nvPr>
-        </p:nvSpPr>
-        <p:spPr/>
         <p:txBody>
           <a:bodyPr/>
           <a:lstStyle>
             <a:lvl1pPr>
-              <a:defRPr>
-                <a:solidFill>
-                  <a:srgbClr val="FFFFFF"/>
-                </a:solidFill>
+              <a:defRPr b="0" i="0">
+                <a:latin typeface="Helvetica Neue Light" charset="0"/>
+                <a:ea typeface="Helvetica Neue Light" charset="0"/>
+                <a:cs typeface="Helvetica Neue Light" charset="0"/>
               </a:defRPr>
             </a:lvl1pPr>
           </a:lstStyle>
           <a:p>
-            <a:fld id="{DBAD749E-B0CA-AD49-9ED0-43F8720927C0}" type="slidenum">
+            <a:r>
               <a:rPr lang="en-US" smtClean="0"/>
-              <a:t>‹#›</a:t>
-            </a:fld>
-            <a:endParaRPr lang="en-US"/>
+              <a:t>Click to edit Master title style</a:t>
+            </a:r>
+            <a:endParaRPr lang="en-US" dirty="0"/>
           </a:p>
         </p:txBody>
       </p:sp>
@@ -1856,48 +1821,134 @@
         </p:nvSpPr>
         <p:spPr>
           <a:xfrm>
-            <a:off x="612648" y="1600200"/>
-            <a:ext cx="8153400" cy="4495800"/>
+            <a:off x="816864" y="1600200"/>
+            <a:ext cx="10871200" cy="4495800"/>
           </a:xfrm>
         </p:spPr>
         <p:txBody>
           <a:bodyPr/>
-          <a:lstStyle/>
-          <a:p>
-            <a:pPr lvl="0" eaLnBrk="1" latinLnBrk="0" hangingPunct="1"/>
+          <a:lstStyle>
+            <a:lvl1pPr>
+              <a:defRPr b="0" i="0">
+                <a:latin typeface="Helvetica Neue Light" charset="0"/>
+                <a:ea typeface="Helvetica Neue Light" charset="0"/>
+                <a:cs typeface="Helvetica Neue Light" charset="0"/>
+              </a:defRPr>
+            </a:lvl1pPr>
+            <a:lvl2pPr>
+              <a:defRPr b="0" i="0">
+                <a:latin typeface="Helvetica Neue Light" charset="0"/>
+                <a:ea typeface="Helvetica Neue Light" charset="0"/>
+                <a:cs typeface="Helvetica Neue Light" charset="0"/>
+              </a:defRPr>
+            </a:lvl2pPr>
+            <a:lvl3pPr>
+              <a:defRPr b="0" i="0">
+                <a:latin typeface="Helvetica Neue Light" charset="0"/>
+                <a:ea typeface="Helvetica Neue Light" charset="0"/>
+                <a:cs typeface="Helvetica Neue Light" charset="0"/>
+              </a:defRPr>
+            </a:lvl3pPr>
+            <a:lvl4pPr>
+              <a:defRPr b="0" i="0">
+                <a:latin typeface="Helvetica Neue Light" charset="0"/>
+                <a:ea typeface="Helvetica Neue Light" charset="0"/>
+                <a:cs typeface="Helvetica Neue Light" charset="0"/>
+              </a:defRPr>
+            </a:lvl4pPr>
+            <a:lvl5pPr>
+              <a:defRPr b="0" i="0">
+                <a:latin typeface="Helvetica Neue Light" charset="0"/>
+                <a:ea typeface="Helvetica Neue Light" charset="0"/>
+                <a:cs typeface="Helvetica Neue Light" charset="0"/>
+              </a:defRPr>
+            </a:lvl5pPr>
+          </a:lstStyle>
+          <a:p>
+            <a:pPr lvl="0"/>
             <a:r>
               <a:rPr lang="en-US" smtClean="0"/>
               <a:t>Click to edit Master text styles</a:t>
             </a:r>
           </a:p>
           <a:p>
-            <a:pPr lvl="1" eaLnBrk="1" latinLnBrk="0" hangingPunct="1"/>
+            <a:pPr lvl="1"/>
             <a:r>
               <a:rPr lang="en-US" smtClean="0"/>
               <a:t>Second level</a:t>
             </a:r>
           </a:p>
           <a:p>
-            <a:pPr lvl="2" eaLnBrk="1" latinLnBrk="0" hangingPunct="1"/>
+            <a:pPr lvl="2"/>
             <a:r>
               <a:rPr lang="en-US" smtClean="0"/>
               <a:t>Third level</a:t>
             </a:r>
           </a:p>
           <a:p>
-            <a:pPr lvl="3" eaLnBrk="1" latinLnBrk="0" hangingPunct="1"/>
+            <a:pPr lvl="3"/>
             <a:r>
               <a:rPr lang="en-US" smtClean="0"/>
               <a:t>Fourth level</a:t>
             </a:r>
           </a:p>
           <a:p>
-            <a:pPr lvl="4" eaLnBrk="1" latinLnBrk="0" hangingPunct="1"/>
+            <a:pPr lvl="4"/>
             <a:r>
               <a:rPr lang="en-US" smtClean="0"/>
               <a:t>Fifth level</a:t>
             </a:r>
-            <a:endParaRPr kumimoji="0" lang="en-US"/>
+            <a:endParaRPr lang="en-US" dirty="0"/>
+          </a:p>
+        </p:txBody>
+      </p:sp>
+      <p:sp>
+        <p:nvSpPr>
+          <p:cNvPr id="4" name="Date Placeholder 13"/>
+          <p:cNvSpPr>
+            <a:spLocks noGrp="1"/>
+          </p:cNvSpPr>
+          <p:nvPr>
+            <p:ph type="dt" sz="half" idx="10"/>
+          </p:nvPr>
+        </p:nvSpPr>
+        <p:spPr/>
+        <p:txBody>
+          <a:bodyPr/>
+          <a:lstStyle>
+            <a:lvl1pPr>
+              <a:defRPr/>
+            </a:lvl1pPr>
+          </a:lstStyle>
+          <a:p>
+            <a:fld id="{D209C01E-D213-8644-9F4C-5E847F8EF5F9}" type="datetimeFigureOut">
+              <a:rPr lang="en-US" smtClean="0"/>
+              <a:t>8/17/17</a:t>
+            </a:fld>
+            <a:endParaRPr lang="en-US"/>
+          </a:p>
+        </p:txBody>
+      </p:sp>
+      <p:sp>
+        <p:nvSpPr>
+          <p:cNvPr id="5" name="Footer Placeholder 2"/>
+          <p:cNvSpPr>
+            <a:spLocks noGrp="1"/>
+          </p:cNvSpPr>
+          <p:nvPr>
+            <p:ph type="ftr" sz="quarter" idx="11"/>
+          </p:nvPr>
+        </p:nvSpPr>
+        <p:spPr/>
+        <p:txBody>
+          <a:bodyPr/>
+          <a:lstStyle>
+            <a:lvl1pPr>
+              <a:defRPr/>
+            </a:lvl1pPr>
+          </a:lstStyle>
+          <a:p>
+            <a:endParaRPr lang="en-US"/>
           </a:p>
         </p:txBody>
       </p:sp>
@@ -1928,91 +1979,14 @@
       </p:grpSpPr>
       <p:sp>
         <p:nvSpPr>
-          <p:cNvPr id="3" name="Text Placeholder 2"/>
-          <p:cNvSpPr>
-            <a:spLocks noGrp="1"/>
-          </p:cNvSpPr>
-          <p:nvPr>
-            <p:ph type="body" idx="1"/>
-          </p:nvPr>
-        </p:nvSpPr>
-        <p:spPr>
-          <a:xfrm>
-            <a:off x="1371600" y="2743200"/>
-            <a:ext cx="7123113" cy="1673225"/>
-          </a:xfrm>
-        </p:spPr>
-        <p:txBody>
-          <a:bodyPr anchor="t"/>
-          <a:lstStyle>
-            <a:lvl1pPr marL="0" indent="0">
-              <a:buNone/>
-              <a:defRPr sz="2800">
-                <a:solidFill>
-                  <a:schemeClr val="tx2"/>
-                </a:solidFill>
-              </a:defRPr>
-            </a:lvl1pPr>
-            <a:lvl2pPr>
-              <a:buNone/>
-              <a:defRPr sz="1800">
-                <a:solidFill>
-                  <a:schemeClr val="tx1">
-                    <a:tint val="75000"/>
-                  </a:schemeClr>
-                </a:solidFill>
-              </a:defRPr>
-            </a:lvl2pPr>
-            <a:lvl3pPr>
-              <a:buNone/>
-              <a:defRPr sz="1600">
-                <a:solidFill>
-                  <a:schemeClr val="tx1">
-                    <a:tint val="75000"/>
-                  </a:schemeClr>
-                </a:solidFill>
-              </a:defRPr>
-            </a:lvl3pPr>
-            <a:lvl4pPr>
-              <a:buNone/>
-              <a:defRPr sz="1400">
-                <a:solidFill>
-                  <a:schemeClr val="tx1">
-                    <a:tint val="75000"/>
-                  </a:schemeClr>
-                </a:solidFill>
-              </a:defRPr>
-            </a:lvl4pPr>
-            <a:lvl5pPr>
-              <a:buNone/>
-              <a:defRPr sz="1400">
-                <a:solidFill>
-                  <a:schemeClr val="tx1">
-                    <a:tint val="75000"/>
-                  </a:schemeClr>
-                </a:solidFill>
-              </a:defRPr>
-            </a:lvl5pPr>
-          </a:lstStyle>
-          <a:p>
-            <a:pPr lvl="0" eaLnBrk="1" latinLnBrk="0" hangingPunct="1"/>
-            <a:r>
-              <a:rPr kumimoji="0" lang="en-US" smtClean="0"/>
-              <a:t>Click to edit Master text styles</a:t>
-            </a:r>
-          </a:p>
-        </p:txBody>
-      </p:sp>
-      <p:sp>
-        <p:nvSpPr>
-          <p:cNvPr id="7" name="Rectangle 6"/>
+          <p:cNvPr id="4" name="Rectangle 6"/>
           <p:cNvSpPr/>
           <p:nvPr/>
         </p:nvSpPr>
         <p:spPr bwMode="white">
           <a:xfrm>
             <a:off x="0" y="1524000"/>
-            <a:ext cx="9144000" cy="1143000"/>
+            <a:ext cx="12192000" cy="1143000"/>
           </a:xfrm>
           <a:prstGeom prst="rect">
             <a:avLst/>
@@ -2044,21 +2018,29 @@
           <a:bodyPr anchor="ctr"/>
           <a:lstStyle/>
           <a:p>
-            <a:pPr algn="ctr" eaLnBrk="1" latinLnBrk="0" hangingPunct="1"/>
-            <a:endParaRPr kumimoji="0" lang="en-US"/>
-          </a:p>
-        </p:txBody>
-      </p:sp>
-      <p:sp>
-        <p:nvSpPr>
-          <p:cNvPr id="8" name="Rectangle 7"/>
+            <a:pPr algn="ctr" fontAlgn="auto">
+              <a:spcBef>
+                <a:spcPts val="0"/>
+              </a:spcBef>
+              <a:spcAft>
+                <a:spcPts val="0"/>
+              </a:spcAft>
+              <a:defRPr/>
+            </a:pPr>
+            <a:endParaRPr lang="en-US" sz="1350" dirty="0"/>
+          </a:p>
+        </p:txBody>
+      </p:sp>
+      <p:sp>
+        <p:nvSpPr>
+          <p:cNvPr id="5" name="Rectangle 7"/>
           <p:cNvSpPr/>
           <p:nvPr/>
         </p:nvSpPr>
         <p:spPr>
           <a:xfrm>
             <a:off x="0" y="1600200"/>
-            <a:ext cx="1295400" cy="990600"/>
+            <a:ext cx="1727200" cy="990600"/>
           </a:xfrm>
           <a:prstGeom prst="rect">
             <a:avLst/>
@@ -2092,21 +2074,29 @@
           <a:bodyPr anchor="ctr"/>
           <a:lstStyle/>
           <a:p>
-            <a:pPr algn="ctr" eaLnBrk="1" latinLnBrk="0" hangingPunct="1"/>
-            <a:endParaRPr kumimoji="0" lang="en-US"/>
-          </a:p>
-        </p:txBody>
-      </p:sp>
-      <p:sp>
-        <p:nvSpPr>
-          <p:cNvPr id="9" name="Rectangle 8"/>
+            <a:pPr algn="ctr" fontAlgn="auto">
+              <a:spcBef>
+                <a:spcPts val="0"/>
+              </a:spcBef>
+              <a:spcAft>
+                <a:spcPts val="0"/>
+              </a:spcAft>
+              <a:defRPr/>
+            </a:pPr>
+            <a:endParaRPr lang="en-US" sz="1350" dirty="0"/>
+          </a:p>
+        </p:txBody>
+      </p:sp>
+      <p:sp>
+        <p:nvSpPr>
+          <p:cNvPr id="6" name="Rectangle 8"/>
           <p:cNvSpPr/>
           <p:nvPr/>
         </p:nvSpPr>
         <p:spPr>
           <a:xfrm>
-            <a:off x="1371600" y="1600200"/>
-            <a:ext cx="7772400" cy="990600"/>
+            <a:off x="1828800" y="1600200"/>
+            <a:ext cx="10363200" cy="990600"/>
           </a:xfrm>
           <a:prstGeom prst="rect">
             <a:avLst/>
@@ -2140,8 +2130,93 @@
           <a:bodyPr anchor="ctr"/>
           <a:lstStyle/>
           <a:p>
-            <a:pPr algn="ctr" eaLnBrk="1" latinLnBrk="0" hangingPunct="1"/>
-            <a:endParaRPr kumimoji="0" lang="en-US"/>
+            <a:pPr algn="ctr" fontAlgn="auto">
+              <a:spcBef>
+                <a:spcPts val="0"/>
+              </a:spcBef>
+              <a:spcAft>
+                <a:spcPts val="0"/>
+              </a:spcAft>
+              <a:defRPr/>
+            </a:pPr>
+            <a:endParaRPr lang="en-US" sz="1350" dirty="0"/>
+          </a:p>
+        </p:txBody>
+      </p:sp>
+      <p:sp>
+        <p:nvSpPr>
+          <p:cNvPr id="3" name="Text Placeholder 2"/>
+          <p:cNvSpPr>
+            <a:spLocks noGrp="1"/>
+          </p:cNvSpPr>
+          <p:nvPr>
+            <p:ph type="body" idx="1"/>
+          </p:nvPr>
+        </p:nvSpPr>
+        <p:spPr>
+          <a:xfrm>
+            <a:off x="1828802" y="2743200"/>
+            <a:ext cx="9497484" cy="1673225"/>
+          </a:xfrm>
+        </p:spPr>
+        <p:txBody>
+          <a:bodyPr/>
+          <a:lstStyle>
+            <a:lvl1pPr marL="0" indent="0">
+              <a:buNone/>
+              <a:defRPr sz="2100">
+                <a:solidFill>
+                  <a:schemeClr val="tx2"/>
+                </a:solidFill>
+              </a:defRPr>
+            </a:lvl1pPr>
+            <a:lvl2pPr>
+              <a:buNone/>
+              <a:defRPr sz="1350">
+                <a:solidFill>
+                  <a:schemeClr val="tx1">
+                    <a:tint val="75000"/>
+                  </a:schemeClr>
+                </a:solidFill>
+              </a:defRPr>
+            </a:lvl2pPr>
+            <a:lvl3pPr>
+              <a:buNone/>
+              <a:defRPr sz="1200">
+                <a:solidFill>
+                  <a:schemeClr val="tx1">
+                    <a:tint val="75000"/>
+                  </a:schemeClr>
+                </a:solidFill>
+              </a:defRPr>
+            </a:lvl3pPr>
+            <a:lvl4pPr>
+              <a:buNone/>
+              <a:defRPr sz="1050">
+                <a:solidFill>
+                  <a:schemeClr val="tx1">
+                    <a:tint val="75000"/>
+                  </a:schemeClr>
+                </a:solidFill>
+              </a:defRPr>
+            </a:lvl4pPr>
+            <a:lvl5pPr>
+              <a:buNone/>
+              <a:defRPr sz="1050">
+                <a:solidFill>
+                  <a:schemeClr val="tx1">
+                    <a:tint val="75000"/>
+                  </a:schemeClr>
+                </a:solidFill>
+              </a:defRPr>
+            </a:lvl5pPr>
+          </a:lstStyle>
+          <a:p>
+            <a:pPr lvl="0"/>
+            <a:r>
+              <a:rPr lang="en-US" smtClean="0"/>
+              <a:t>Click to edit Master text styles</a:t>
+            </a:r>
           </a:p>
         </p:txBody>
       </p:sp>
@@ -2157,8 +2232,8 @@
         </p:nvSpPr>
         <p:spPr>
           <a:xfrm>
-            <a:off x="1371600" y="1600200"/>
-            <a:ext cx="7620000" cy="990600"/>
+            <a:off x="1828800" y="1600200"/>
+            <a:ext cx="10160000" cy="990600"/>
           </a:xfrm>
         </p:spPr>
         <p:txBody>
@@ -2166,7 +2241,7 @@
           <a:lstStyle>
             <a:lvl1pPr algn="l">
               <a:buNone/>
-              <a:defRPr sz="4400" b="0" cap="none">
+              <a:defRPr sz="3300" b="0" cap="none">
                 <a:solidFill>
                   <a:srgbClr val="FFFFFF"/>
                 </a:solidFill>
@@ -2175,16 +2250,16 @@
           </a:lstStyle>
           <a:p>
             <a:r>
-              <a:rPr kumimoji="0" lang="en-US" smtClean="0"/>
+              <a:rPr lang="en-US" smtClean="0"/>
               <a:t>Click to edit Master title style</a:t>
             </a:r>
-            <a:endParaRPr kumimoji="0" lang="en-US"/>
-          </a:p>
-        </p:txBody>
-      </p:sp>
-      <p:sp>
-        <p:nvSpPr>
-          <p:cNvPr id="12" name="Date Placeholder 11"/>
+            <a:endParaRPr lang="en-US" dirty="0"/>
+          </a:p>
+        </p:txBody>
+      </p:sp>
+      <p:sp>
+        <p:nvSpPr>
+          <p:cNvPr id="7" name="Date Placeholder 11"/>
           <p:cNvSpPr>
             <a:spLocks noGrp="1"/>
           </p:cNvSpPr>
@@ -2195,11 +2270,15 @@
         <p:spPr/>
         <p:txBody>
           <a:bodyPr/>
-          <a:lstStyle/>
+          <a:lstStyle>
+            <a:lvl1pPr>
+              <a:defRPr/>
+            </a:lvl1pPr>
+          </a:lstStyle>
           <a:p>
             <a:fld id="{D209C01E-D213-8644-9F4C-5E847F8EF5F9}" type="datetimeFigureOut">
               <a:rPr lang="en-US" smtClean="0"/>
-              <a:t>9/6/16</a:t>
+              <a:t>8/17/17</a:t>
             </a:fld>
             <a:endParaRPr lang="en-US"/>
           </a:p>
@@ -2207,45 +2286,7 @@
       </p:sp>
       <p:sp>
         <p:nvSpPr>
-          <p:cNvPr id="13" name="Slide Number Placeholder 12"/>
-          <p:cNvSpPr>
-            <a:spLocks noGrp="1"/>
-          </p:cNvSpPr>
-          <p:nvPr>
-            <p:ph type="sldNum" sz="quarter" idx="11"/>
-          </p:nvPr>
-        </p:nvSpPr>
-        <p:spPr>
-          <a:xfrm>
-            <a:off x="0" y="1752600"/>
-            <a:ext cx="1295400" cy="701676"/>
-          </a:xfrm>
-        </p:spPr>
-        <p:txBody>
-          <a:bodyPr>
-            <a:noAutofit/>
-          </a:bodyPr>
-          <a:lstStyle>
-            <a:lvl1pPr>
-              <a:defRPr sz="2400">
-                <a:solidFill>
-                  <a:srgbClr val="FFFFFF"/>
-                </a:solidFill>
-              </a:defRPr>
-            </a:lvl1pPr>
-          </a:lstStyle>
-          <a:p>
-            <a:fld id="{DBAD749E-B0CA-AD49-9ED0-43F8720927C0}" type="slidenum">
-              <a:rPr lang="en-US" smtClean="0"/>
-              <a:t>‹#›</a:t>
-            </a:fld>
-            <a:endParaRPr lang="en-US"/>
-          </a:p>
-        </p:txBody>
-      </p:sp>
-      <p:sp>
-        <p:nvSpPr>
-          <p:cNvPr id="14" name="Footer Placeholder 13"/>
+          <p:cNvPr id="9" name="Footer Placeholder 13"/>
           <p:cNvSpPr>
             <a:spLocks noGrp="1"/>
           </p:cNvSpPr>
@@ -2256,7 +2297,11 @@
         <p:spPr/>
         <p:txBody>
           <a:bodyPr/>
-          <a:lstStyle/>
+          <a:lstStyle>
+            <a:lvl1pPr>
+              <a:defRPr/>
+            </a:lvl1pPr>
+          </a:lstStyle>
           <a:p>
             <a:endParaRPr lang="en-US"/>
           </a:p>
@@ -2300,13 +2345,21 @@
         <p:spPr/>
         <p:txBody>
           <a:bodyPr/>
-          <a:lstStyle/>
-          <a:p>
-            <a:r>
-              <a:rPr kumimoji="0" lang="en-US" smtClean="0"/>
+          <a:lstStyle>
+            <a:lvl1pPr>
+              <a:defRPr b="0" i="0">
+                <a:latin typeface="Helvetica Neue Light" charset="0"/>
+                <a:ea typeface="Helvetica Neue Light" charset="0"/>
+                <a:cs typeface="Helvetica Neue Light" charset="0"/>
+              </a:defRPr>
+            </a:lvl1pPr>
+          </a:lstStyle>
+          <a:p>
+            <a:r>
+              <a:rPr lang="en-US" smtClean="0"/>
               <a:t>Click to edit Master title style</a:t>
             </a:r>
-            <a:endParaRPr kumimoji="0" lang="en-US"/>
+            <a:endParaRPr lang="en-US" dirty="0"/>
           </a:p>
         </p:txBody>
       </p:sp>
@@ -2322,48 +2375,84 @@
         </p:nvSpPr>
         <p:spPr>
           <a:xfrm>
-            <a:off x="609600" y="1589567"/>
-            <a:ext cx="3886200" cy="4572000"/>
+            <a:off x="812800" y="1589567"/>
+            <a:ext cx="5181600" cy="4572000"/>
           </a:xfrm>
         </p:spPr>
         <p:txBody>
           <a:bodyPr/>
-          <a:lstStyle/>
-          <a:p>
-            <a:pPr lvl="0" eaLnBrk="1" latinLnBrk="0" hangingPunct="1"/>
+          <a:lstStyle>
+            <a:lvl1pPr>
+              <a:defRPr b="0" i="0">
+                <a:latin typeface="Helvetica Neue Light" charset="0"/>
+                <a:ea typeface="Helvetica Neue Light" charset="0"/>
+                <a:cs typeface="Helvetica Neue Light" charset="0"/>
+              </a:defRPr>
+            </a:lvl1pPr>
+            <a:lvl2pPr>
+              <a:defRPr b="0" i="0">
+                <a:latin typeface="Helvetica Neue Light" charset="0"/>
+                <a:ea typeface="Helvetica Neue Light" charset="0"/>
+                <a:cs typeface="Helvetica Neue Light" charset="0"/>
+              </a:defRPr>
+            </a:lvl2pPr>
+            <a:lvl3pPr>
+              <a:defRPr b="0" i="0">
+                <a:latin typeface="Helvetica Neue Light" charset="0"/>
+                <a:ea typeface="Helvetica Neue Light" charset="0"/>
+                <a:cs typeface="Helvetica Neue Light" charset="0"/>
+              </a:defRPr>
+            </a:lvl3pPr>
+            <a:lvl4pPr>
+              <a:defRPr b="0" i="0">
+                <a:latin typeface="Helvetica Neue Light" charset="0"/>
+                <a:ea typeface="Helvetica Neue Light" charset="0"/>
+                <a:cs typeface="Helvetica Neue Light" charset="0"/>
+              </a:defRPr>
+            </a:lvl4pPr>
+            <a:lvl5pPr>
+              <a:defRPr b="0" i="0">
+                <a:latin typeface="Helvetica Neue Light" charset="0"/>
+                <a:ea typeface="Helvetica Neue Light" charset="0"/>
+                <a:cs typeface="Helvetica Neue Light" charset="0"/>
+              </a:defRPr>
+            </a:lvl5pPr>
+          </a:lstStyle>
+          <a:p>
+            <a:pPr lvl="0"/>
             <a:r>
               <a:rPr lang="en-US" smtClean="0"/>
               <a:t>Click to edit Master text styles</a:t>
             </a:r>
           </a:p>
           <a:p>
-            <a:pPr lvl="1" eaLnBrk="1" latinLnBrk="0" hangingPunct="1"/>
+            <a:pPr lvl="1"/>
             <a:r>
               <a:rPr lang="en-US" smtClean="0"/>
               <a:t>Second level</a:t>
             </a:r>
           </a:p>
           <a:p>
-            <a:pPr lvl="2" eaLnBrk="1" latinLnBrk="0" hangingPunct="1"/>
+            <a:pPr lvl="2"/>
             <a:r>
               <a:rPr lang="en-US" smtClean="0"/>
               <a:t>Third level</a:t>
             </a:r>
           </a:p>
           <a:p>
-            <a:pPr lvl="3" eaLnBrk="1" latinLnBrk="0" hangingPunct="1"/>
+            <a:pPr lvl="3"/>
             <a:r>
               <a:rPr lang="en-US" smtClean="0"/>
               <a:t>Fourth level</a:t>
             </a:r>
           </a:p>
           <a:p>
-            <a:pPr lvl="4" eaLnBrk="1" latinLnBrk="0" hangingPunct="1"/>
+            <a:pPr lvl="4"/>
             <a:r>
               <a:rPr lang="en-US" smtClean="0"/>
               <a:t>Fifth level</a:t>
             </a:r>
-            <a:endParaRPr kumimoji="0" lang="en-US"/>
+            <a:endParaRPr lang="en-US" dirty="0"/>
           </a:p>
         </p:txBody>
       </p:sp>
@@ -2379,69 +2468,109 @@
         </p:nvSpPr>
         <p:spPr>
           <a:xfrm>
-            <a:off x="4844901" y="1589567"/>
-            <a:ext cx="3886200" cy="4572000"/>
+            <a:off x="6459868" y="1589567"/>
+            <a:ext cx="5181600" cy="4572000"/>
           </a:xfrm>
         </p:spPr>
         <p:txBody>
           <a:bodyPr/>
-          <a:lstStyle/>
-          <a:p>
-            <a:pPr lvl="0" eaLnBrk="1" latinLnBrk="0" hangingPunct="1"/>
+          <a:lstStyle>
+            <a:lvl1pPr>
+              <a:defRPr b="0" i="0">
+                <a:latin typeface="Helvetica Neue Light" charset="0"/>
+                <a:ea typeface="Helvetica Neue Light" charset="0"/>
+                <a:cs typeface="Helvetica Neue Light" charset="0"/>
+              </a:defRPr>
+            </a:lvl1pPr>
+            <a:lvl2pPr>
+              <a:defRPr b="0" i="0">
+                <a:latin typeface="Helvetica Neue Light" charset="0"/>
+                <a:ea typeface="Helvetica Neue Light" charset="0"/>
+                <a:cs typeface="Helvetica Neue Light" charset="0"/>
+              </a:defRPr>
+            </a:lvl2pPr>
+            <a:lvl3pPr>
+              <a:defRPr b="0" i="0">
+                <a:latin typeface="Helvetica Neue Light" charset="0"/>
+                <a:ea typeface="Helvetica Neue Light" charset="0"/>
+                <a:cs typeface="Helvetica Neue Light" charset="0"/>
+              </a:defRPr>
+            </a:lvl3pPr>
+            <a:lvl4pPr>
+              <a:defRPr b="0" i="0">
+                <a:latin typeface="Helvetica Neue Light" charset="0"/>
+                <a:ea typeface="Helvetica Neue Light" charset="0"/>
+                <a:cs typeface="Helvetica Neue Light" charset="0"/>
+              </a:defRPr>
+            </a:lvl4pPr>
+            <a:lvl5pPr>
+              <a:defRPr b="0" i="0">
+                <a:latin typeface="Helvetica Neue Light" charset="0"/>
+                <a:ea typeface="Helvetica Neue Light" charset="0"/>
+                <a:cs typeface="Helvetica Neue Light" charset="0"/>
+              </a:defRPr>
+            </a:lvl5pPr>
+          </a:lstStyle>
+          <a:p>
+            <a:pPr lvl="0"/>
             <a:r>
               <a:rPr lang="en-US" smtClean="0"/>
               <a:t>Click to edit Master text styles</a:t>
             </a:r>
           </a:p>
           <a:p>
-            <a:pPr lvl="1" eaLnBrk="1" latinLnBrk="0" hangingPunct="1"/>
+            <a:pPr lvl="1"/>
             <a:r>
               <a:rPr lang="en-US" smtClean="0"/>
               <a:t>Second level</a:t>
             </a:r>
           </a:p>
           <a:p>
-            <a:pPr lvl="2" eaLnBrk="1" latinLnBrk="0" hangingPunct="1"/>
+            <a:pPr lvl="2"/>
             <a:r>
               <a:rPr lang="en-US" smtClean="0"/>
               <a:t>Third level</a:t>
             </a:r>
           </a:p>
           <a:p>
-            <a:pPr lvl="3" eaLnBrk="1" latinLnBrk="0" hangingPunct="1"/>
+            <a:pPr lvl="3"/>
             <a:r>
               <a:rPr lang="en-US" smtClean="0"/>
               <a:t>Fourth level</a:t>
             </a:r>
           </a:p>
           <a:p>
-            <a:pPr lvl="4" eaLnBrk="1" latinLnBrk="0" hangingPunct="1"/>
+            <a:pPr lvl="4"/>
             <a:r>
               <a:rPr lang="en-US" smtClean="0"/>
               <a:t>Fifth level</a:t>
             </a:r>
-            <a:endParaRPr kumimoji="0" lang="en-US"/>
-          </a:p>
-        </p:txBody>
-      </p:sp>
-      <p:sp>
-        <p:nvSpPr>
-          <p:cNvPr id="8" name="Date Placeholder 7"/>
+            <a:endParaRPr lang="en-US" dirty="0"/>
+          </a:p>
+        </p:txBody>
+      </p:sp>
+      <p:sp>
+        <p:nvSpPr>
+          <p:cNvPr id="5" name="Date Placeholder 7"/>
           <p:cNvSpPr>
             <a:spLocks noGrp="1"/>
           </p:cNvSpPr>
           <p:nvPr>
-            <p:ph type="dt" sz="half" idx="15"/>
+            <p:ph type="dt" sz="half" idx="10"/>
           </p:nvPr>
         </p:nvSpPr>
         <p:spPr/>
         <p:txBody>
           <a:bodyPr rtlCol="0"/>
-          <a:lstStyle/>
+          <a:lstStyle>
+            <a:lvl1pPr>
+              <a:defRPr/>
+            </a:lvl1pPr>
+          </a:lstStyle>
           <a:p>
             <a:fld id="{D209C01E-D213-8644-9F4C-5E847F8EF5F9}" type="datetimeFigureOut">
               <a:rPr lang="en-US" smtClean="0"/>
-              <a:t>9/6/16</a:t>
+              <a:t>8/17/17</a:t>
             </a:fld>
             <a:endParaRPr lang="en-US"/>
           </a:p>
@@ -2449,41 +2578,22 @@
       </p:sp>
       <p:sp>
         <p:nvSpPr>
-          <p:cNvPr id="10" name="Slide Number Placeholder 9"/>
+          <p:cNvPr id="7" name="Footer Placeholder 11"/>
           <p:cNvSpPr>
             <a:spLocks noGrp="1"/>
           </p:cNvSpPr>
           <p:nvPr>
-            <p:ph type="sldNum" sz="quarter" idx="16"/>
+            <p:ph type="ftr" sz="quarter" idx="12"/>
           </p:nvPr>
         </p:nvSpPr>
         <p:spPr/>
         <p:txBody>
           <a:bodyPr rtlCol="0"/>
-          <a:lstStyle/>
-          <a:p>
-            <a:fld id="{DBAD749E-B0CA-AD49-9ED0-43F8720927C0}" type="slidenum">
-              <a:rPr lang="en-US" smtClean="0"/>
-              <a:t>‹#›</a:t>
-            </a:fld>
-            <a:endParaRPr lang="en-US"/>
-          </a:p>
-        </p:txBody>
-      </p:sp>
-      <p:sp>
-        <p:nvSpPr>
-          <p:cNvPr id="12" name="Footer Placeholder 11"/>
-          <p:cNvSpPr>
-            <a:spLocks noGrp="1"/>
-          </p:cNvSpPr>
-          <p:nvPr>
-            <p:ph type="ftr" sz="quarter" idx="17"/>
-          </p:nvPr>
-        </p:nvSpPr>
-        <p:spPr/>
-        <p:txBody>
-          <a:bodyPr rtlCol="0"/>
-          <a:lstStyle/>
+          <a:lstStyle>
+            <a:lvl1pPr>
+              <a:defRPr/>
+            </a:lvl1pPr>
+          </a:lstStyle>
           <a:p>
             <a:endParaRPr lang="en-US"/>
           </a:p>
@@ -2526,12 +2636,12 @@
         </p:nvSpPr>
         <p:spPr>
           <a:xfrm>
-            <a:off x="533400" y="273050"/>
-            <a:ext cx="8153400" cy="869950"/>
+            <a:off x="711200" y="273050"/>
+            <a:ext cx="10871200" cy="869950"/>
           </a:xfrm>
         </p:spPr>
         <p:txBody>
-          <a:bodyPr anchor="ctr"/>
+          <a:bodyPr/>
           <a:lstStyle>
             <a:lvl1pPr>
               <a:defRPr/>
@@ -2539,10 +2649,10 @@
           </a:lstStyle>
           <a:p>
             <a:r>
-              <a:rPr kumimoji="0" lang="en-US" smtClean="0"/>
+              <a:rPr lang="en-US" smtClean="0"/>
               <a:t>Click to edit Master title style</a:t>
             </a:r>
-            <a:endParaRPr kumimoji="0" lang="en-US"/>
+            <a:endParaRPr lang="en-US"/>
           </a:p>
         </p:txBody>
       </p:sp>
@@ -2558,48 +2668,84 @@
         </p:nvSpPr>
         <p:spPr>
           <a:xfrm>
-            <a:off x="609600" y="2438400"/>
-            <a:ext cx="3886200" cy="3581400"/>
+            <a:off x="812800" y="2438400"/>
+            <a:ext cx="5181600" cy="3581400"/>
           </a:xfrm>
         </p:spPr>
         <p:txBody>
           <a:bodyPr/>
-          <a:lstStyle/>
-          <a:p>
-            <a:pPr lvl="0" eaLnBrk="1" latinLnBrk="0" hangingPunct="1"/>
+          <a:lstStyle>
+            <a:lvl1pPr>
+              <a:defRPr b="0" i="0">
+                <a:latin typeface="Helvetica Neue Light" charset="0"/>
+                <a:ea typeface="Helvetica Neue Light" charset="0"/>
+                <a:cs typeface="Helvetica Neue Light" charset="0"/>
+              </a:defRPr>
+            </a:lvl1pPr>
+            <a:lvl2pPr>
+              <a:defRPr b="0" i="0">
+                <a:latin typeface="Helvetica Neue Light" charset="0"/>
+                <a:ea typeface="Helvetica Neue Light" charset="0"/>
+                <a:cs typeface="Helvetica Neue Light" charset="0"/>
+              </a:defRPr>
+            </a:lvl2pPr>
+            <a:lvl3pPr>
+              <a:defRPr b="0" i="0">
+                <a:latin typeface="Helvetica Neue Light" charset="0"/>
+                <a:ea typeface="Helvetica Neue Light" charset="0"/>
+                <a:cs typeface="Helvetica Neue Light" charset="0"/>
+              </a:defRPr>
+            </a:lvl3pPr>
+            <a:lvl4pPr>
+              <a:defRPr b="0" i="0">
+                <a:latin typeface="Helvetica Neue Light" charset="0"/>
+                <a:ea typeface="Helvetica Neue Light" charset="0"/>
+                <a:cs typeface="Helvetica Neue Light" charset="0"/>
+              </a:defRPr>
+            </a:lvl4pPr>
+            <a:lvl5pPr>
+              <a:defRPr b="0" i="0">
+                <a:latin typeface="Helvetica Neue Light" charset="0"/>
+                <a:ea typeface="Helvetica Neue Light" charset="0"/>
+                <a:cs typeface="Helvetica Neue Light" charset="0"/>
+              </a:defRPr>
+            </a:lvl5pPr>
+          </a:lstStyle>
+          <a:p>
+            <a:pPr lvl="0"/>
             <a:r>
               <a:rPr lang="en-US" smtClean="0"/>
               <a:t>Click to edit Master text styles</a:t>
             </a:r>
           </a:p>
           <a:p>
-            <a:pPr lvl="1" eaLnBrk="1" latinLnBrk="0" hangingPunct="1"/>
+            <a:pPr lvl="1"/>
             <a:r>
               <a:rPr lang="en-US" smtClean="0"/>
               <a:t>Second level</a:t>
             </a:r>
           </a:p>
           <a:p>
-            <a:pPr lvl="2" eaLnBrk="1" latinLnBrk="0" hangingPunct="1"/>
+            <a:pPr lvl="2"/>
             <a:r>
               <a:rPr lang="en-US" smtClean="0"/>
               <a:t>Third level</a:t>
             </a:r>
           </a:p>
           <a:p>
-            <a:pPr lvl="3" eaLnBrk="1" latinLnBrk="0" hangingPunct="1"/>
+            <a:pPr lvl="3"/>
             <a:r>
               <a:rPr lang="en-US" smtClean="0"/>
               <a:t>Fourth level</a:t>
             </a:r>
           </a:p>
           <a:p>
-            <a:pPr lvl="4" eaLnBrk="1" latinLnBrk="0" hangingPunct="1"/>
+            <a:pPr lvl="4"/>
             <a:r>
               <a:rPr lang="en-US" smtClean="0"/>
               <a:t>Fifth level</a:t>
             </a:r>
-            <a:endParaRPr kumimoji="0" lang="en-US"/>
+            <a:endParaRPr lang="en-US" dirty="0"/>
           </a:p>
         </p:txBody>
       </p:sp>
@@ -2615,113 +2761,84 @@
         </p:nvSpPr>
         <p:spPr>
           <a:xfrm>
-            <a:off x="4800600" y="2438400"/>
-            <a:ext cx="3886200" cy="3581400"/>
+            <a:off x="6400800" y="2438400"/>
+            <a:ext cx="5181600" cy="3581400"/>
           </a:xfrm>
         </p:spPr>
         <p:txBody>
           <a:bodyPr/>
-          <a:lstStyle/>
-          <a:p>
-            <a:pPr lvl="0" eaLnBrk="1" latinLnBrk="0" hangingPunct="1"/>
+          <a:lstStyle>
+            <a:lvl1pPr>
+              <a:defRPr b="0" i="0">
+                <a:latin typeface="Helvetica Neue Light" charset="0"/>
+                <a:ea typeface="Helvetica Neue Light" charset="0"/>
+                <a:cs typeface="Helvetica Neue Light" charset="0"/>
+              </a:defRPr>
+            </a:lvl1pPr>
+            <a:lvl2pPr>
+              <a:defRPr b="0" i="0">
+                <a:latin typeface="Helvetica Neue Light" charset="0"/>
+                <a:ea typeface="Helvetica Neue Light" charset="0"/>
+                <a:cs typeface="Helvetica Neue Light" charset="0"/>
+              </a:defRPr>
+            </a:lvl2pPr>
+            <a:lvl3pPr>
+              <a:defRPr b="0" i="0">
+                <a:latin typeface="Helvetica Neue Light" charset="0"/>
+                <a:ea typeface="Helvetica Neue Light" charset="0"/>
+                <a:cs typeface="Helvetica Neue Light" charset="0"/>
+              </a:defRPr>
+            </a:lvl3pPr>
+            <a:lvl4pPr>
+              <a:defRPr b="0" i="0">
+                <a:latin typeface="Helvetica Neue Light" charset="0"/>
+                <a:ea typeface="Helvetica Neue Light" charset="0"/>
+                <a:cs typeface="Helvetica Neue Light" charset="0"/>
+              </a:defRPr>
+            </a:lvl4pPr>
+            <a:lvl5pPr>
+              <a:defRPr b="0" i="0">
+                <a:latin typeface="Helvetica Neue Light" charset="0"/>
+                <a:ea typeface="Helvetica Neue Light" charset="0"/>
+                <a:cs typeface="Helvetica Neue Light" charset="0"/>
+              </a:defRPr>
+            </a:lvl5pPr>
+          </a:lstStyle>
+          <a:p>
+            <a:pPr lvl="0"/>
             <a:r>
               <a:rPr lang="en-US" smtClean="0"/>
               <a:t>Click to edit Master text styles</a:t>
             </a:r>
           </a:p>
           <a:p>
-            <a:pPr lvl="1" eaLnBrk="1" latinLnBrk="0" hangingPunct="1"/>
+            <a:pPr lvl="1"/>
             <a:r>
               <a:rPr lang="en-US" smtClean="0"/>
               <a:t>Second level</a:t>
             </a:r>
           </a:p>
           <a:p>
-            <a:pPr lvl="2" eaLnBrk="1" latinLnBrk="0" hangingPunct="1"/>
+            <a:pPr lvl="2"/>
             <a:r>
               <a:rPr lang="en-US" smtClean="0"/>
               <a:t>Third level</a:t>
             </a:r>
           </a:p>
           <a:p>
-            <a:pPr lvl="3" eaLnBrk="1" latinLnBrk="0" hangingPunct="1"/>
+            <a:pPr lvl="3"/>
             <a:r>
               <a:rPr lang="en-US" smtClean="0"/>
               <a:t>Fourth level</a:t>
             </a:r>
           </a:p>
           <a:p>
-            <a:pPr lvl="4" eaLnBrk="1" latinLnBrk="0" hangingPunct="1"/>
+            <a:pPr lvl="4"/>
             <a:r>
               <a:rPr lang="en-US" smtClean="0"/>
               <a:t>Fifth level</a:t>
             </a:r>
-            <a:endParaRPr kumimoji="0" lang="en-US"/>
-          </a:p>
-        </p:txBody>
-      </p:sp>
-      <p:sp>
-        <p:nvSpPr>
-          <p:cNvPr id="10" name="Date Placeholder 9"/>
-          <p:cNvSpPr>
-            <a:spLocks noGrp="1"/>
-          </p:cNvSpPr>
-          <p:nvPr>
-            <p:ph type="dt" sz="half" idx="15"/>
-          </p:nvPr>
-        </p:nvSpPr>
-        <p:spPr/>
-        <p:txBody>
-          <a:bodyPr rtlCol="0"/>
-          <a:lstStyle/>
-          <a:p>
-            <a:fld id="{D209C01E-D213-8644-9F4C-5E847F8EF5F9}" type="datetimeFigureOut">
-              <a:rPr lang="en-US" smtClean="0"/>
-              <a:t>9/6/16</a:t>
-            </a:fld>
-            <a:endParaRPr lang="en-US"/>
-          </a:p>
-        </p:txBody>
-      </p:sp>
-      <p:sp>
-        <p:nvSpPr>
-          <p:cNvPr id="12" name="Slide Number Placeholder 11"/>
-          <p:cNvSpPr>
-            <a:spLocks noGrp="1"/>
-          </p:cNvSpPr>
-          <p:nvPr>
-            <p:ph type="sldNum" sz="quarter" idx="16"/>
-          </p:nvPr>
-        </p:nvSpPr>
-        <p:spPr/>
-        <p:txBody>
-          <a:bodyPr rtlCol="0"/>
-          <a:lstStyle/>
-          <a:p>
-            <a:fld id="{DBAD749E-B0CA-AD49-9ED0-43F8720927C0}" type="slidenum">
-              <a:rPr lang="en-US" smtClean="0"/>
-              <a:t>‹#›</a:t>
-            </a:fld>
-            <a:endParaRPr lang="en-US"/>
-          </a:p>
-        </p:txBody>
-      </p:sp>
-      <p:sp>
-        <p:nvSpPr>
-          <p:cNvPr id="14" name="Footer Placeholder 13"/>
-          <p:cNvSpPr>
-            <a:spLocks noGrp="1"/>
-          </p:cNvSpPr>
-          <p:nvPr>
-            <p:ph type="ftr" sz="quarter" idx="17"/>
-          </p:nvPr>
-        </p:nvSpPr>
-        <p:spPr/>
-        <p:txBody>
-          <a:bodyPr rtlCol="0"/>
-          <a:lstStyle/>
-          <a:p>
-            <a:endParaRPr lang="en-US"/>
+            <a:endParaRPr lang="en-US" dirty="0"/>
           </a:p>
         </p:txBody>
       </p:sp>
@@ -2737,8 +2854,8 @@
         </p:nvSpPr>
         <p:spPr>
           <a:xfrm>
-            <a:off x="609600" y="1752600"/>
-            <a:ext cx="3886200" cy="640080"/>
+            <a:off x="812800" y="1752600"/>
+            <a:ext cx="5181600" cy="640080"/>
           </a:xfrm>
           <a:solidFill>
             <a:schemeClr val="accent2"/>
@@ -2750,17 +2867,20 @@
             <a:lvl1pPr marL="0" indent="0">
               <a:buFontTx/>
               <a:buNone/>
-              <a:defRPr sz="2000" b="1">
+              <a:defRPr sz="1500" b="0" i="0">
                 <a:solidFill>
                   <a:srgbClr val="FFFFFF"/>
                 </a:solidFill>
+                <a:latin typeface="Helvetica Neue Light" charset="0"/>
+                <a:ea typeface="Helvetica Neue Light" charset="0"/>
+                <a:cs typeface="Helvetica Neue Light" charset="0"/>
               </a:defRPr>
             </a:lvl1pPr>
           </a:lstStyle>
           <a:p>
-            <a:pPr lvl="0" eaLnBrk="1" latinLnBrk="0" hangingPunct="1"/>
-            <a:r>
-              <a:rPr kumimoji="0" lang="en-US" smtClean="0"/>
+            <a:pPr lvl="0"/>
+            <a:r>
+              <a:rPr lang="en-US" smtClean="0"/>
               <a:t>Click to edit Master text styles</a:t>
             </a:r>
           </a:p>
@@ -2778,8 +2898,8 @@
         </p:nvSpPr>
         <p:spPr>
           <a:xfrm>
-            <a:off x="4800600" y="1752600"/>
-            <a:ext cx="3886200" cy="640080"/>
+            <a:off x="6400800" y="1752600"/>
+            <a:ext cx="5181600" cy="640080"/>
           </a:xfrm>
           <a:solidFill>
             <a:schemeClr val="accent4"/>
@@ -2791,19 +2911,72 @@
             <a:lvl1pPr marL="0" indent="0">
               <a:buFontTx/>
               <a:buNone/>
-              <a:defRPr sz="2000" b="1">
+              <a:defRPr sz="1500" b="0" i="0">
                 <a:solidFill>
                   <a:srgbClr val="FFFFFF"/>
                 </a:solidFill>
+                <a:latin typeface="Helvetica Neue Light" charset="0"/>
+                <a:ea typeface="Helvetica Neue Light" charset="0"/>
+                <a:cs typeface="Helvetica Neue Light" charset="0"/>
               </a:defRPr>
             </a:lvl1pPr>
           </a:lstStyle>
           <a:p>
-            <a:pPr lvl="0" eaLnBrk="1" latinLnBrk="0" hangingPunct="1"/>
-            <a:r>
-              <a:rPr kumimoji="0" lang="en-US" smtClean="0"/>
+            <a:pPr lvl="0"/>
+            <a:r>
+              <a:rPr lang="en-US" smtClean="0"/>
               <a:t>Click to edit Master text styles</a:t>
             </a:r>
+          </a:p>
+        </p:txBody>
+      </p:sp>
+      <p:sp>
+        <p:nvSpPr>
+          <p:cNvPr id="7" name="Date Placeholder 9"/>
+          <p:cNvSpPr>
+            <a:spLocks noGrp="1"/>
+          </p:cNvSpPr>
+          <p:nvPr>
+            <p:ph type="dt" sz="half" idx="10"/>
+          </p:nvPr>
+        </p:nvSpPr>
+        <p:spPr/>
+        <p:txBody>
+          <a:bodyPr rtlCol="0"/>
+          <a:lstStyle>
+            <a:lvl1pPr>
+              <a:defRPr/>
+            </a:lvl1pPr>
+          </a:lstStyle>
+          <a:p>
+            <a:fld id="{D209C01E-D213-8644-9F4C-5E847F8EF5F9}" type="datetimeFigureOut">
+              <a:rPr lang="en-US" smtClean="0"/>
+              <a:t>8/17/17</a:t>
+            </a:fld>
+            <a:endParaRPr lang="en-US"/>
+          </a:p>
+        </p:txBody>
+      </p:sp>
+      <p:sp>
+        <p:nvSpPr>
+          <p:cNvPr id="9" name="Footer Placeholder 13"/>
+          <p:cNvSpPr>
+            <a:spLocks noGrp="1"/>
+          </p:cNvSpPr>
+          <p:nvPr>
+            <p:ph type="ftr" sz="quarter" idx="12"/>
+          </p:nvPr>
+        </p:nvSpPr>
+        <p:spPr/>
+        <p:txBody>
+          <a:bodyPr rtlCol="0"/>
+          <a:lstStyle>
+            <a:lvl1pPr>
+              <a:defRPr/>
+            </a:lvl1pPr>
+          </a:lstStyle>
+          <a:p>
+            <a:endParaRPr lang="en-US"/>
           </a:p>
         </p:txBody>
       </p:sp>
@@ -2848,16 +3021,16 @@
           <a:lstStyle/>
           <a:p>
             <a:r>
-              <a:rPr kumimoji="0" lang="en-US" smtClean="0"/>
+              <a:rPr lang="en-US" smtClean="0"/>
               <a:t>Click to edit Master title style</a:t>
             </a:r>
-            <a:endParaRPr kumimoji="0" lang="en-US"/>
-          </a:p>
-        </p:txBody>
-      </p:sp>
-      <p:sp>
-        <p:nvSpPr>
-          <p:cNvPr id="3" name="Date Placeholder 2"/>
+            <a:endParaRPr lang="en-US" dirty="0"/>
+          </a:p>
+        </p:txBody>
+      </p:sp>
+      <p:sp>
+        <p:nvSpPr>
+          <p:cNvPr id="3" name="Date Placeholder 13"/>
           <p:cNvSpPr>
             <a:spLocks noGrp="1"/>
           </p:cNvSpPr>
@@ -2868,11 +3041,15 @@
         <p:spPr/>
         <p:txBody>
           <a:bodyPr/>
-          <a:lstStyle/>
+          <a:lstStyle>
+            <a:lvl1pPr>
+              <a:defRPr/>
+            </a:lvl1pPr>
+          </a:lstStyle>
           <a:p>
             <a:fld id="{D209C01E-D213-8644-9F4C-5E847F8EF5F9}" type="datetimeFigureOut">
               <a:rPr lang="en-US" smtClean="0"/>
-              <a:t>9/6/16</a:t>
+              <a:t>8/17/17</a:t>
             </a:fld>
             <a:endParaRPr lang="en-US"/>
           </a:p>
@@ -2880,7 +3057,7 @@
       </p:sp>
       <p:sp>
         <p:nvSpPr>
-          <p:cNvPr id="4" name="Footer Placeholder 3"/>
+          <p:cNvPr id="4" name="Footer Placeholder 2"/>
           <p:cNvSpPr>
             <a:spLocks noGrp="1"/>
           </p:cNvSpPr>
@@ -2891,39 +3068,12 @@
         <p:spPr/>
         <p:txBody>
           <a:bodyPr/>
-          <a:lstStyle/>
-          <a:p>
-            <a:endParaRPr lang="en-US"/>
-          </a:p>
-        </p:txBody>
-      </p:sp>
-      <p:sp>
-        <p:nvSpPr>
-          <p:cNvPr id="5" name="Slide Number Placeholder 4"/>
-          <p:cNvSpPr>
-            <a:spLocks noGrp="1"/>
-          </p:cNvSpPr>
-          <p:nvPr>
-            <p:ph type="sldNum" sz="quarter" idx="12"/>
-          </p:nvPr>
-        </p:nvSpPr>
-        <p:spPr/>
-        <p:txBody>
-          <a:bodyPr/>
           <a:lstStyle>
             <a:lvl1pPr>
-              <a:defRPr>
-                <a:solidFill>
-                  <a:srgbClr val="FFFFFF"/>
-                </a:solidFill>
-              </a:defRPr>
+              <a:defRPr/>
             </a:lvl1pPr>
           </a:lstStyle>
           <a:p>
-            <a:fld id="{DBAD749E-B0CA-AD49-9ED0-43F8720927C0}" type="slidenum">
-              <a:rPr lang="en-US" smtClean="0"/>
-              <a:t>‹#›</a:t>
-            </a:fld>
             <a:endParaRPr lang="en-US"/>
           </a:p>
         </p:txBody>
@@ -2966,11 +3116,15 @@
         <p:spPr/>
         <p:txBody>
           <a:bodyPr/>
-          <a:lstStyle/>
+          <a:lstStyle>
+            <a:lvl1pPr>
+              <a:defRPr/>
+            </a:lvl1pPr>
+          </a:lstStyle>
           <a:p>
             <a:fld id="{D209C01E-D213-8644-9F4C-5E847F8EF5F9}" type="datetimeFigureOut">
               <a:rPr lang="en-US" smtClean="0"/>
-              <a:t>9/6/16</a:t>
+              <a:t>8/17/17</a:t>
             </a:fld>
             <a:endParaRPr lang="en-US"/>
           </a:p>
@@ -2989,44 +3143,12 @@
         <p:spPr/>
         <p:txBody>
           <a:bodyPr/>
-          <a:lstStyle/>
-          <a:p>
-            <a:endParaRPr lang="en-US"/>
-          </a:p>
-        </p:txBody>
-      </p:sp>
-      <p:sp>
-        <p:nvSpPr>
-          <p:cNvPr id="4" name="Slide Number Placeholder 3"/>
-          <p:cNvSpPr>
-            <a:spLocks noGrp="1"/>
-          </p:cNvSpPr>
-          <p:nvPr>
-            <p:ph type="sldNum" sz="quarter" idx="12"/>
-          </p:nvPr>
-        </p:nvSpPr>
-        <p:spPr>
-          <a:xfrm>
-            <a:off x="0" y="6248400"/>
-            <a:ext cx="533400" cy="381000"/>
-          </a:xfrm>
-        </p:spPr>
-        <p:txBody>
-          <a:bodyPr/>
           <a:lstStyle>
             <a:lvl1pPr>
-              <a:defRPr>
-                <a:solidFill>
-                  <a:schemeClr val="tx2"/>
-                </a:solidFill>
-              </a:defRPr>
+              <a:defRPr/>
             </a:lvl1pPr>
           </a:lstStyle>
           <a:p>
-            <a:fld id="{DBAD749E-B0CA-AD49-9ED0-43F8720927C0}" type="slidenum">
-              <a:rPr lang="en-US" smtClean="0"/>
-              <a:t>‹#›</a:t>
-            </a:fld>
             <a:endParaRPr lang="en-US"/>
           </a:p>
         </p:txBody>
@@ -3068,96 +3190,23 @@
         </p:nvSpPr>
         <p:spPr>
           <a:xfrm>
-            <a:off x="609600" y="273050"/>
-            <a:ext cx="8077200" cy="869950"/>
+            <a:off x="812800" y="273050"/>
+            <a:ext cx="10769600" cy="869950"/>
           </a:xfrm>
         </p:spPr>
         <p:txBody>
-          <a:bodyPr anchor="ctr"/>
+          <a:bodyPr/>
           <a:lstStyle>
             <a:lvl1pPr algn="l">
               <a:buNone/>
-              <a:defRPr sz="4400" b="0"/>
+              <a:defRPr sz="3300" b="0"/>
             </a:lvl1pPr>
           </a:lstStyle>
           <a:p>
             <a:r>
-              <a:rPr kumimoji="0" lang="en-US" smtClean="0"/>
+              <a:rPr lang="en-US" smtClean="0"/>
               <a:t>Click to edit Master title style</a:t>
             </a:r>
-            <a:endParaRPr kumimoji="0" lang="en-US"/>
-          </a:p>
-        </p:txBody>
-      </p:sp>
-      <p:sp>
-        <p:nvSpPr>
-          <p:cNvPr id="5" name="Date Placeholder 4"/>
-          <p:cNvSpPr>
-            <a:spLocks noGrp="1"/>
-          </p:cNvSpPr>
-          <p:nvPr>
-            <p:ph type="dt" sz="half" idx="10"/>
-          </p:nvPr>
-        </p:nvSpPr>
-        <p:spPr/>
-        <p:txBody>
-          <a:bodyPr/>
-          <a:lstStyle/>
-          <a:p>
-            <a:fld id="{D209C01E-D213-8644-9F4C-5E847F8EF5F9}" type="datetimeFigureOut">
-              <a:rPr lang="en-US" smtClean="0"/>
-              <a:t>9/6/16</a:t>
-            </a:fld>
-            <a:endParaRPr lang="en-US"/>
-          </a:p>
-        </p:txBody>
-      </p:sp>
-      <p:sp>
-        <p:nvSpPr>
-          <p:cNvPr id="6" name="Footer Placeholder 5"/>
-          <p:cNvSpPr>
-            <a:spLocks noGrp="1"/>
-          </p:cNvSpPr>
-          <p:nvPr>
-            <p:ph type="ftr" sz="quarter" idx="11"/>
-          </p:nvPr>
-        </p:nvSpPr>
-        <p:spPr/>
-        <p:txBody>
-          <a:bodyPr/>
-          <a:lstStyle/>
-          <a:p>
-            <a:endParaRPr lang="en-US"/>
-          </a:p>
-        </p:txBody>
-      </p:sp>
-      <p:sp>
-        <p:nvSpPr>
-          <p:cNvPr id="7" name="Slide Number Placeholder 6"/>
-          <p:cNvSpPr>
-            <a:spLocks noGrp="1"/>
-          </p:cNvSpPr>
-          <p:nvPr>
-            <p:ph type="sldNum" sz="quarter" idx="12"/>
-          </p:nvPr>
-        </p:nvSpPr>
-        <p:spPr/>
-        <p:txBody>
-          <a:bodyPr/>
-          <a:lstStyle>
-            <a:lvl1pPr>
-              <a:defRPr>
-                <a:solidFill>
-                  <a:srgbClr val="FFFFFF"/>
-                </a:solidFill>
-              </a:defRPr>
-            </a:lvl1pPr>
-          </a:lstStyle>
-          <a:p>
-            <a:fld id="{DBAD749E-B0CA-AD49-9ED0-43F8720927C0}" type="slidenum">
-              <a:rPr lang="en-US" smtClean="0"/>
-              <a:t>‹#›</a:t>
-            </a:fld>
             <a:endParaRPr lang="en-US"/>
           </a:p>
         </p:txBody>
@@ -3174,8 +3223,8 @@
         </p:nvSpPr>
         <p:spPr>
           <a:xfrm>
-            <a:off x="609600" y="1752600"/>
-            <a:ext cx="1600200" cy="4343400"/>
+            <a:off x="812800" y="1752600"/>
+            <a:ext cx="2133600" cy="4343400"/>
           </a:xfrm>
           <a:ln w="50800" cap="sq" cmpd="dbl" algn="ctr">
             <a:solidFill>
@@ -3205,32 +3254,36 @@
           <a:lstStyle>
             <a:lvl1pPr marL="0" indent="0">
               <a:spcAft>
-                <a:spcPts val="1000"/>
+                <a:spcPts val="750"/>
               </a:spcAft>
               <a:buNone/>
-              <a:defRPr sz="1800"/>
+              <a:defRPr sz="1350" b="0" i="0">
+                <a:latin typeface="Helvetica Neue Light" charset="0"/>
+                <a:ea typeface="Helvetica Neue Light" charset="0"/>
+                <a:cs typeface="Helvetica Neue Light" charset="0"/>
+              </a:defRPr>
             </a:lvl1pPr>
             <a:lvl2pPr>
               <a:buNone/>
-              <a:defRPr sz="1200"/>
+              <a:defRPr sz="900"/>
             </a:lvl2pPr>
             <a:lvl3pPr>
               <a:buNone/>
-              <a:defRPr sz="1000"/>
+              <a:defRPr sz="750"/>
             </a:lvl3pPr>
             <a:lvl4pPr>
               <a:buNone/>
-              <a:defRPr sz="900"/>
+              <a:defRPr sz="675"/>
             </a:lvl4pPr>
             <a:lvl5pPr>
               <a:buNone/>
-              <a:defRPr sz="900"/>
+              <a:defRPr sz="675"/>
             </a:lvl5pPr>
           </a:lstStyle>
           <a:p>
-            <a:pPr lvl="0" eaLnBrk="1" latinLnBrk="0" hangingPunct="1"/>
-            <a:r>
-              <a:rPr kumimoji="0" lang="en-US" smtClean="0"/>
+            <a:pPr lvl="0"/>
+            <a:r>
+              <a:rPr lang="en-US" smtClean="0"/>
               <a:t>Click to edit Master text styles</a:t>
             </a:r>
           </a:p>
@@ -3248,48 +3301,98 @@
         </p:nvSpPr>
         <p:spPr>
           <a:xfrm>
-            <a:off x="2362200" y="1752600"/>
-            <a:ext cx="6400800" cy="4419600"/>
+            <a:off x="3149600" y="1752600"/>
+            <a:ext cx="8534400" cy="4419600"/>
           </a:xfrm>
         </p:spPr>
         <p:txBody>
           <a:bodyPr/>
           <a:lstStyle/>
           <a:p>
-            <a:pPr lvl="0" eaLnBrk="1" latinLnBrk="0" hangingPunct="1"/>
+            <a:pPr lvl="0"/>
             <a:r>
               <a:rPr lang="en-US" smtClean="0"/>
               <a:t>Click to edit Master text styles</a:t>
             </a:r>
           </a:p>
           <a:p>
-            <a:pPr lvl="1" eaLnBrk="1" latinLnBrk="0" hangingPunct="1"/>
+            <a:pPr lvl="1"/>
             <a:r>
               <a:rPr lang="en-US" smtClean="0"/>
               <a:t>Second level</a:t>
             </a:r>
           </a:p>
           <a:p>
-            <a:pPr lvl="2" eaLnBrk="1" latinLnBrk="0" hangingPunct="1"/>
+            <a:pPr lvl="2"/>
             <a:r>
               <a:rPr lang="en-US" smtClean="0"/>
               <a:t>Third level</a:t>
             </a:r>
           </a:p>
           <a:p>
-            <a:pPr lvl="3" eaLnBrk="1" latinLnBrk="0" hangingPunct="1"/>
+            <a:pPr lvl="3"/>
             <a:r>
               <a:rPr lang="en-US" smtClean="0"/>
               <a:t>Fourth level</a:t>
             </a:r>
           </a:p>
           <a:p>
-            <a:pPr lvl="4" eaLnBrk="1" latinLnBrk="0" hangingPunct="1"/>
+            <a:pPr lvl="4"/>
             <a:r>
               <a:rPr lang="en-US" smtClean="0"/>
               <a:t>Fifth level</a:t>
             </a:r>
-            <a:endParaRPr kumimoji="0" lang="en-US"/>
+            <a:endParaRPr lang="en-US"/>
+          </a:p>
+        </p:txBody>
+      </p:sp>
+      <p:sp>
+        <p:nvSpPr>
+          <p:cNvPr id="5" name="Date Placeholder 13"/>
+          <p:cNvSpPr>
+            <a:spLocks noGrp="1"/>
+          </p:cNvSpPr>
+          <p:nvPr>
+            <p:ph type="dt" sz="half" idx="10"/>
+          </p:nvPr>
+        </p:nvSpPr>
+        <p:spPr/>
+        <p:txBody>
+          <a:bodyPr/>
+          <a:lstStyle>
+            <a:lvl1pPr>
+              <a:defRPr/>
+            </a:lvl1pPr>
+          </a:lstStyle>
+          <a:p>
+            <a:fld id="{D209C01E-D213-8644-9F4C-5E847F8EF5F9}" type="datetimeFigureOut">
+              <a:rPr lang="en-US" smtClean="0"/>
+              <a:t>8/17/17</a:t>
+            </a:fld>
+            <a:endParaRPr lang="en-US"/>
+          </a:p>
+        </p:txBody>
+      </p:sp>
+      <p:sp>
+        <p:nvSpPr>
+          <p:cNvPr id="6" name="Footer Placeholder 2"/>
+          <p:cNvSpPr>
+            <a:spLocks noGrp="1"/>
+          </p:cNvSpPr>
+          <p:nvPr>
+            <p:ph type="ftr" sz="quarter" idx="11"/>
+          </p:nvPr>
+        </p:nvSpPr>
+        <p:spPr/>
+        <p:txBody>
+          <a:bodyPr/>
+          <a:lstStyle>
+            <a:lvl1pPr>
+              <a:defRPr/>
+            </a:lvl1pPr>
+          </a:lstStyle>
+          <a:p>
+            <a:endParaRPr lang="en-US"/>
           </a:p>
         </p:txBody>
       </p:sp>
@@ -3320,68 +3423,14 @@
       </p:grpSpPr>
       <p:sp>
         <p:nvSpPr>
-          <p:cNvPr id="4" name="Text Placeholder 3"/>
-          <p:cNvSpPr>
-            <a:spLocks noGrp="1"/>
-          </p:cNvSpPr>
-          <p:nvPr>
-            <p:ph type="body" sz="half" idx="2"/>
-          </p:nvPr>
-        </p:nvSpPr>
-        <p:spPr>
-          <a:xfrm>
-            <a:off x="1600200" y="5486400"/>
-            <a:ext cx="7315200" cy="685800"/>
-          </a:xfrm>
-        </p:spPr>
-        <p:txBody>
-          <a:bodyPr/>
-          <a:lstStyle>
-            <a:lvl1pPr marL="0" indent="0">
-              <a:buFontTx/>
-              <a:buNone/>
-              <a:defRPr sz="1700"/>
-            </a:lvl1pPr>
-            <a:lvl2pPr>
-              <a:buFontTx/>
-              <a:buNone/>
-              <a:defRPr sz="1200"/>
-            </a:lvl2pPr>
-            <a:lvl3pPr>
-              <a:buFontTx/>
-              <a:buNone/>
-              <a:defRPr sz="1000"/>
-            </a:lvl3pPr>
-            <a:lvl4pPr>
-              <a:buFontTx/>
-              <a:buNone/>
-              <a:defRPr sz="900"/>
-            </a:lvl4pPr>
-            <a:lvl5pPr>
-              <a:buFontTx/>
-              <a:buNone/>
-              <a:defRPr sz="900"/>
-            </a:lvl5pPr>
-          </a:lstStyle>
-          <a:p>
-            <a:pPr lvl="0" eaLnBrk="1" latinLnBrk="0" hangingPunct="1"/>
-            <a:r>
-              <a:rPr kumimoji="0" lang="en-US" smtClean="0"/>
-              <a:t>Click to edit Master text styles</a:t>
-            </a:r>
-          </a:p>
-        </p:txBody>
-      </p:sp>
-      <p:sp>
-        <p:nvSpPr>
-          <p:cNvPr id="8" name="Rectangle 7"/>
+          <p:cNvPr id="5" name="Rectangle 7"/>
           <p:cNvSpPr/>
           <p:nvPr/>
         </p:nvSpPr>
         <p:spPr bwMode="white">
           <a:xfrm>
-            <a:off x="-9144" y="4572000"/>
-            <a:ext cx="9144000" cy="886968"/>
+            <a:off x="-12700" y="4572003"/>
+            <a:ext cx="12192000" cy="887413"/>
           </a:xfrm>
           <a:prstGeom prst="rect">
             <a:avLst/>
@@ -3413,21 +3462,29 @@
           <a:bodyPr anchor="ctr"/>
           <a:lstStyle/>
           <a:p>
-            <a:pPr algn="ctr" eaLnBrk="1" latinLnBrk="0" hangingPunct="1"/>
-            <a:endParaRPr kumimoji="0" lang="en-US"/>
-          </a:p>
-        </p:txBody>
-      </p:sp>
-      <p:sp>
-        <p:nvSpPr>
-          <p:cNvPr id="9" name="Rectangle 8"/>
+            <a:pPr algn="ctr" fontAlgn="auto">
+              <a:spcBef>
+                <a:spcPts val="0"/>
+              </a:spcBef>
+              <a:spcAft>
+                <a:spcPts val="0"/>
+              </a:spcAft>
+              <a:defRPr/>
+            </a:pPr>
+            <a:endParaRPr lang="en-US" sz="1350" dirty="0"/>
+          </a:p>
+        </p:txBody>
+      </p:sp>
+      <p:sp>
+        <p:nvSpPr>
+          <p:cNvPr id="6" name="Rectangle 8"/>
           <p:cNvSpPr/>
           <p:nvPr/>
         </p:nvSpPr>
         <p:spPr>
           <a:xfrm>
-            <a:off x="-9144" y="4663440"/>
-            <a:ext cx="1463040" cy="713232"/>
+            <a:off x="-12698" y="4664075"/>
+            <a:ext cx="1951567" cy="712788"/>
           </a:xfrm>
           <a:prstGeom prst="rect">
             <a:avLst/>
@@ -3461,21 +3518,29 @@
           <a:bodyPr anchor="ctr"/>
           <a:lstStyle/>
           <a:p>
-            <a:pPr algn="ctr" eaLnBrk="1" latinLnBrk="0" hangingPunct="1"/>
-            <a:endParaRPr kumimoji="0" lang="en-US"/>
-          </a:p>
-        </p:txBody>
-      </p:sp>
-      <p:sp>
-        <p:nvSpPr>
-          <p:cNvPr id="10" name="Rectangle 9"/>
+            <a:pPr algn="ctr" fontAlgn="auto">
+              <a:spcBef>
+                <a:spcPts val="0"/>
+              </a:spcBef>
+              <a:spcAft>
+                <a:spcPts val="0"/>
+              </a:spcAft>
+              <a:defRPr/>
+            </a:pPr>
+            <a:endParaRPr lang="en-US" sz="1350" dirty="0"/>
+          </a:p>
+        </p:txBody>
+      </p:sp>
+      <p:sp>
+        <p:nvSpPr>
+          <p:cNvPr id="7" name="Rectangle 9"/>
           <p:cNvSpPr/>
           <p:nvPr/>
         </p:nvSpPr>
         <p:spPr>
           <a:xfrm>
-            <a:off x="1545336" y="4654296"/>
-            <a:ext cx="7598664" cy="713232"/>
+            <a:off x="2059517" y="4654550"/>
+            <a:ext cx="10132483" cy="712788"/>
           </a:xfrm>
           <a:prstGeom prst="rect">
             <a:avLst/>
@@ -3509,58 +3574,29 @@
           <a:bodyPr anchor="ctr"/>
           <a:lstStyle/>
           <a:p>
-            <a:pPr algn="ctr" eaLnBrk="1" latinLnBrk="0" hangingPunct="1"/>
-            <a:endParaRPr kumimoji="0" lang="en-US"/>
-          </a:p>
-        </p:txBody>
-      </p:sp>
-      <p:sp>
-        <p:nvSpPr>
-          <p:cNvPr id="2" name="Title 1"/>
-          <p:cNvSpPr>
-            <a:spLocks noGrp="1"/>
-          </p:cNvSpPr>
-          <p:nvPr>
-            <p:ph type="title"/>
-          </p:nvPr>
-        </p:nvSpPr>
-        <p:spPr>
-          <a:xfrm>
-            <a:off x="1600200" y="4648200"/>
-            <a:ext cx="7315200" cy="685800"/>
-          </a:xfrm>
-        </p:spPr>
-        <p:txBody>
-          <a:bodyPr anchor="ctr"/>
-          <a:lstStyle>
-            <a:lvl1pPr algn="l">
-              <a:buNone/>
-              <a:defRPr sz="2800" b="0">
-                <a:solidFill>
-                  <a:srgbClr val="FFFFFF"/>
-                </a:solidFill>
-              </a:defRPr>
-            </a:lvl1pPr>
-          </a:lstStyle>
-          <a:p>
-            <a:r>
-              <a:rPr kumimoji="0" lang="en-US" smtClean="0"/>
-              <a:t>Click to edit Master title style</a:t>
-            </a:r>
-            <a:endParaRPr kumimoji="0" lang="en-US"/>
-          </a:p>
-        </p:txBody>
-      </p:sp>
-      <p:sp>
-        <p:nvSpPr>
-          <p:cNvPr id="11" name="Rectangle 10"/>
+            <a:pPr algn="ctr" fontAlgn="auto">
+              <a:spcBef>
+                <a:spcPts val="0"/>
+              </a:spcBef>
+              <a:spcAft>
+                <a:spcPts val="0"/>
+              </a:spcAft>
+              <a:defRPr/>
+            </a:pPr>
+            <a:endParaRPr lang="en-US" sz="1350" dirty="0"/>
+          </a:p>
+        </p:txBody>
+      </p:sp>
+      <p:sp>
+        <p:nvSpPr>
+          <p:cNvPr id="8" name="Rectangle 10"/>
           <p:cNvSpPr/>
           <p:nvPr/>
         </p:nvSpPr>
         <p:spPr bwMode="white">
           <a:xfrm>
-            <a:off x="1447800" y="0"/>
-            <a:ext cx="100584" cy="6867144"/>
+            <a:off x="1930402" y="3"/>
+            <a:ext cx="133351" cy="6867525"/>
           </a:xfrm>
           <a:prstGeom prst="rect">
             <a:avLst/>
@@ -3592,92 +3628,107 @@
           <a:bodyPr anchor="ctr"/>
           <a:lstStyle/>
           <a:p>
-            <a:pPr algn="ctr" eaLnBrk="1" latinLnBrk="0" hangingPunct="1"/>
-            <a:endParaRPr kumimoji="0" lang="en-US"/>
-          </a:p>
-        </p:txBody>
-      </p:sp>
-      <p:sp>
-        <p:nvSpPr>
-          <p:cNvPr id="12" name="Date Placeholder 11"/>
+            <a:pPr algn="ctr" fontAlgn="auto">
+              <a:spcBef>
+                <a:spcPts val="0"/>
+              </a:spcBef>
+              <a:spcAft>
+                <a:spcPts val="0"/>
+              </a:spcAft>
+              <a:defRPr/>
+            </a:pPr>
+            <a:endParaRPr lang="en-US" sz="1350" dirty="0"/>
+          </a:p>
+        </p:txBody>
+      </p:sp>
+      <p:sp>
+        <p:nvSpPr>
+          <p:cNvPr id="4" name="Text Placeholder 3"/>
           <p:cNvSpPr>
             <a:spLocks noGrp="1"/>
           </p:cNvSpPr>
           <p:nvPr>
-            <p:ph type="dt" sz="half" idx="10"/>
+            <p:ph type="body" sz="half" idx="2"/>
           </p:nvPr>
         </p:nvSpPr>
         <p:spPr>
           <a:xfrm>
-            <a:off x="6248400" y="6248400"/>
-            <a:ext cx="2667000" cy="365125"/>
+            <a:off x="2133600" y="5486400"/>
+            <a:ext cx="9753600" cy="685800"/>
           </a:xfrm>
         </p:spPr>
         <p:txBody>
-          <a:bodyPr rtlCol="0"/>
-          <a:lstStyle/>
-          <a:p>
-            <a:fld id="{D209C01E-D213-8644-9F4C-5E847F8EF5F9}" type="datetimeFigureOut">
+          <a:bodyPr/>
+          <a:lstStyle>
+            <a:lvl1pPr marL="0" indent="0">
+              <a:buFontTx/>
+              <a:buNone/>
+              <a:defRPr sz="1275"/>
+            </a:lvl1pPr>
+            <a:lvl2pPr>
+              <a:buFontTx/>
+              <a:buNone/>
+              <a:defRPr sz="900"/>
+            </a:lvl2pPr>
+            <a:lvl3pPr>
+              <a:buFontTx/>
+              <a:buNone/>
+              <a:defRPr sz="750"/>
+            </a:lvl3pPr>
+            <a:lvl4pPr>
+              <a:buFontTx/>
+              <a:buNone/>
+              <a:defRPr sz="675"/>
+            </a:lvl4pPr>
+            <a:lvl5pPr>
+              <a:buFontTx/>
+              <a:buNone/>
+              <a:defRPr sz="675"/>
+            </a:lvl5pPr>
+          </a:lstStyle>
+          <a:p>
+            <a:pPr lvl="0"/>
+            <a:r>
               <a:rPr lang="en-US" smtClean="0"/>
-              <a:t>9/6/16</a:t>
-            </a:fld>
-            <a:endParaRPr lang="en-US"/>
-          </a:p>
-        </p:txBody>
-      </p:sp>
-      <p:sp>
-        <p:nvSpPr>
-          <p:cNvPr id="13" name="Slide Number Placeholder 12"/>
+              <a:t>Click to edit Master text styles</a:t>
+            </a:r>
+          </a:p>
+        </p:txBody>
+      </p:sp>
+      <p:sp>
+        <p:nvSpPr>
+          <p:cNvPr id="2" name="Title 1"/>
           <p:cNvSpPr>
             <a:spLocks noGrp="1"/>
           </p:cNvSpPr>
           <p:nvPr>
-            <p:ph type="sldNum" sz="quarter" idx="11"/>
+            <p:ph type="title"/>
           </p:nvPr>
         </p:nvSpPr>
         <p:spPr>
           <a:xfrm>
-            <a:off x="0" y="4667249"/>
-            <a:ext cx="1447800" cy="663578"/>
+            <a:off x="2133600" y="4648200"/>
+            <a:ext cx="9753600" cy="685800"/>
           </a:xfrm>
         </p:spPr>
         <p:txBody>
-          <a:bodyPr rtlCol="0"/>
+          <a:bodyPr/>
           <a:lstStyle>
-            <a:lvl1pPr>
-              <a:defRPr sz="2800"/>
+            <a:lvl1pPr algn="l">
+              <a:buNone/>
+              <a:defRPr sz="2100" b="0">
+                <a:solidFill>
+                  <a:srgbClr val="FFFFFF"/>
+                </a:solidFill>
+              </a:defRPr>
             </a:lvl1pPr>
           </a:lstStyle>
           <a:p>
-            <a:fld id="{DBAD749E-B0CA-AD49-9ED0-43F8720927C0}" type="slidenum">
+            <a:r>
               <a:rPr lang="en-US" smtClean="0"/>
-              <a:t>‹#›</a:t>
-            </a:fld>
-            <a:endParaRPr lang="en-US"/>
-          </a:p>
-        </p:txBody>
-      </p:sp>
-      <p:sp>
-        <p:nvSpPr>
-          <p:cNvPr id="14" name="Footer Placeholder 13"/>
-          <p:cNvSpPr>
-            <a:spLocks noGrp="1"/>
-          </p:cNvSpPr>
-          <p:nvPr>
-            <p:ph type="ftr" sz="quarter" idx="12"/>
-          </p:nvPr>
-        </p:nvSpPr>
-        <p:spPr>
-          <a:xfrm>
-            <a:off x="1600200" y="6248206"/>
-            <a:ext cx="4572000" cy="365125"/>
-          </a:xfrm>
-        </p:spPr>
-        <p:txBody>
-          <a:bodyPr rtlCol="0"/>
-          <a:lstStyle/>
-          <a:p>
-            <a:endParaRPr lang="en-US"/>
+              <a:t>Click to edit Master title style</a:t>
+            </a:r>
+            <a:endParaRPr lang="en-US" dirty="0"/>
           </a:p>
         </p:txBody>
       </p:sp>
@@ -3693,8 +3744,8 @@
         </p:nvSpPr>
         <p:spPr>
           <a:xfrm>
-            <a:off x="1560576" y="0"/>
-            <a:ext cx="7583424" cy="4568952"/>
+            <a:off x="2080768" y="0"/>
+            <a:ext cx="10111232" cy="4568952"/>
           </a:xfrm>
           <a:solidFill>
             <a:schemeClr val="accent1">
@@ -3706,19 +3757,82 @@
           </a:ln>
         </p:spPr>
         <p:txBody>
-          <a:bodyPr/>
+          <a:bodyPr>
+            <a:normAutofit/>
+          </a:bodyPr>
           <a:lstStyle>
             <a:lvl1pPr marL="0" indent="0">
               <a:buNone/>
-              <a:defRPr sz="3200"/>
+              <a:defRPr sz="2400"/>
             </a:lvl1pPr>
           </a:lstStyle>
           <a:p>
-            <a:r>
-              <a:rPr kumimoji="0" lang="en-US" smtClean="0"/>
+            <a:pPr lvl="0"/>
+            <a:r>
+              <a:rPr lang="en-US" noProof="0" smtClean="0"/>
               <a:t>Drag picture to placeholder or click icon to add</a:t>
             </a:r>
-            <a:endParaRPr kumimoji="0" lang="en-US" dirty="0"/>
+            <a:endParaRPr lang="en-US" noProof="0" dirty="0"/>
+          </a:p>
+        </p:txBody>
+      </p:sp>
+      <p:sp>
+        <p:nvSpPr>
+          <p:cNvPr id="9" name="Date Placeholder 11"/>
+          <p:cNvSpPr>
+            <a:spLocks noGrp="1"/>
+          </p:cNvSpPr>
+          <p:nvPr>
+            <p:ph type="dt" sz="half" idx="10"/>
+          </p:nvPr>
+        </p:nvSpPr>
+        <p:spPr>
+          <a:xfrm>
+            <a:off x="8331200" y="6248403"/>
+            <a:ext cx="3556000" cy="365125"/>
+          </a:xfrm>
+        </p:spPr>
+        <p:txBody>
+          <a:bodyPr rtlCol="0"/>
+          <a:lstStyle>
+            <a:lvl1pPr>
+              <a:defRPr/>
+            </a:lvl1pPr>
+          </a:lstStyle>
+          <a:p>
+            <a:fld id="{D209C01E-D213-8644-9F4C-5E847F8EF5F9}" type="datetimeFigureOut">
+              <a:rPr lang="en-US" smtClean="0"/>
+              <a:t>8/17/17</a:t>
+            </a:fld>
+            <a:endParaRPr lang="en-US"/>
+          </a:p>
+        </p:txBody>
+      </p:sp>
+      <p:sp>
+        <p:nvSpPr>
+          <p:cNvPr id="11" name="Footer Placeholder 13"/>
+          <p:cNvSpPr>
+            <a:spLocks noGrp="1"/>
+          </p:cNvSpPr>
+          <p:nvPr>
+            <p:ph type="ftr" sz="quarter" idx="12"/>
+          </p:nvPr>
+        </p:nvSpPr>
+        <p:spPr>
+          <a:xfrm>
+            <a:off x="2133600" y="6248403"/>
+            <a:ext cx="6096000" cy="365125"/>
+          </a:xfrm>
+        </p:spPr>
+        <p:txBody>
+          <a:bodyPr rtlCol="0"/>
+          <a:lstStyle>
+            <a:lvl1pPr>
+              <a:defRPr/>
+            </a:lvl1pPr>
+          </a:lstStyle>
+          <a:p>
+            <a:endParaRPr lang="en-US"/>
           </a:p>
         </p:txBody>
       </p:sp>
@@ -3754,7 +3868,7 @@
       </p:grpSpPr>
       <p:sp>
         <p:nvSpPr>
-          <p:cNvPr id="22" name="Title Placeholder 21"/>
+          <p:cNvPr id="1026" name="Title Placeholder 21"/>
           <p:cNvSpPr>
             <a:spLocks noGrp="1"/>
           </p:cNvSpPr>
@@ -3762,32 +3876,42 @@
             <p:ph type="title"/>
           </p:nvPr>
         </p:nvSpPr>
-        <p:spPr>
+        <p:spPr bwMode="auto">
           <a:xfrm>
-            <a:off x="609600" y="228600"/>
-            <a:ext cx="8153400" cy="990600"/>
+            <a:off x="812800" y="228600"/>
+            <a:ext cx="10871200" cy="990600"/>
           </a:xfrm>
           <a:prstGeom prst="rect">
             <a:avLst/>
           </a:prstGeom>
+          <a:noFill/>
+          <a:ln w="9525">
+            <a:noFill/>
+            <a:miter lim="800000"/>
+            <a:headEnd/>
+            <a:tailEnd/>
+          </a:ln>
         </p:spPr>
         <p:txBody>
-          <a:bodyPr vert="horz" anchor="ctr">
-            <a:normAutofit/>
+          <a:bodyPr vert="horz" wrap="square" lIns="91440" tIns="45720" rIns="91440" bIns="45720" numCol="1" anchor="ctr" anchorCtr="0" compatLnSpc="1">
+            <a:prstTxWarp prst="textNoShape">
+              <a:avLst/>
+            </a:prstTxWarp>
           </a:bodyPr>
           <a:lstStyle/>
           <a:p>
-            <a:r>
-              <a:rPr kumimoji="0" lang="en-US" smtClean="0"/>
+            <a:pPr lvl="0"/>
+            <a:r>
+              <a:rPr lang="en-US" smtClean="0"/>
               <a:t>Click to edit Master title style</a:t>
             </a:r>
-            <a:endParaRPr kumimoji="0" lang="en-US" dirty="0"/>
-          </a:p>
-        </p:txBody>
-      </p:sp>
-      <p:sp>
-        <p:nvSpPr>
-          <p:cNvPr id="13" name="Text Placeholder 12"/>
+            <a:endParaRPr lang="en-US" dirty="0" smtClean="0"/>
+          </a:p>
+        </p:txBody>
+      </p:sp>
+      <p:sp>
+        <p:nvSpPr>
+          <p:cNvPr id="1027" name="Text Placeholder 12"/>
           <p:cNvSpPr>
             <a:spLocks noGrp="1"/>
           </p:cNvSpPr>
@@ -3795,55 +3919,64 @@
             <p:ph type="body" idx="1"/>
           </p:nvPr>
         </p:nvSpPr>
-        <p:spPr>
+        <p:spPr bwMode="auto">
           <a:xfrm>
-            <a:off x="612648" y="1600200"/>
-            <a:ext cx="8153400" cy="4526280"/>
+            <a:off x="817033" y="1600203"/>
+            <a:ext cx="10871200" cy="4525963"/>
           </a:xfrm>
           <a:prstGeom prst="rect">
             <a:avLst/>
           </a:prstGeom>
+          <a:noFill/>
+          <a:ln w="9525">
+            <a:noFill/>
+            <a:miter lim="800000"/>
+            <a:headEnd/>
+            <a:tailEnd/>
+          </a:ln>
         </p:spPr>
         <p:txBody>
-          <a:bodyPr vert="horz">
-            <a:normAutofit/>
+          <a:bodyPr vert="horz" wrap="square" lIns="91440" tIns="45720" rIns="91440" bIns="45720" numCol="1" anchor="t" anchorCtr="0" compatLnSpc="1">
+            <a:prstTxWarp prst="textNoShape">
+              <a:avLst/>
+            </a:prstTxWarp>
           </a:bodyPr>
           <a:lstStyle/>
           <a:p>
-            <a:pPr lvl="0" eaLnBrk="1" latinLnBrk="0" hangingPunct="1"/>
-            <a:r>
-              <a:rPr kumimoji="0" lang="en-US" smtClean="0"/>
+            <a:pPr lvl="0"/>
+            <a:r>
+              <a:rPr lang="en-US" smtClean="0"/>
               <a:t>Click to edit Master text styles</a:t>
             </a:r>
           </a:p>
           <a:p>
-            <a:pPr lvl="1" eaLnBrk="1" latinLnBrk="0" hangingPunct="1"/>
-            <a:r>
-              <a:rPr kumimoji="0" lang="en-US" smtClean="0"/>
+            <a:pPr lvl="1"/>
+            <a:r>
+              <a:rPr lang="en-US" smtClean="0"/>
               <a:t>Second level</a:t>
             </a:r>
           </a:p>
           <a:p>
-            <a:pPr lvl="2" eaLnBrk="1" latinLnBrk="0" hangingPunct="1"/>
-            <a:r>
-              <a:rPr kumimoji="0" lang="en-US" smtClean="0"/>
+            <a:pPr lvl="2"/>
+            <a:r>
+              <a:rPr lang="en-US" smtClean="0"/>
               <a:t>Third level</a:t>
             </a:r>
           </a:p>
           <a:p>
-            <a:pPr lvl="3" eaLnBrk="1" latinLnBrk="0" hangingPunct="1"/>
-            <a:r>
-              <a:rPr kumimoji="0" lang="en-US" smtClean="0"/>
+            <a:pPr lvl="3"/>
+            <a:r>
+              <a:rPr lang="en-US" smtClean="0"/>
               <a:t>Fourth level</a:t>
             </a:r>
           </a:p>
           <a:p>
-            <a:pPr lvl="4" eaLnBrk="1" latinLnBrk="0" hangingPunct="1"/>
-            <a:r>
-              <a:rPr kumimoji="0" lang="en-US" smtClean="0"/>
+            <a:pPr lvl="4"/>
+            <a:r>
+              <a:rPr lang="en-US" smtClean="0"/>
               <a:t>Fifth level</a:t>
             </a:r>
-            <a:endParaRPr kumimoji="0" lang="en-US"/>
+            <a:endParaRPr lang="en-US" dirty="0" smtClean="0"/>
           </a:p>
         </p:txBody>
       </p:sp>
@@ -3859,8 +3992,8 @@
         </p:nvSpPr>
         <p:spPr>
           <a:xfrm>
-            <a:off x="6096000" y="6248400"/>
-            <a:ext cx="2667000" cy="365125"/>
+            <a:off x="8128000" y="6248403"/>
+            <a:ext cx="3556000" cy="365125"/>
           </a:xfrm>
           <a:prstGeom prst="rect">
             <a:avLst/>
@@ -3869,18 +4002,27 @@
         <p:txBody>
           <a:bodyPr vert="horz" anchor="ctr" anchorCtr="0"/>
           <a:lstStyle>
-            <a:lvl1pPr algn="l" eaLnBrk="1" latinLnBrk="0" hangingPunct="1">
-              <a:defRPr kumimoji="0" sz="1400">
+            <a:lvl1pPr algn="l" eaLnBrk="1" fontAlgn="auto" latinLnBrk="0" hangingPunct="1">
+              <a:spcBef>
+                <a:spcPts val="0"/>
+              </a:spcBef>
+              <a:spcAft>
+                <a:spcPts val="0"/>
+              </a:spcAft>
+              <a:defRPr kumimoji="0" sz="1050" b="0" i="0" smtClean="0">
                 <a:solidFill>
                   <a:schemeClr val="tx2"/>
                 </a:solidFill>
+                <a:latin typeface="Helvetica Neue Light" charset="0"/>
+                <a:ea typeface="Helvetica Neue Light" charset="0"/>
+                <a:cs typeface="Helvetica Neue Light" charset="0"/>
               </a:defRPr>
             </a:lvl1pPr>
           </a:lstStyle>
           <a:p>
             <a:fld id="{D209C01E-D213-8644-9F4C-5E847F8EF5F9}" type="datetimeFigureOut">
               <a:rPr lang="en-US" smtClean="0"/>
-              <a:t>9/6/16</a:t>
+              <a:t>8/17/17</a:t>
             </a:fld>
             <a:endParaRPr lang="en-US"/>
           </a:p>
@@ -3898,8 +4040,8 @@
         </p:nvSpPr>
         <p:spPr>
           <a:xfrm>
-            <a:off x="609600" y="6248206"/>
-            <a:ext cx="5421083" cy="365125"/>
+            <a:off x="812802" y="6248403"/>
+            <a:ext cx="7228417" cy="365125"/>
           </a:xfrm>
           <a:prstGeom prst="rect">
             <a:avLst/>
@@ -3908,11 +4050,20 @@
         <p:txBody>
           <a:bodyPr vert="horz" anchor="ctr"/>
           <a:lstStyle>
-            <a:lvl1pPr algn="r" eaLnBrk="1" latinLnBrk="0" hangingPunct="1">
-              <a:defRPr kumimoji="0" sz="1400">
+            <a:lvl1pPr algn="r" eaLnBrk="1" fontAlgn="auto" latinLnBrk="0" hangingPunct="1">
+              <a:spcBef>
+                <a:spcPts val="0"/>
+              </a:spcBef>
+              <a:spcAft>
+                <a:spcPts val="0"/>
+              </a:spcAft>
+              <a:defRPr kumimoji="0" sz="1050" b="0" i="0">
                 <a:solidFill>
                   <a:schemeClr val="tx2"/>
                 </a:solidFill>
+                <a:latin typeface="Helvetica Neue Light" charset="0"/>
+                <a:ea typeface="Helvetica Neue Light" charset="0"/>
+                <a:cs typeface="Helvetica Neue Light" charset="0"/>
               </a:defRPr>
             </a:lvl1pPr>
           </a:lstStyle>
@@ -3929,8 +4080,8 @@
         </p:nvSpPr>
         <p:spPr bwMode="white">
           <a:xfrm>
-            <a:off x="0" y="1234440"/>
-            <a:ext cx="9144000" cy="320040"/>
+            <a:off x="0" y="1235075"/>
+            <a:ext cx="12192000" cy="319088"/>
           </a:xfrm>
           <a:prstGeom prst="rect">
             <a:avLst/>
@@ -3962,8 +4113,16 @@
           <a:bodyPr anchor="ctr"/>
           <a:lstStyle/>
           <a:p>
-            <a:pPr algn="ctr" eaLnBrk="1" latinLnBrk="0" hangingPunct="1"/>
-            <a:endParaRPr kumimoji="0" lang="en-US"/>
+            <a:pPr algn="ctr" fontAlgn="auto">
+              <a:spcBef>
+                <a:spcPts val="0"/>
+              </a:spcBef>
+              <a:spcAft>
+                <a:spcPts val="0"/>
+              </a:spcAft>
+              <a:defRPr/>
+            </a:pPr>
+            <a:endParaRPr lang="en-US" sz="1350" dirty="0"/>
           </a:p>
         </p:txBody>
       </p:sp>
@@ -3975,8 +4134,8 @@
         </p:nvSpPr>
         <p:spPr>
           <a:xfrm>
-            <a:off x="0" y="1280160"/>
-            <a:ext cx="533400" cy="228600"/>
+            <a:off x="0" y="1279525"/>
+            <a:ext cx="711200" cy="228600"/>
           </a:xfrm>
           <a:prstGeom prst="rect">
             <a:avLst/>
@@ -4010,8 +4169,16 @@
           <a:bodyPr anchor="ctr"/>
           <a:lstStyle/>
           <a:p>
-            <a:pPr algn="ctr" eaLnBrk="1" latinLnBrk="0" hangingPunct="1"/>
-            <a:endParaRPr kumimoji="0" lang="en-US"/>
+            <a:pPr algn="ctr" fontAlgn="auto">
+              <a:spcBef>
+                <a:spcPts val="0"/>
+              </a:spcBef>
+              <a:spcAft>
+                <a:spcPts val="0"/>
+              </a:spcAft>
+              <a:defRPr/>
+            </a:pPr>
+            <a:endParaRPr lang="en-US" sz="1350" dirty="0"/>
           </a:p>
         </p:txBody>
       </p:sp>
@@ -4023,8 +4190,8 @@
         </p:nvSpPr>
         <p:spPr>
           <a:xfrm>
-            <a:off x="590550" y="1280160"/>
-            <a:ext cx="8553450" cy="228600"/>
+            <a:off x="787400" y="1279525"/>
+            <a:ext cx="11404600" cy="228600"/>
           </a:xfrm>
           <a:prstGeom prst="rect">
             <a:avLst/>
@@ -4058,182 +4225,290 @@
           <a:bodyPr anchor="ctr"/>
           <a:lstStyle/>
           <a:p>
-            <a:pPr algn="ctr" eaLnBrk="1" latinLnBrk="0" hangingPunct="1"/>
-            <a:endParaRPr kumimoji="0" lang="en-US"/>
-          </a:p>
-        </p:txBody>
-      </p:sp>
-      <p:sp>
-        <p:nvSpPr>
-          <p:cNvPr id="23" name="Slide Number Placeholder 22"/>
-          <p:cNvSpPr>
-            <a:spLocks noGrp="1"/>
-          </p:cNvSpPr>
-          <p:nvPr>
-            <p:ph type="sldNum" sz="quarter" idx="4"/>
-          </p:nvPr>
-        </p:nvSpPr>
-        <p:spPr>
-          <a:xfrm>
-            <a:off x="0" y="1272222"/>
-            <a:ext cx="533400" cy="244476"/>
-          </a:xfrm>
-          <a:prstGeom prst="rect">
-            <a:avLst/>
-          </a:prstGeom>
-        </p:spPr>
-        <p:txBody>
-          <a:bodyPr vert="horz" anchor="ctr" anchorCtr="0">
-            <a:normAutofit/>
-          </a:bodyPr>
-          <a:lstStyle>
-            <a:lvl1pPr algn="ctr" eaLnBrk="1" latinLnBrk="0" hangingPunct="1">
-              <a:defRPr kumimoji="0" sz="1400" b="1">
-                <a:solidFill>
-                  <a:srgbClr val="FFFFFF"/>
-                </a:solidFill>
-              </a:defRPr>
-            </a:lvl1pPr>
-          </a:lstStyle>
-          <a:p>
-            <a:fld id="{DBAD749E-B0CA-AD49-9ED0-43F8720927C0}" type="slidenum">
-              <a:rPr lang="en-US" smtClean="0"/>
-              <a:t>‹#›</a:t>
-            </a:fld>
-            <a:endParaRPr lang="en-US"/>
+            <a:pPr algn="ctr" fontAlgn="auto">
+              <a:spcBef>
+                <a:spcPts val="0"/>
+              </a:spcBef>
+              <a:spcAft>
+                <a:spcPts val="0"/>
+              </a:spcAft>
+              <a:defRPr/>
+            </a:pPr>
+            <a:endParaRPr lang="en-US" sz="1350" dirty="0"/>
           </a:p>
         </p:txBody>
       </p:sp>
     </p:spTree>
+    <p:extLst>
+      <p:ext uri="{BB962C8B-B14F-4D97-AF65-F5344CB8AC3E}">
+        <p14:creationId xmlns:p14="http://schemas.microsoft.com/office/powerpoint/2010/main" val="1073009805"/>
+      </p:ext>
+    </p:extLst>
   </p:cSld>
   <p:clrMap bg1="dk1" tx1="lt1" bg2="dk2" tx2="lt2" accent1="accent1" accent2="accent2" accent3="accent3" accent4="accent4" accent5="accent5" accent6="accent6" hlink="hlink" folHlink="folHlink"/>
   <p:sldLayoutIdLst>
-    <p:sldLayoutId id="2147483661" r:id="rId1"/>
-    <p:sldLayoutId id="2147483662" r:id="rId2"/>
-    <p:sldLayoutId id="2147483663" r:id="rId3"/>
-    <p:sldLayoutId id="2147483664" r:id="rId4"/>
-    <p:sldLayoutId id="2147483665" r:id="rId5"/>
-    <p:sldLayoutId id="2147483666" r:id="rId6"/>
-    <p:sldLayoutId id="2147483667" r:id="rId7"/>
-    <p:sldLayoutId id="2147483668" r:id="rId8"/>
-    <p:sldLayoutId id="2147483669" r:id="rId9"/>
-    <p:sldLayoutId id="2147483670" r:id="rId10"/>
-    <p:sldLayoutId id="2147483671" r:id="rId11"/>
+    <p:sldLayoutId id="2147483673" r:id="rId1"/>
+    <p:sldLayoutId id="2147483674" r:id="rId2"/>
+    <p:sldLayoutId id="2147483675" r:id="rId3"/>
+    <p:sldLayoutId id="2147483676" r:id="rId4"/>
+    <p:sldLayoutId id="2147483677" r:id="rId5"/>
+    <p:sldLayoutId id="2147483678" r:id="rId6"/>
+    <p:sldLayoutId id="2147483679" r:id="rId7"/>
+    <p:sldLayoutId id="2147483680" r:id="rId8"/>
+    <p:sldLayoutId id="2147483681" r:id="rId9"/>
+    <p:sldLayoutId id="2147483682" r:id="rId10"/>
+    <p:sldLayoutId id="2147483683" r:id="rId11"/>
   </p:sldLayoutIdLst>
+  <p:timing>
+    <p:tnLst>
+      <p:par>
+        <p:cTn id="1" dur="indefinite" restart="never" nodeType="tmRoot"/>
+      </p:par>
+    </p:tnLst>
+  </p:timing>
   <p:txStyles>
     <p:titleStyle>
-      <a:lvl1pPr algn="l" rtl="0" eaLnBrk="1" latinLnBrk="0" hangingPunct="1">
+      <a:lvl1pPr algn="l" rtl="0" eaLnBrk="1" fontAlgn="base" hangingPunct="1">
         <a:spcBef>
           <a:spcPct val="0"/>
         </a:spcBef>
-        <a:buNone/>
-        <a:defRPr kumimoji="0" sz="4400" kern="1200">
+        <a:spcAft>
+          <a:spcPct val="0"/>
+        </a:spcAft>
+        <a:defRPr sz="3300" b="0" i="0" kern="1200">
           <a:solidFill>
             <a:schemeClr val="tx2"/>
           </a:solidFill>
-          <a:latin typeface="+mj-lt"/>
-          <a:ea typeface="+mj-ea"/>
-          <a:cs typeface="+mj-cs"/>
+          <a:latin typeface="Helvetica Neue Light" charset="0"/>
+          <a:ea typeface="Helvetica Neue Light" charset="0"/>
+          <a:cs typeface="Helvetica Neue Light" charset="0"/>
         </a:defRPr>
       </a:lvl1pPr>
+      <a:lvl2pPr algn="l" rtl="0" eaLnBrk="1" fontAlgn="base" hangingPunct="1">
+        <a:spcBef>
+          <a:spcPct val="0"/>
+        </a:spcBef>
+        <a:spcAft>
+          <a:spcPct val="0"/>
+        </a:spcAft>
+        <a:defRPr sz="3300">
+          <a:solidFill>
+            <a:schemeClr val="tx2"/>
+          </a:solidFill>
+          <a:latin typeface="Verdana" pitchFamily="34" charset="0"/>
+        </a:defRPr>
+      </a:lvl2pPr>
+      <a:lvl3pPr algn="l" rtl="0" eaLnBrk="1" fontAlgn="base" hangingPunct="1">
+        <a:spcBef>
+          <a:spcPct val="0"/>
+        </a:spcBef>
+        <a:spcAft>
+          <a:spcPct val="0"/>
+        </a:spcAft>
+        <a:defRPr sz="3300">
+          <a:solidFill>
+            <a:schemeClr val="tx2"/>
+          </a:solidFill>
+          <a:latin typeface="Verdana" pitchFamily="34" charset="0"/>
+        </a:defRPr>
+      </a:lvl3pPr>
+      <a:lvl4pPr algn="l" rtl="0" eaLnBrk="1" fontAlgn="base" hangingPunct="1">
+        <a:spcBef>
+          <a:spcPct val="0"/>
+        </a:spcBef>
+        <a:spcAft>
+          <a:spcPct val="0"/>
+        </a:spcAft>
+        <a:defRPr sz="3300">
+          <a:solidFill>
+            <a:schemeClr val="tx2"/>
+          </a:solidFill>
+          <a:latin typeface="Verdana" pitchFamily="34" charset="0"/>
+        </a:defRPr>
+      </a:lvl4pPr>
+      <a:lvl5pPr algn="l" rtl="0" eaLnBrk="1" fontAlgn="base" hangingPunct="1">
+        <a:spcBef>
+          <a:spcPct val="0"/>
+        </a:spcBef>
+        <a:spcAft>
+          <a:spcPct val="0"/>
+        </a:spcAft>
+        <a:defRPr sz="3300">
+          <a:solidFill>
+            <a:schemeClr val="tx2"/>
+          </a:solidFill>
+          <a:latin typeface="Verdana" pitchFamily="34" charset="0"/>
+        </a:defRPr>
+      </a:lvl5pPr>
+      <a:lvl6pPr marL="342900" algn="l" rtl="0" eaLnBrk="1" fontAlgn="base" hangingPunct="1">
+        <a:spcBef>
+          <a:spcPct val="0"/>
+        </a:spcBef>
+        <a:spcAft>
+          <a:spcPct val="0"/>
+        </a:spcAft>
+        <a:defRPr sz="3300">
+          <a:solidFill>
+            <a:schemeClr val="tx2"/>
+          </a:solidFill>
+          <a:latin typeface="Verdana" pitchFamily="34" charset="0"/>
+        </a:defRPr>
+      </a:lvl6pPr>
+      <a:lvl7pPr marL="685800" algn="l" rtl="0" eaLnBrk="1" fontAlgn="base" hangingPunct="1">
+        <a:spcBef>
+          <a:spcPct val="0"/>
+        </a:spcBef>
+        <a:spcAft>
+          <a:spcPct val="0"/>
+        </a:spcAft>
+        <a:defRPr sz="3300">
+          <a:solidFill>
+            <a:schemeClr val="tx2"/>
+          </a:solidFill>
+          <a:latin typeface="Verdana" pitchFamily="34" charset="0"/>
+        </a:defRPr>
+      </a:lvl7pPr>
+      <a:lvl8pPr marL="1028700" algn="l" rtl="0" eaLnBrk="1" fontAlgn="base" hangingPunct="1">
+        <a:spcBef>
+          <a:spcPct val="0"/>
+        </a:spcBef>
+        <a:spcAft>
+          <a:spcPct val="0"/>
+        </a:spcAft>
+        <a:defRPr sz="3300">
+          <a:solidFill>
+            <a:schemeClr val="tx2"/>
+          </a:solidFill>
+          <a:latin typeface="Verdana" pitchFamily="34" charset="0"/>
+        </a:defRPr>
+      </a:lvl8pPr>
+      <a:lvl9pPr marL="1371600" algn="l" rtl="0" eaLnBrk="1" fontAlgn="base" hangingPunct="1">
+        <a:spcBef>
+          <a:spcPct val="0"/>
+        </a:spcBef>
+        <a:spcAft>
+          <a:spcPct val="0"/>
+        </a:spcAft>
+        <a:defRPr sz="3300">
+          <a:solidFill>
+            <a:schemeClr val="tx2"/>
+          </a:solidFill>
+          <a:latin typeface="Verdana" pitchFamily="34" charset="0"/>
+        </a:defRPr>
+      </a:lvl9pPr>
     </p:titleStyle>
     <p:bodyStyle>
-      <a:lvl1pPr marL="320040" indent="-320040" algn="l" rtl="0" eaLnBrk="1" latinLnBrk="0" hangingPunct="1">
+      <a:lvl1pPr marL="239316" indent="-239316" algn="l" rtl="0" eaLnBrk="1" fontAlgn="base" hangingPunct="1">
         <a:spcBef>
-          <a:spcPts val="700"/>
+          <a:spcPts val="525"/>
         </a:spcBef>
+        <a:spcAft>
+          <a:spcPct val="0"/>
+        </a:spcAft>
         <a:buClr>
           <a:schemeClr val="accent2"/>
         </a:buClr>
         <a:buSzPct val="60000"/>
-        <a:buFont typeface="Wingdings"/>
+        <a:buFont typeface="Wingdings" pitchFamily="2" charset="2"/>
         <a:buChar char=""/>
-        <a:defRPr kumimoji="0" sz="2900" kern="1200">
+        <a:defRPr sz="2175" b="0" i="0" kern="1200">
           <a:solidFill>
             <a:schemeClr val="tx1"/>
           </a:solidFill>
-          <a:latin typeface="+mn-lt"/>
-          <a:ea typeface="+mn-ea"/>
-          <a:cs typeface="+mn-cs"/>
+          <a:latin typeface="Helvetica Neue Light" charset="0"/>
+          <a:ea typeface="Helvetica Neue Light" charset="0"/>
+          <a:cs typeface="Helvetica Neue Light" charset="0"/>
         </a:defRPr>
       </a:lvl1pPr>
-      <a:lvl2pPr marL="640080" indent="-274320" algn="l" rtl="0" eaLnBrk="1" latinLnBrk="0" hangingPunct="1">
+      <a:lvl2pPr marL="479822" indent="-204788" algn="l" rtl="0" eaLnBrk="1" fontAlgn="base" hangingPunct="1">
         <a:spcBef>
-          <a:spcPts val="550"/>
+          <a:spcPts val="413"/>
         </a:spcBef>
+        <a:spcAft>
+          <a:spcPct val="0"/>
+        </a:spcAft>
         <a:buClr>
           <a:schemeClr val="accent1"/>
         </a:buClr>
         <a:buSzPct val="70000"/>
-        <a:buFont typeface="Wingdings 2"/>
+        <a:buFont typeface="Wingdings 2" pitchFamily="18" charset="2"/>
         <a:buChar char=""/>
-        <a:defRPr kumimoji="0" sz="2600" kern="1200">
+        <a:defRPr sz="1950" b="0" i="0" kern="1200">
           <a:solidFill>
             <a:schemeClr val="tx1"/>
           </a:solidFill>
-          <a:latin typeface="+mn-lt"/>
-          <a:ea typeface="+mn-ea"/>
-          <a:cs typeface="+mn-cs"/>
+          <a:latin typeface="Helvetica Neue Light" charset="0"/>
+          <a:ea typeface="Helvetica Neue Light" charset="0"/>
+          <a:cs typeface="Helvetica Neue Light" charset="0"/>
         </a:defRPr>
       </a:lvl2pPr>
-      <a:lvl3pPr marL="914400" indent="-228600" algn="l" rtl="0" eaLnBrk="1" latinLnBrk="0" hangingPunct="1">
+      <a:lvl3pPr marL="685800" indent="-171450" algn="l" rtl="0" eaLnBrk="1" fontAlgn="base" hangingPunct="1">
         <a:spcBef>
-          <a:spcPts val="500"/>
+          <a:spcPts val="375"/>
         </a:spcBef>
+        <a:spcAft>
+          <a:spcPct val="0"/>
+        </a:spcAft>
         <a:buClr>
           <a:schemeClr val="accent2"/>
         </a:buClr>
         <a:buSzPct val="75000"/>
-        <a:buFont typeface="Wingdings"/>
+        <a:buFont typeface="Wingdings" pitchFamily="2" charset="2"/>
         <a:buChar char=""/>
-        <a:defRPr kumimoji="0" sz="2300" kern="1200">
+        <a:defRPr sz="1725" b="0" i="0" kern="1200">
           <a:solidFill>
             <a:schemeClr val="tx1"/>
           </a:solidFill>
-          <a:latin typeface="+mn-lt"/>
-          <a:ea typeface="+mn-ea"/>
-          <a:cs typeface="+mn-cs"/>
+          <a:latin typeface="Helvetica Neue Light" charset="0"/>
+          <a:ea typeface="Helvetica Neue Light" charset="0"/>
+          <a:cs typeface="Helvetica Neue Light" charset="0"/>
         </a:defRPr>
       </a:lvl3pPr>
-      <a:lvl4pPr marL="1371600" indent="-228600" algn="l" rtl="0" eaLnBrk="1" latinLnBrk="0" hangingPunct="1">
+      <a:lvl4pPr marL="1028700" indent="-171450" algn="l" rtl="0" eaLnBrk="1" fontAlgn="base" hangingPunct="1">
         <a:spcBef>
-          <a:spcPts val="400"/>
+          <a:spcPts val="300"/>
         </a:spcBef>
+        <a:spcAft>
+          <a:spcPct val="0"/>
+        </a:spcAft>
         <a:buClr>
-          <a:schemeClr val="accent3"/>
+          <a:srgbClr val="E66C7D"/>
         </a:buClr>
         <a:buSzPct val="75000"/>
-        <a:buFont typeface="Wingdings"/>
+        <a:buFont typeface="Wingdings" pitchFamily="2" charset="2"/>
         <a:buChar char=""/>
-        <a:defRPr kumimoji="0" sz="2000" kern="1200">
+        <a:defRPr sz="1500" b="0" i="0" kern="1200">
           <a:solidFill>
             <a:schemeClr val="tx1"/>
           </a:solidFill>
-          <a:latin typeface="+mn-lt"/>
-          <a:ea typeface="+mn-ea"/>
-          <a:cs typeface="+mn-cs"/>
+          <a:latin typeface="Helvetica Neue Light" charset="0"/>
+          <a:ea typeface="Helvetica Neue Light" charset="0"/>
+          <a:cs typeface="Helvetica Neue Light" charset="0"/>
         </a:defRPr>
       </a:lvl4pPr>
-      <a:lvl5pPr marL="1828800" indent="-228600" algn="l" rtl="0" eaLnBrk="1" latinLnBrk="0" hangingPunct="1">
+      <a:lvl5pPr marL="1371600" indent="-171450" algn="l" rtl="0" eaLnBrk="1" fontAlgn="base" hangingPunct="1">
         <a:spcBef>
-          <a:spcPts val="400"/>
+          <a:spcPts val="300"/>
         </a:spcBef>
+        <a:spcAft>
+          <a:spcPct val="0"/>
+        </a:spcAft>
         <a:buClr>
-          <a:schemeClr val="accent4"/>
+          <a:srgbClr val="6BB76D"/>
         </a:buClr>
         <a:buSzPct val="65000"/>
-        <a:buFont typeface="Wingdings"/>
+        <a:buFont typeface="Wingdings" pitchFamily="2" charset="2"/>
         <a:buChar char=""/>
-        <a:defRPr kumimoji="0" sz="2000" kern="1200">
+        <a:defRPr sz="1500" b="0" i="0" kern="1200">
           <a:solidFill>
             <a:schemeClr val="tx1"/>
           </a:solidFill>
-          <a:latin typeface="+mn-lt"/>
-          <a:ea typeface="+mn-ea"/>
-          <a:cs typeface="+mn-cs"/>
+          <a:latin typeface="Helvetica Neue Light" charset="0"/>
+          <a:ea typeface="Helvetica Neue Light" charset="0"/>
+          <a:cs typeface="Helvetica Neue Light" charset="0"/>
         </a:defRPr>
       </a:lvl5pPr>
-      <a:lvl6pPr marL="2103120" indent="-228600" algn="l" rtl="0" eaLnBrk="1" latinLnBrk="0" hangingPunct="1">
+      <a:lvl6pPr marL="1577340" indent="-171450" algn="l" rtl="0" eaLnBrk="1" latinLnBrk="0" hangingPunct="1">
         <a:spcBef>
           <a:spcPct val="20000"/>
         </a:spcBef>
@@ -4242,7 +4517,7 @@
         </a:buClr>
         <a:buFont typeface="Wingdings"/>
         <a:buChar char="§"/>
-        <a:defRPr kumimoji="0" sz="1800" kern="1200" baseline="0">
+        <a:defRPr kumimoji="0" sz="1350" kern="1200" baseline="0">
           <a:solidFill>
             <a:schemeClr val="tx1"/>
           </a:solidFill>
@@ -4251,7 +4526,7 @@
           <a:cs typeface="+mn-cs"/>
         </a:defRPr>
       </a:lvl6pPr>
-      <a:lvl7pPr marL="2377440" indent="-228600" algn="l" rtl="0" eaLnBrk="1" latinLnBrk="0" hangingPunct="1">
+      <a:lvl7pPr marL="1783080" indent="-171450" algn="l" rtl="0" eaLnBrk="1" latinLnBrk="0" hangingPunct="1">
         <a:spcBef>
           <a:spcPct val="20000"/>
         </a:spcBef>
@@ -4260,7 +4535,7 @@
         </a:buClr>
         <a:buFont typeface="Wingdings"/>
         <a:buChar char="§"/>
-        <a:defRPr kumimoji="0" sz="1800" kern="1200" baseline="0">
+        <a:defRPr kumimoji="0" sz="1350" kern="1200" baseline="0">
           <a:solidFill>
             <a:schemeClr val="tx1"/>
           </a:solidFill>
@@ -4269,7 +4544,7 @@
           <a:cs typeface="+mn-cs"/>
         </a:defRPr>
       </a:lvl7pPr>
-      <a:lvl8pPr marL="2651760" indent="-228600" algn="l" rtl="0" eaLnBrk="1" latinLnBrk="0" hangingPunct="1">
+      <a:lvl8pPr marL="1988820" indent="-171450" algn="l" rtl="0" eaLnBrk="1" latinLnBrk="0" hangingPunct="1">
         <a:spcBef>
           <a:spcPct val="20000"/>
         </a:spcBef>
@@ -4278,7 +4553,7 @@
         </a:buClr>
         <a:buFont typeface="Wingdings"/>
         <a:buChar char="§"/>
-        <a:defRPr kumimoji="0" sz="1800" kern="1200" baseline="0">
+        <a:defRPr kumimoji="0" sz="1350" kern="1200" baseline="0">
           <a:solidFill>
             <a:schemeClr val="tx1"/>
           </a:solidFill>
@@ -4287,7 +4562,7 @@
           <a:cs typeface="+mn-cs"/>
         </a:defRPr>
       </a:lvl8pPr>
-      <a:lvl9pPr marL="2926080" indent="-228600" algn="l" rtl="0" eaLnBrk="1" latinLnBrk="0" hangingPunct="1">
+      <a:lvl9pPr marL="2194560" indent="-171450" algn="l" rtl="0" eaLnBrk="1" latinLnBrk="0" hangingPunct="1">
         <a:spcBef>
           <a:spcPct val="20000"/>
         </a:spcBef>
@@ -4296,7 +4571,7 @@
         </a:buClr>
         <a:buFont typeface="Wingdings"/>
         <a:buChar char="§"/>
-        <a:defRPr kumimoji="0" sz="1800" kern="1200" baseline="0">
+        <a:defRPr kumimoji="0" sz="1350" kern="1200" baseline="0">
           <a:solidFill>
             <a:schemeClr val="tx1"/>
           </a:solidFill>
@@ -4317,7 +4592,7 @@
           <a:cs typeface="+mn-cs"/>
         </a:defRPr>
       </a:lvl1pPr>
-      <a:lvl2pPr marL="457200" algn="l" rtl="0" eaLnBrk="1" latinLnBrk="0" hangingPunct="1">
+      <a:lvl2pPr marL="342900" algn="l" rtl="0" eaLnBrk="1" latinLnBrk="0" hangingPunct="1">
         <a:defRPr kumimoji="0" kern="1200">
           <a:solidFill>
             <a:schemeClr val="tx1"/>
@@ -4327,7 +4602,7 @@
           <a:cs typeface="+mn-cs"/>
         </a:defRPr>
       </a:lvl2pPr>
-      <a:lvl3pPr marL="914400" algn="l" rtl="0" eaLnBrk="1" latinLnBrk="0" hangingPunct="1">
+      <a:lvl3pPr marL="685800" algn="l" rtl="0" eaLnBrk="1" latinLnBrk="0" hangingPunct="1">
         <a:defRPr kumimoji="0" kern="1200">
           <a:solidFill>
             <a:schemeClr val="tx1"/>
@@ -4337,7 +4612,7 @@
           <a:cs typeface="+mn-cs"/>
         </a:defRPr>
       </a:lvl3pPr>
-      <a:lvl4pPr marL="1371600" algn="l" rtl="0" eaLnBrk="1" latinLnBrk="0" hangingPunct="1">
+      <a:lvl4pPr marL="1028700" algn="l" rtl="0" eaLnBrk="1" latinLnBrk="0" hangingPunct="1">
         <a:defRPr kumimoji="0" kern="1200">
           <a:solidFill>
             <a:schemeClr val="tx1"/>
@@ -4347,7 +4622,7 @@
           <a:cs typeface="+mn-cs"/>
         </a:defRPr>
       </a:lvl4pPr>
-      <a:lvl5pPr marL="1828800" algn="l" rtl="0" eaLnBrk="1" latinLnBrk="0" hangingPunct="1">
+      <a:lvl5pPr marL="1371600" algn="l" rtl="0" eaLnBrk="1" latinLnBrk="0" hangingPunct="1">
         <a:defRPr kumimoji="0" kern="1200">
           <a:solidFill>
             <a:schemeClr val="tx1"/>
@@ -4357,7 +4632,7 @@
           <a:cs typeface="+mn-cs"/>
         </a:defRPr>
       </a:lvl5pPr>
-      <a:lvl6pPr marL="2286000" algn="l" rtl="0" eaLnBrk="1" latinLnBrk="0" hangingPunct="1">
+      <a:lvl6pPr marL="1714500" algn="l" rtl="0" eaLnBrk="1" latinLnBrk="0" hangingPunct="1">
         <a:defRPr kumimoji="0" kern="1200">
           <a:solidFill>
             <a:schemeClr val="tx1"/>
@@ -4367,7 +4642,7 @@
           <a:cs typeface="+mn-cs"/>
         </a:defRPr>
       </a:lvl6pPr>
-      <a:lvl7pPr marL="2743200" algn="l" rtl="0" eaLnBrk="1" latinLnBrk="0" hangingPunct="1">
+      <a:lvl7pPr marL="2057400" algn="l" rtl="0" eaLnBrk="1" latinLnBrk="0" hangingPunct="1">
         <a:defRPr kumimoji="0" kern="1200">
           <a:solidFill>
             <a:schemeClr val="tx1"/>
@@ -4377,7 +4652,7 @@
           <a:cs typeface="+mn-cs"/>
         </a:defRPr>
       </a:lvl7pPr>
-      <a:lvl8pPr marL="3200400" algn="l" rtl="0" eaLnBrk="1" latinLnBrk="0" hangingPunct="1">
+      <a:lvl8pPr marL="2400300" algn="l" rtl="0" eaLnBrk="1" latinLnBrk="0" hangingPunct="1">
         <a:defRPr kumimoji="0" kern="1200">
           <a:solidFill>
             <a:schemeClr val="tx1"/>
@@ -4387,7 +4662,7 @@
           <a:cs typeface="+mn-cs"/>
         </a:defRPr>
       </a:lvl8pPr>
-      <a:lvl9pPr marL="3657600" algn="l" rtl="0" eaLnBrk="1" latinLnBrk="0" hangingPunct="1">
+      <a:lvl9pPr marL="2743200" algn="l" rtl="0" eaLnBrk="1" latinLnBrk="0" hangingPunct="1">
         <a:defRPr kumimoji="0" kern="1200">
           <a:solidFill>
             <a:schemeClr val="tx1"/>
@@ -4429,11 +4704,17 @@
             <p:ph type="ctrTitle"/>
           </p:nvPr>
         </p:nvSpPr>
-        <p:spPr/>
+        <p:spPr>
+          <a:xfrm>
+            <a:off x="0" y="4038600"/>
+            <a:ext cx="12192000" cy="1828800"/>
+          </a:xfrm>
+        </p:spPr>
         <p:txBody>
           <a:bodyPr/>
           <a:lstStyle/>
           <a:p>
+            <a:pPr algn="ctr"/>
             <a:r>
               <a:rPr lang="en-US" dirty="0" smtClean="0"/>
               <a:t>Resources</a:t>
@@ -4464,7 +4745,7 @@
         </p:blipFill>
         <p:spPr>
           <a:xfrm>
-            <a:off x="1447979" y="583205"/>
+            <a:off x="2971979" y="583205"/>
             <a:ext cx="6234078" cy="4156052"/>
           </a:xfrm>
           <a:prstGeom prst="rect">
@@ -4482,13 +4763,13 @@
   <p:clrMapOvr>
     <a:masterClrMapping/>
   </p:clrMapOvr>
-  <mc:AlternateContent xmlns:mc="http://schemas.openxmlformats.org/markup-compatibility/2006">
-    <mc:Choice xmlns:p14="http://schemas.microsoft.com/office/powerpoint/2010/main" Requires="p14">
+  <mc:AlternateContent xmlns:mc="http://schemas.openxmlformats.org/markup-compatibility/2006" xmlns:p14="http://schemas.microsoft.com/office/powerpoint/2010/main">
+    <mc:Choice Requires="p14">
       <p:transition spd="med" p14:dur="700">
         <p:fade/>
       </p:transition>
     </mc:Choice>
-    <mc:Fallback>
+    <mc:Fallback xmlns="">
       <p:transition xmlns:p14="http://schemas.microsoft.com/office/powerpoint/2010/main" spd="med">
         <p:fade/>
       </p:transition>
@@ -4497,7 +4778,7 @@
   <p:timing>
     <p:tnLst>
       <p:par>
-        <p:cTn xmlns:p14="http://schemas.microsoft.com/office/powerpoint/2010/main" id="1" dur="indefinite" restart="never" nodeType="tmRoot"/>
+        <p:cTn id="1" dur="indefinite" restart="never" nodeType="tmRoot"/>
       </p:par>
     </p:tnLst>
   </p:timing>
@@ -4561,17 +4842,8 @@
           <a:p>
             <a:r>
               <a:rPr lang="en-US" dirty="0" smtClean="0"/>
-              <a:t>Black community and infrastructure </a:t>
-            </a:r>
-            <a:r>
-              <a:rPr lang="en-US" dirty="0" smtClean="0"/>
-              <a:t>in which it was </a:t>
-            </a:r>
-            <a:r>
-              <a:rPr lang="en-US" dirty="0" smtClean="0"/>
-              <a:t>embedded provided resources</a:t>
-            </a:r>
-            <a:endParaRPr lang="en-US" dirty="0" smtClean="0"/>
+              <a:t>Black community and infrastructure in which it was embedded provided resources</a:t>
+            </a:r>
           </a:p>
           <a:p>
             <a:pPr lvl="1"/>
@@ -4605,7 +4877,7 @@
         </p:blipFill>
         <p:spPr>
           <a:xfrm>
-            <a:off x="2063247" y="3318535"/>
+            <a:off x="3587248" y="3318536"/>
             <a:ext cx="4944671" cy="3255241"/>
           </a:xfrm>
           <a:prstGeom prst="rect">
@@ -4623,13 +4895,13 @@
   <p:clrMapOvr>
     <a:masterClrMapping/>
   </p:clrMapOvr>
-  <mc:AlternateContent xmlns:mc="http://schemas.openxmlformats.org/markup-compatibility/2006">
-    <mc:Choice xmlns:p14="http://schemas.microsoft.com/office/powerpoint/2010/main" Requires="p14">
+  <mc:AlternateContent xmlns:mc="http://schemas.openxmlformats.org/markup-compatibility/2006" xmlns:p14="http://schemas.microsoft.com/office/powerpoint/2010/main">
+    <mc:Choice Requires="p14">
       <p:transition spd="med" p14:dur="700">
         <p:fade/>
       </p:transition>
     </mc:Choice>
-    <mc:Fallback>
+    <mc:Fallback xmlns="">
       <p:transition xmlns:p14="http://schemas.microsoft.com/office/powerpoint/2010/main" spd="med">
         <p:fade/>
       </p:transition>
@@ -4638,7 +4910,7 @@
   <p:timing>
     <p:tnLst>
       <p:par>
-        <p:cTn xmlns:p14="http://schemas.microsoft.com/office/powerpoint/2010/main" id="1" dur="indefinite" restart="never" nodeType="tmRoot"/>
+        <p:cTn id="1" dur="indefinite" restart="never" nodeType="tmRoot"/>
       </p:par>
     </p:tnLst>
   </p:timing>
@@ -4675,7 +4947,7 @@
         <p:spPr/>
         <p:txBody>
           <a:bodyPr>
-            <a:normAutofit fontScale="90000"/>
+            <a:normAutofit/>
           </a:bodyPr>
           <a:lstStyle/>
           <a:p>
@@ -4755,13 +5027,13 @@
   <p:clrMapOvr>
     <a:masterClrMapping/>
   </p:clrMapOvr>
-  <mc:AlternateContent xmlns:mc="http://schemas.openxmlformats.org/markup-compatibility/2006">
-    <mc:Choice xmlns:p14="http://schemas.microsoft.com/office/powerpoint/2010/main" Requires="p14">
+  <mc:AlternateContent xmlns:mc="http://schemas.openxmlformats.org/markup-compatibility/2006" xmlns:p14="http://schemas.microsoft.com/office/powerpoint/2010/main">
+    <mc:Choice Requires="p14">
       <p:transition spd="med" p14:dur="700">
         <p:fade/>
       </p:transition>
     </mc:Choice>
-    <mc:Fallback>
+    <mc:Fallback xmlns="">
       <p:transition xmlns:p14="http://schemas.microsoft.com/office/powerpoint/2010/main" spd="med">
         <p:fade/>
       </p:transition>
@@ -4770,7 +5042,7 @@
   <p:timing>
     <p:tnLst>
       <p:par>
-        <p:cTn xmlns:p14="http://schemas.microsoft.com/office/powerpoint/2010/main" id="1" dur="indefinite" restart="never" nodeType="tmRoot"/>
+        <p:cTn id="1" dur="indefinite" restart="never" nodeType="tmRoot"/>
       </p:par>
     </p:tnLst>
   </p:timing>
@@ -4841,15 +5113,7 @@
             <a:pPr lvl="1"/>
             <a:r>
               <a:rPr lang="en-US" dirty="0" smtClean="0"/>
-              <a:t>availability</a:t>
-            </a:r>
-            <a:r>
-              <a:rPr lang="en-US" dirty="0" smtClean="0"/>
-              <a:t>, accumulation, and channeling </a:t>
-            </a:r>
-            <a:r>
-              <a:rPr lang="en-US" dirty="0" smtClean="0"/>
-              <a:t>towards mobilization</a:t>
+              <a:t>availability, accumulation, and channeling towards mobilization</a:t>
             </a:r>
             <a:endParaRPr lang="en-US" dirty="0"/>
           </a:p>
@@ -4865,13 +5129,13 @@
   <p:clrMapOvr>
     <a:masterClrMapping/>
   </p:clrMapOvr>
-  <mc:AlternateContent xmlns:mc="http://schemas.openxmlformats.org/markup-compatibility/2006">
-    <mc:Choice xmlns:p14="http://schemas.microsoft.com/office/powerpoint/2010/main" Requires="p14">
+  <mc:AlternateContent xmlns:mc="http://schemas.openxmlformats.org/markup-compatibility/2006" xmlns:p14="http://schemas.microsoft.com/office/powerpoint/2010/main">
+    <mc:Choice Requires="p14">
       <p:transition spd="med" p14:dur="700">
         <p:fade/>
       </p:transition>
     </mc:Choice>
-    <mc:Fallback>
+    <mc:Fallback xmlns="">
       <p:transition xmlns:p14="http://schemas.microsoft.com/office/powerpoint/2010/main" spd="med">
         <p:fade/>
       </p:transition>
@@ -4880,7 +5144,7 @@
   <p:timing>
     <p:tnLst>
       <p:par>
-        <p:cTn xmlns:p14="http://schemas.microsoft.com/office/powerpoint/2010/main" id="1" dur="indefinite" restart="never" nodeType="tmRoot"/>
+        <p:cTn id="1" dur="indefinite" restart="never" nodeType="tmRoot"/>
       </p:par>
     </p:tnLst>
   </p:timing>
@@ -4953,11 +5217,7 @@
             <a:pPr lvl="1"/>
             <a:r>
               <a:rPr lang="en-US" dirty="0" smtClean="0"/>
-              <a:t>What </a:t>
-            </a:r>
-            <a:r>
-              <a:rPr lang="en-US" dirty="0" smtClean="0"/>
-              <a:t>are the various types of resources important for social movements?</a:t>
+              <a:t>What are the various types of resources important for social movements?</a:t>
             </a:r>
           </a:p>
           <a:p>
@@ -4965,38 +5225,25 @@
               <a:rPr lang="en-US" dirty="0" smtClean="0"/>
               <a:t>Where/Who?</a:t>
             </a:r>
-            <a:endParaRPr lang="en-US" dirty="0" smtClean="0"/>
           </a:p>
           <a:p>
             <a:pPr lvl="1"/>
             <a:r>
               <a:rPr lang="en-US" dirty="0" smtClean="0"/>
-              <a:t>From </a:t>
-            </a:r>
+              <a:t>From where do these resources flow?</a:t>
+            </a:r>
+          </a:p>
+          <a:p>
             <a:r>
               <a:rPr lang="en-US" dirty="0" smtClean="0"/>
-              <a:t>where do these resources flow?</a:t>
-            </a:r>
-          </a:p>
-          <a:p>
+              <a:t>Strings attached?</a:t>
+            </a:r>
+          </a:p>
+          <a:p>
+            <a:pPr lvl="1"/>
             <a:r>
               <a:rPr lang="en-US" dirty="0" smtClean="0"/>
-              <a:t>Strings attached</a:t>
-            </a:r>
-            <a:r>
-              <a:rPr lang="en-US" dirty="0" smtClean="0"/>
-              <a:t>?</a:t>
-            </a:r>
-          </a:p>
-          <a:p>
-            <a:pPr lvl="1"/>
-            <a:r>
-              <a:rPr lang="en-US" dirty="0" smtClean="0"/>
-              <a:t>Does </a:t>
-            </a:r>
-            <a:r>
-              <a:rPr lang="en-US" dirty="0" smtClean="0"/>
-              <a:t>the source of the resource affect movement goals and activities?</a:t>
+              <a:t>Does the source of the resource affect movement goals and activities?</a:t>
             </a:r>
             <a:endParaRPr lang="en-US" dirty="0"/>
           </a:p>
@@ -5012,13 +5259,13 @@
   <p:clrMapOvr>
     <a:masterClrMapping/>
   </p:clrMapOvr>
-  <mc:AlternateContent xmlns:mc="http://schemas.openxmlformats.org/markup-compatibility/2006">
-    <mc:Choice xmlns:p14="http://schemas.microsoft.com/office/powerpoint/2010/main" Requires="p14">
+  <mc:AlternateContent xmlns:mc="http://schemas.openxmlformats.org/markup-compatibility/2006" xmlns:p14="http://schemas.microsoft.com/office/powerpoint/2010/main">
+    <mc:Choice Requires="p14">
       <p:transition spd="med" p14:dur="700">
         <p:fade/>
       </p:transition>
     </mc:Choice>
-    <mc:Fallback>
+    <mc:Fallback xmlns="">
       <p:transition xmlns:p14="http://schemas.microsoft.com/office/powerpoint/2010/main" spd="med">
         <p:fade/>
       </p:transition>
@@ -5027,7 +5274,7 @@
   <p:timing>
     <p:tnLst>
       <p:par>
-        <p:cTn xmlns:p14="http://schemas.microsoft.com/office/powerpoint/2010/main" id="1" dur="indefinite" restart="never" nodeType="tmRoot"/>
+        <p:cTn id="1" dur="indefinite" restart="never" nodeType="tmRoot"/>
       </p:par>
     </p:tnLst>
   </p:timing>
@@ -5091,13 +5338,8 @@
           <a:p>
             <a:r>
               <a:rPr lang="en-US" dirty="0" smtClean="0"/>
-              <a:t>Resources </a:t>
-            </a:r>
-            <a:r>
-              <a:rPr lang="en-US" dirty="0" smtClean="0"/>
-              <a:t>vary by type: </a:t>
-            </a:r>
-            <a:endParaRPr lang="en-US" dirty="0" smtClean="0"/>
+              <a:t>Resources vary by type: </a:t>
+            </a:r>
           </a:p>
           <a:p>
             <a:pPr lvl="1"/>
@@ -5105,7 +5347,6 @@
               <a:rPr lang="en-US" dirty="0" smtClean="0"/>
               <a:t>Anything movements can use to advance their interests</a:t>
             </a:r>
-            <a:endParaRPr lang="en-US" dirty="0" smtClean="0"/>
           </a:p>
           <a:p>
             <a:pPr lvl="2"/>
@@ -5131,11 +5372,7 @@
             <a:pPr lvl="2"/>
             <a:r>
               <a:rPr lang="en-US" dirty="0" smtClean="0"/>
-              <a:t>legitimacy </a:t>
-            </a:r>
-            <a:r>
-              <a:rPr lang="en-US" dirty="0" smtClean="0"/>
-              <a:t>(amongst relevant actors such as the movement’s constituency or the public)</a:t>
+              <a:t>legitimacy (amongst relevant actors such as the movement’s constituency or the public)</a:t>
             </a:r>
             <a:endParaRPr lang="en-US" dirty="0"/>
           </a:p>
@@ -5151,13 +5388,13 @@
   <p:clrMapOvr>
     <a:masterClrMapping/>
   </p:clrMapOvr>
-  <mc:AlternateContent xmlns:mc="http://schemas.openxmlformats.org/markup-compatibility/2006">
-    <mc:Choice xmlns:p14="http://schemas.microsoft.com/office/powerpoint/2010/main" Requires="p14">
+  <mc:AlternateContent xmlns:mc="http://schemas.openxmlformats.org/markup-compatibility/2006" xmlns:p14="http://schemas.microsoft.com/office/powerpoint/2010/main">
+    <mc:Choice Requires="p14">
       <p:transition spd="med" p14:dur="700">
         <p:fade/>
       </p:transition>
     </mc:Choice>
-    <mc:Fallback>
+    <mc:Fallback xmlns="">
       <p:transition xmlns:p14="http://schemas.microsoft.com/office/powerpoint/2010/main" spd="med">
         <p:fade/>
       </p:transition>
@@ -5166,7 +5403,7 @@
   <p:timing>
     <p:tnLst>
       <p:par>
-        <p:cTn xmlns:p14="http://schemas.microsoft.com/office/powerpoint/2010/main" id="1" dur="indefinite" restart="never" nodeType="tmRoot"/>
+        <p:cTn id="1" dur="indefinite" restart="never" nodeType="tmRoot"/>
       </p:par>
     </p:tnLst>
   </p:timing>
@@ -5277,13 +5514,13 @@
   <p:clrMapOvr>
     <a:masterClrMapping/>
   </p:clrMapOvr>
-  <mc:AlternateContent xmlns:mc="http://schemas.openxmlformats.org/markup-compatibility/2006">
-    <mc:Choice xmlns:p14="http://schemas.microsoft.com/office/powerpoint/2010/main" Requires="p14">
+  <mc:AlternateContent xmlns:mc="http://schemas.openxmlformats.org/markup-compatibility/2006" xmlns:p14="http://schemas.microsoft.com/office/powerpoint/2010/main">
+    <mc:Choice Requires="p14">
       <p:transition spd="med" p14:dur="700">
         <p:fade/>
       </p:transition>
     </mc:Choice>
-    <mc:Fallback>
+    <mc:Fallback xmlns="">
       <p:transition xmlns:p14="http://schemas.microsoft.com/office/powerpoint/2010/main" spd="med">
         <p:fade/>
       </p:transition>
@@ -5292,7 +5529,7 @@
   <p:timing>
     <p:tnLst>
       <p:par>
-        <p:cTn xmlns:p14="http://schemas.microsoft.com/office/powerpoint/2010/main" id="1" dur="indefinite" restart="never" nodeType="tmRoot"/>
+        <p:cTn id="1" dur="indefinite" restart="never" nodeType="tmRoot"/>
       </p:par>
     </p:tnLst>
   </p:timing>
@@ -5396,13 +5633,13 @@
   <p:clrMapOvr>
     <a:masterClrMapping/>
   </p:clrMapOvr>
-  <mc:AlternateContent xmlns:mc="http://schemas.openxmlformats.org/markup-compatibility/2006">
-    <mc:Choice xmlns:p14="http://schemas.microsoft.com/office/powerpoint/2010/main" Requires="p14">
+  <mc:AlternateContent xmlns:mc="http://schemas.openxmlformats.org/markup-compatibility/2006" xmlns:p14="http://schemas.microsoft.com/office/powerpoint/2010/main">
+    <mc:Choice Requires="p14">
       <p:transition spd="med" p14:dur="700">
         <p:fade/>
       </p:transition>
     </mc:Choice>
-    <mc:Fallback>
+    <mc:Fallback xmlns="">
       <p:transition xmlns:p14="http://schemas.microsoft.com/office/powerpoint/2010/main" spd="med">
         <p:fade/>
       </p:transition>
@@ -5411,7 +5648,7 @@
   <p:timing>
     <p:tnLst>
       <p:par>
-        <p:cTn xmlns:p14="http://schemas.microsoft.com/office/powerpoint/2010/main" id="1" dur="indefinite" restart="never" nodeType="tmRoot"/>
+        <p:cTn id="1" dur="indefinite" restart="never" nodeType="tmRoot"/>
       </p:par>
     </p:tnLst>
   </p:timing>
@@ -5473,7 +5710,7 @@
           </p:nvPr>
         </p:nvGraphicFramePr>
         <p:xfrm>
-          <a:off x="457199" y="1688807"/>
+          <a:off x="1981199" y="1688808"/>
           <a:ext cx="8229600" cy="4965563"/>
         </p:xfrm>
         <a:graphic>
@@ -8668,13 +8905,13 @@
   <p:clrMapOvr>
     <a:masterClrMapping/>
   </p:clrMapOvr>
-  <mc:AlternateContent xmlns:mc="http://schemas.openxmlformats.org/markup-compatibility/2006">
-    <mc:Choice xmlns:p14="http://schemas.microsoft.com/office/powerpoint/2010/main" Requires="p14">
+  <mc:AlternateContent xmlns:mc="http://schemas.openxmlformats.org/markup-compatibility/2006" xmlns:p14="http://schemas.microsoft.com/office/powerpoint/2010/main">
+    <mc:Choice Requires="p14">
       <p:transition spd="med" p14:dur="700">
         <p:fade/>
       </p:transition>
     </mc:Choice>
-    <mc:Fallback>
+    <mc:Fallback xmlns="">
       <p:transition xmlns:p14="http://schemas.microsoft.com/office/powerpoint/2010/main" spd="med">
         <p:fade/>
       </p:transition>
@@ -8683,7 +8920,7 @@
   <p:timing>
     <p:tnLst>
       <p:par>
-        <p:cTn xmlns:p14="http://schemas.microsoft.com/office/powerpoint/2010/main" id="1" dur="indefinite" restart="never" nodeType="tmRoot"/>
+        <p:cTn id="1" dur="indefinite" restart="never" nodeType="tmRoot"/>
       </p:par>
     </p:tnLst>
   </p:timing>
@@ -8749,13 +8986,8 @@
           <a:p>
             <a:r>
               <a:rPr lang="en-US" dirty="0" smtClean="0"/>
-              <a:t>Resources </a:t>
-            </a:r>
-            <a:r>
-              <a:rPr lang="en-US" dirty="0" smtClean="0"/>
-              <a:t>vary by sources:</a:t>
-            </a:r>
-            <a:endParaRPr lang="en-US" dirty="0" smtClean="0"/>
+              <a:t>Resources vary by sources:</a:t>
+            </a:r>
           </a:p>
           <a:p>
             <a:pPr lvl="1"/>
@@ -8768,11 +9000,7 @@
             <a:pPr lvl="2"/>
             <a:r>
               <a:rPr lang="en-US" dirty="0" smtClean="0"/>
-              <a:t>Conscious </a:t>
-            </a:r>
-            <a:r>
-              <a:rPr lang="en-US" dirty="0" smtClean="0"/>
-              <a:t>(non-movement) constituents</a:t>
+              <a:t>Conscious (non-movement) constituents</a:t>
             </a:r>
           </a:p>
           <a:p>
@@ -8793,11 +9021,7 @@
             <a:pPr lvl="2"/>
             <a:r>
               <a:rPr lang="en-US" dirty="0" smtClean="0"/>
-              <a:t>Indigenous </a:t>
-            </a:r>
-            <a:r>
-              <a:rPr lang="en-US" dirty="0" smtClean="0"/>
-              <a:t>(movement) constituents</a:t>
+              <a:t>Indigenous (movement) constituents</a:t>
             </a:r>
           </a:p>
           <a:p>
@@ -8827,13 +9051,13 @@
   <p:clrMapOvr>
     <a:masterClrMapping/>
   </p:clrMapOvr>
-  <mc:AlternateContent xmlns:mc="http://schemas.openxmlformats.org/markup-compatibility/2006">
-    <mc:Choice xmlns:p14="http://schemas.microsoft.com/office/powerpoint/2010/main" Requires="p14">
+  <mc:AlternateContent xmlns:mc="http://schemas.openxmlformats.org/markup-compatibility/2006" xmlns:p14="http://schemas.microsoft.com/office/powerpoint/2010/main">
+    <mc:Choice Requires="p14">
       <p:transition spd="med" p14:dur="700">
         <p:fade/>
       </p:transition>
     </mc:Choice>
-    <mc:Fallback>
+    <mc:Fallback xmlns="">
       <p:transition xmlns:p14="http://schemas.microsoft.com/office/powerpoint/2010/main" spd="med">
         <p:fade/>
       </p:transition>
@@ -8842,7 +9066,7 @@
   <p:timing>
     <p:tnLst>
       <p:par>
-        <p:cTn xmlns:p14="http://schemas.microsoft.com/office/powerpoint/2010/main" id="1" dur="indefinite" restart="never" nodeType="tmRoot"/>
+        <p:cTn id="1" dur="indefinite" restart="never" nodeType="tmRoot"/>
       </p:par>
     </p:tnLst>
   </p:timing>
@@ -8879,7 +9103,7 @@
         <p:spPr/>
         <p:txBody>
           <a:bodyPr>
-            <a:normAutofit fontScale="90000"/>
+            <a:normAutofit/>
           </a:bodyPr>
           <a:lstStyle/>
           <a:p>
@@ -8944,13 +9168,13 @@
   <p:clrMapOvr>
     <a:masterClrMapping/>
   </p:clrMapOvr>
-  <mc:AlternateContent xmlns:mc="http://schemas.openxmlformats.org/markup-compatibility/2006">
-    <mc:Choice xmlns:p14="http://schemas.microsoft.com/office/powerpoint/2010/main" Requires="p14">
+  <mc:AlternateContent xmlns:mc="http://schemas.openxmlformats.org/markup-compatibility/2006" xmlns:p14="http://schemas.microsoft.com/office/powerpoint/2010/main">
+    <mc:Choice Requires="p14">
       <p:transition spd="med" p14:dur="700">
         <p:fade/>
       </p:transition>
     </mc:Choice>
-    <mc:Fallback>
+    <mc:Fallback xmlns="">
       <p:transition xmlns:p14="http://schemas.microsoft.com/office/powerpoint/2010/main" spd="med">
         <p:fade/>
       </p:transition>
@@ -8959,7 +9183,7 @@
   <p:timing>
     <p:tnLst>
       <p:par>
-        <p:cTn xmlns:p14="http://schemas.microsoft.com/office/powerpoint/2010/main" id="1" dur="indefinite" restart="never" nodeType="tmRoot"/>
+        <p:cTn id="1" dur="indefinite" restart="never" nodeType="tmRoot"/>
       </p:par>
     </p:tnLst>
   </p:timing>
@@ -8967,59 +9191,57 @@
 </file>
 
 <file path=ppt/theme/theme1.xml><?xml version="1.0" encoding="utf-8"?>
-<a:theme xmlns:a="http://schemas.openxmlformats.org/drawingml/2006/main" name="Chargers Theme">
+<a:theme xmlns:a="http://schemas.openxmlformats.org/drawingml/2006/main" name="chargers2">
   <a:themeElements>
-    <a:clrScheme name="Chargers Theme Colors 1">
+    <a:clrScheme name="chargers">
       <a:dk1>
         <a:srgbClr val="000000"/>
       </a:dk1>
       <a:lt1>
-        <a:srgbClr val="CCCCCC"/>
+        <a:srgbClr val="FFFFFF"/>
       </a:lt1>
       <a:dk2>
-        <a:srgbClr val="0C2340"/>
+        <a:srgbClr val="082551"/>
       </a:dk2>
       <a:lt2>
-        <a:srgbClr val="CCCCCC"/>
+        <a:srgbClr val="D4D4D6"/>
       </a:lt2>
       <a:accent1>
-        <a:srgbClr val="FFB81C"/>
+        <a:srgbClr val="F0AD00"/>
       </a:accent1>
       <a:accent2>
-        <a:srgbClr val="0072CE"/>
+        <a:srgbClr val="69C0FF"/>
       </a:accent2>
       <a:accent3>
-        <a:srgbClr val="999999"/>
+        <a:srgbClr val="E66C7D"/>
       </a:accent3>
       <a:accent4>
-        <a:srgbClr val="FFB81C"/>
+        <a:srgbClr val="6BB76D"/>
       </a:accent4>
       <a:accent5>
-        <a:srgbClr val="FFFFFF"/>
+        <a:srgbClr val="E88651"/>
       </a:accent5>
       <a:accent6>
-        <a:srgbClr val="666666"/>
+        <a:srgbClr val="C64847"/>
       </a:accent6>
       <a:hlink>
-        <a:srgbClr val="0072CE"/>
+        <a:srgbClr val="168BBA"/>
       </a:hlink>
       <a:folHlink>
-        <a:srgbClr val="666666"/>
+        <a:srgbClr val="680000"/>
       </a:folHlink>
     </a:clrScheme>
-    <a:fontScheme name="Median">
+    <a:fontScheme name="Aspect">
       <a:majorFont>
-        <a:latin typeface="Tw Cen MT"/>
+        <a:latin typeface="Verdana"/>
         <a:ea typeface=""/>
         <a:cs typeface=""/>
-        <a:font script="Grek" typeface="Calibri"/>
-        <a:font script="Cyrl" typeface="Calibri"/>
-        <a:font script="Jpan" typeface="ＭＳ Ｐゴシック"/>
-        <a:font script="Hang" typeface="HY얕은샘물M"/>
-        <a:font script="Hans" typeface="华文仿宋"/>
+        <a:font script="Jpan" typeface="ＭＳ ゴシック"/>
+        <a:font script="Hang" typeface="굴림"/>
+        <a:font script="Hans" typeface="微软雅黑"/>
         <a:font script="Hant" typeface="微軟正黑體"/>
-        <a:font script="Arab" typeface="Arial"/>
-        <a:font script="Hebr" typeface="Levenim MT"/>
+        <a:font script="Arab" typeface="Tahoma"/>
+        <a:font script="Hebr" typeface="Tahoma"/>
         <a:font script="Thai" typeface="FreesiaUPC"/>
         <a:font script="Ethi" typeface="Nyala"/>
         <a:font script="Beng" typeface="Vrinda"/>
@@ -9041,21 +9263,19 @@
         <a:font script="Laoo" typeface="DokChampa"/>
         <a:font script="Sinh" typeface="Iskoola Pota"/>
         <a:font script="Mong" typeface="Mongolian Baiti"/>
-        <a:font script="Viet" typeface="Tahoma"/>
+        <a:font script="Viet" typeface="Verdana"/>
         <a:font script="Uigh" typeface="Microsoft Uighur"/>
       </a:majorFont>
       <a:minorFont>
-        <a:latin typeface="Tw Cen MT"/>
+        <a:latin typeface="Verdana"/>
         <a:ea typeface=""/>
         <a:cs typeface=""/>
-        <a:font script="Grek" typeface="Calibri"/>
-        <a:font script="Cyrl" typeface="Calibri"/>
-        <a:font script="Jpan" typeface="ＭＳ Ｐゴシック"/>
-        <a:font script="Hang" typeface="HY얕은샘물M"/>
-        <a:font script="Hans" typeface="华文仿宋"/>
+        <a:font script="Jpan" typeface="ＭＳ ゴシック"/>
+        <a:font script="Hang" typeface="굴림"/>
+        <a:font script="Hans" typeface="微软雅黑"/>
         <a:font script="Hant" typeface="微軟正黑體"/>
-        <a:font script="Arab" typeface="Arial"/>
-        <a:font script="Hebr" typeface="Levenim MT"/>
+        <a:font script="Arab" typeface="Tahoma"/>
+        <a:font script="Hebr" typeface="Tahoma"/>
         <a:font script="Thai" typeface="FreesiaUPC"/>
         <a:font script="Ethi" typeface="Nyala"/>
         <a:font script="Beng" typeface="Vrinda"/>
@@ -9077,7 +9297,7 @@
         <a:font script="Laoo" typeface="DokChampa"/>
         <a:font script="Sinh" typeface="Iskoola Pota"/>
         <a:font script="Mong" typeface="Mongolian Baiti"/>
-        <a:font script="Viet" typeface="Tahoma"/>
+        <a:font script="Viet" typeface="Verdana"/>
         <a:font script="Uigh" typeface="Microsoft Uighur"/>
       </a:minorFont>
     </a:fontScheme>
@@ -9193,51 +9413,13 @@
       </a:bgFillStyleLst>
     </a:fmtScheme>
   </a:themeElements>
-  <a:objectDefaults>
-    <a:spDef>
-      <a:spPr/>
-      <a:bodyPr rtlCol="0" anchor="ctr"/>
-      <a:lstStyle>
-        <a:defPPr algn="ctr">
-          <a:defRPr/>
-        </a:defPPr>
-      </a:lstStyle>
-      <a:style>
-        <a:lnRef idx="1">
-          <a:schemeClr val="accent1"/>
-        </a:lnRef>
-        <a:fillRef idx="3">
-          <a:schemeClr val="accent1"/>
-        </a:fillRef>
-        <a:effectRef idx="2">
-          <a:schemeClr val="accent1"/>
-        </a:effectRef>
-        <a:fontRef idx="minor">
-          <a:schemeClr val="lt1"/>
-        </a:fontRef>
-      </a:style>
-    </a:spDef>
-    <a:lnDef>
-      <a:spPr/>
-      <a:bodyPr/>
-      <a:lstStyle/>
-      <a:style>
-        <a:lnRef idx="2">
-          <a:schemeClr val="accent1"/>
-        </a:lnRef>
-        <a:fillRef idx="0">
-          <a:schemeClr val="accent1"/>
-        </a:fillRef>
-        <a:effectRef idx="1">
-          <a:schemeClr val="accent1"/>
-        </a:effectRef>
-        <a:fontRef idx="minor">
-          <a:schemeClr val="tx1"/>
-        </a:fontRef>
-      </a:style>
-    </a:lnDef>
-  </a:objectDefaults>
+  <a:objectDefaults/>
   <a:extraClrSchemeLst/>
+  <a:extLst>
+    <a:ext uri="{05A4C25C-085E-4340-85A3-A5531E510DB2}">
+      <thm15:themeFamily xmlns:thm15="http://schemas.microsoft.com/office/thememl/2012/main" name="chargers2" id="{6DBD1BB9-3822-1742-A51A-4595D71C9688}" vid="{2974C9F9-02AF-7A4D-8B70-272A2D4E3805}"/>
+    </a:ext>
+  </a:extLst>
 </a:theme>
 </file>
 

</xml_diff>